<commit_message>
Updated diagrams of Monti's framework
</commit_message>
<xml_diff>
--- a/Notes/SOC5060_Framework_Monti_MakingCommunity_2019v00.pptx
+++ b/Notes/SOC5060_Framework_Monti_MakingCommunity_2019v00.pptx
@@ -6,6 +6,7 @@
   </p:sldMasterIdLst>
   <p:sldIdLst>
     <p:sldId id="257" r:id="rId2"/>
+    <p:sldId id="258" r:id="rId3"/>
   </p:sldIdLst>
   <p:sldSz cx="12192000" cy="6858000"/>
   <p:notesSz cx="7023100" cy="9309100"/>
@@ -241,7 +242,7 @@
           <a:p>
             <a:fld id="{40CF262A-BA9E-4FD4-B7A4-17D33C6E7493}" type="datetimeFigureOut">
               <a:rPr lang="en-US" smtClean="0"/>
-              <a:t>10/5/2019</a:t>
+              <a:t>10/6/2019</a:t>
             </a:fld>
             <a:endParaRPr lang="en-US"/>
           </a:p>
@@ -409,7 +410,7 @@
           <a:p>
             <a:fld id="{40CF262A-BA9E-4FD4-B7A4-17D33C6E7493}" type="datetimeFigureOut">
               <a:rPr lang="en-US" smtClean="0"/>
-              <a:t>10/5/2019</a:t>
+              <a:t>10/6/2019</a:t>
             </a:fld>
             <a:endParaRPr lang="en-US"/>
           </a:p>
@@ -587,7 +588,7 @@
           <a:p>
             <a:fld id="{40CF262A-BA9E-4FD4-B7A4-17D33C6E7493}" type="datetimeFigureOut">
               <a:rPr lang="en-US" smtClean="0"/>
-              <a:t>10/5/2019</a:t>
+              <a:t>10/6/2019</a:t>
             </a:fld>
             <a:endParaRPr lang="en-US"/>
           </a:p>
@@ -755,7 +756,7 @@
           <a:p>
             <a:fld id="{40CF262A-BA9E-4FD4-B7A4-17D33C6E7493}" type="datetimeFigureOut">
               <a:rPr lang="en-US" smtClean="0"/>
-              <a:t>10/5/2019</a:t>
+              <a:t>10/6/2019</a:t>
             </a:fld>
             <a:endParaRPr lang="en-US"/>
           </a:p>
@@ -1000,7 +1001,7 @@
           <a:p>
             <a:fld id="{40CF262A-BA9E-4FD4-B7A4-17D33C6E7493}" type="datetimeFigureOut">
               <a:rPr lang="en-US" smtClean="0"/>
-              <a:t>10/5/2019</a:t>
+              <a:t>10/6/2019</a:t>
             </a:fld>
             <a:endParaRPr lang="en-US"/>
           </a:p>
@@ -1229,7 +1230,7 @@
           <a:p>
             <a:fld id="{40CF262A-BA9E-4FD4-B7A4-17D33C6E7493}" type="datetimeFigureOut">
               <a:rPr lang="en-US" smtClean="0"/>
-              <a:t>10/5/2019</a:t>
+              <a:t>10/6/2019</a:t>
             </a:fld>
             <a:endParaRPr lang="en-US"/>
           </a:p>
@@ -1593,7 +1594,7 @@
           <a:p>
             <a:fld id="{40CF262A-BA9E-4FD4-B7A4-17D33C6E7493}" type="datetimeFigureOut">
               <a:rPr lang="en-US" smtClean="0"/>
-              <a:t>10/5/2019</a:t>
+              <a:t>10/6/2019</a:t>
             </a:fld>
             <a:endParaRPr lang="en-US"/>
           </a:p>
@@ -1710,7 +1711,7 @@
           <a:p>
             <a:fld id="{40CF262A-BA9E-4FD4-B7A4-17D33C6E7493}" type="datetimeFigureOut">
               <a:rPr lang="en-US" smtClean="0"/>
-              <a:t>10/5/2019</a:t>
+              <a:t>10/6/2019</a:t>
             </a:fld>
             <a:endParaRPr lang="en-US"/>
           </a:p>
@@ -1805,7 +1806,7 @@
           <a:p>
             <a:fld id="{40CF262A-BA9E-4FD4-B7A4-17D33C6E7493}" type="datetimeFigureOut">
               <a:rPr lang="en-US" smtClean="0"/>
-              <a:t>10/5/2019</a:t>
+              <a:t>10/6/2019</a:t>
             </a:fld>
             <a:endParaRPr lang="en-US"/>
           </a:p>
@@ -2080,7 +2081,7 @@
           <a:p>
             <a:fld id="{40CF262A-BA9E-4FD4-B7A4-17D33C6E7493}" type="datetimeFigureOut">
               <a:rPr lang="en-US" smtClean="0"/>
-              <a:t>10/5/2019</a:t>
+              <a:t>10/6/2019</a:t>
             </a:fld>
             <a:endParaRPr lang="en-US"/>
           </a:p>
@@ -2332,7 +2333,7 @@
           <a:p>
             <a:fld id="{40CF262A-BA9E-4FD4-B7A4-17D33C6E7493}" type="datetimeFigureOut">
               <a:rPr lang="en-US" smtClean="0"/>
-              <a:t>10/5/2019</a:t>
+              <a:t>10/6/2019</a:t>
             </a:fld>
             <a:endParaRPr lang="en-US"/>
           </a:p>
@@ -2543,7 +2544,7 @@
           <a:p>
             <a:fld id="{40CF262A-BA9E-4FD4-B7A4-17D33C6E7493}" type="datetimeFigureOut">
               <a:rPr lang="en-US" smtClean="0"/>
-              <a:t>10/5/2019</a:t>
+              <a:t>10/6/2019</a:t>
             </a:fld>
             <a:endParaRPr lang="en-US"/>
           </a:p>
@@ -3437,8 +3438,8 @@
         </p:nvSpPr>
         <p:spPr>
           <a:xfrm rot="19887021">
-            <a:off x="8554747" y="759509"/>
-            <a:ext cx="1645920" cy="923330"/>
+            <a:off x="8554747" y="898009"/>
+            <a:ext cx="1645920" cy="646331"/>
           </a:xfrm>
           <a:prstGeom prst="rect">
             <a:avLst/>
@@ -3453,7 +3454,7 @@
           <a:p>
             <a:r>
               <a:rPr lang="en-US" dirty="0"/>
-              <a:t>Severe social punishment for non-conformity</a:t>
+              <a:t>Government enforces rules</a:t>
             </a:r>
           </a:p>
         </p:txBody>
@@ -3466,8 +3467,8 @@
         </p:nvSpPr>
         <p:spPr>
           <a:xfrm rot="19814100">
-            <a:off x="8549122" y="2192304"/>
-            <a:ext cx="1828800" cy="923330"/>
+            <a:off x="8549122" y="2330804"/>
+            <a:ext cx="1828800" cy="646331"/>
           </a:xfrm>
           <a:prstGeom prst="rect">
             <a:avLst/>
@@ -3482,7 +3483,7 @@
           <a:p>
             <a:r>
               <a:rPr lang="en-US" dirty="0"/>
-              <a:t>Mild social punishment for non-conformity</a:t>
+              <a:t>Community enforces rules</a:t>
             </a:r>
           </a:p>
         </p:txBody>
@@ -3820,6 +3821,904 @@
     <p:extLst>
       <p:ext uri="{BB962C8B-B14F-4D97-AF65-F5344CB8AC3E}">
         <p14:creationId xmlns:p14="http://schemas.microsoft.com/office/powerpoint/2010/main" val="272336312"/>
+      </p:ext>
+    </p:extLst>
+  </p:cSld>
+  <p:clrMapOvr>
+    <a:masterClrMapping/>
+  </p:clrMapOvr>
+</p:sld>
+</file>
+
+<file path=ppt/slides/slide2.xml><?xml version="1.0" encoding="utf-8"?>
+<p:sld xmlns:a="http://schemas.openxmlformats.org/drawingml/2006/main" xmlns:r="http://schemas.openxmlformats.org/officeDocument/2006/relationships" xmlns:p="http://schemas.openxmlformats.org/presentationml/2006/main">
+  <p:cSld>
+    <p:spTree>
+      <p:nvGrpSpPr>
+        <p:cNvPr id="1" name=""/>
+        <p:cNvGrpSpPr/>
+        <p:nvPr/>
+      </p:nvGrpSpPr>
+      <p:grpSpPr>
+        <a:xfrm>
+          <a:off x="0" y="0"/>
+          <a:ext cx="0" cy="0"/>
+          <a:chOff x="0" y="0"/>
+          <a:chExt cx="0" cy="0"/>
+        </a:xfrm>
+      </p:grpSpPr>
+      <p:sp>
+        <p:nvSpPr>
+          <p:cNvPr id="20" name="Rectangle 19"/>
+          <p:cNvSpPr/>
+          <p:nvPr/>
+        </p:nvSpPr>
+        <p:spPr>
+          <a:xfrm>
+            <a:off x="4825244" y="2111057"/>
+            <a:ext cx="1371600" cy="1371600"/>
+          </a:xfrm>
+          <a:prstGeom prst="rect">
+            <a:avLst/>
+          </a:prstGeom>
+          <a:solidFill>
+            <a:schemeClr val="accent1"/>
+          </a:solidFill>
+          <a:scene3d>
+            <a:camera prst="isometricLeftDown"/>
+            <a:lightRig rig="threePt" dir="t"/>
+          </a:scene3d>
+          <a:sp3d extrusionH="1270000">
+            <a:extrusionClr>
+              <a:schemeClr val="accent5">
+                <a:lumMod val="75000"/>
+              </a:schemeClr>
+            </a:extrusionClr>
+          </a:sp3d>
+        </p:spPr>
+        <p:style>
+          <a:lnRef idx="2">
+            <a:schemeClr val="accent1">
+              <a:shade val="50000"/>
+            </a:schemeClr>
+          </a:lnRef>
+          <a:fillRef idx="1">
+            <a:schemeClr val="accent1"/>
+          </a:fillRef>
+          <a:effectRef idx="0">
+            <a:schemeClr val="accent1"/>
+          </a:effectRef>
+          <a:fontRef idx="minor">
+            <a:schemeClr val="lt1"/>
+          </a:fontRef>
+        </p:style>
+        <p:txBody>
+          <a:bodyPr rtlCol="0" anchor="t"/>
+          <a:lstStyle/>
+          <a:p>
+            <a:pPr algn="ctr"/>
+            <a:endParaRPr lang="en-US" dirty="0"/>
+          </a:p>
+        </p:txBody>
+      </p:sp>
+      <p:sp>
+        <p:nvSpPr>
+          <p:cNvPr id="21" name="Rectangle 20"/>
+          <p:cNvSpPr/>
+          <p:nvPr/>
+        </p:nvSpPr>
+        <p:spPr>
+          <a:xfrm>
+            <a:off x="6101640" y="2917185"/>
+            <a:ext cx="1371600" cy="1371600"/>
+          </a:xfrm>
+          <a:prstGeom prst="rect">
+            <a:avLst/>
+          </a:prstGeom>
+          <a:solidFill>
+            <a:srgbClr val="7030A0"/>
+          </a:solidFill>
+          <a:scene3d>
+            <a:camera prst="isometricLeftDown"/>
+            <a:lightRig rig="threePt" dir="t"/>
+          </a:scene3d>
+          <a:sp3d extrusionH="1270000">
+            <a:extrusionClr>
+              <a:schemeClr val="accent5">
+                <a:lumMod val="50000"/>
+              </a:schemeClr>
+            </a:extrusionClr>
+          </a:sp3d>
+        </p:spPr>
+        <p:style>
+          <a:lnRef idx="2">
+            <a:schemeClr val="accent1">
+              <a:shade val="50000"/>
+            </a:schemeClr>
+          </a:lnRef>
+          <a:fillRef idx="1">
+            <a:schemeClr val="accent1"/>
+          </a:fillRef>
+          <a:effectRef idx="0">
+            <a:schemeClr val="accent1"/>
+          </a:effectRef>
+          <a:fontRef idx="minor">
+            <a:schemeClr val="lt1"/>
+          </a:fontRef>
+        </p:style>
+        <p:txBody>
+          <a:bodyPr rtlCol="0" anchor="ctr"/>
+          <a:lstStyle/>
+          <a:p>
+            <a:pPr algn="ctr"/>
+            <a:r>
+              <a:rPr lang="en-US" dirty="0"/>
+              <a:t>Ethnic Approach</a:t>
+            </a:r>
+          </a:p>
+        </p:txBody>
+      </p:sp>
+      <p:sp>
+        <p:nvSpPr>
+          <p:cNvPr id="18" name="Rectangle 17"/>
+          <p:cNvSpPr/>
+          <p:nvPr/>
+        </p:nvSpPr>
+        <p:spPr>
+          <a:xfrm>
+            <a:off x="4825244" y="714856"/>
+            <a:ext cx="1371600" cy="1371600"/>
+          </a:xfrm>
+          <a:prstGeom prst="rect">
+            <a:avLst/>
+          </a:prstGeom>
+          <a:solidFill>
+            <a:schemeClr val="bg1">
+              <a:lumMod val="65000"/>
+            </a:schemeClr>
+          </a:solidFill>
+          <a:scene3d>
+            <a:camera prst="isometricLeftDown"/>
+            <a:lightRig rig="threePt" dir="t"/>
+          </a:scene3d>
+          <a:sp3d extrusionH="1270000">
+            <a:extrusionClr>
+              <a:schemeClr val="bg1">
+                <a:lumMod val="75000"/>
+              </a:schemeClr>
+            </a:extrusionClr>
+          </a:sp3d>
+        </p:spPr>
+        <p:style>
+          <a:lnRef idx="2">
+            <a:schemeClr val="accent1">
+              <a:shade val="50000"/>
+            </a:schemeClr>
+          </a:lnRef>
+          <a:fillRef idx="1">
+            <a:schemeClr val="accent1"/>
+          </a:fillRef>
+          <a:effectRef idx="0">
+            <a:schemeClr val="accent1"/>
+          </a:effectRef>
+          <a:fontRef idx="minor">
+            <a:schemeClr val="lt1"/>
+          </a:fontRef>
+        </p:style>
+        <p:txBody>
+          <a:bodyPr rtlCol="0" anchor="ctr"/>
+          <a:lstStyle/>
+          <a:p>
+            <a:pPr algn="ctr"/>
+            <a:r>
+              <a:rPr lang="en-US" dirty="0"/>
+              <a:t>Government Approach</a:t>
+            </a:r>
+          </a:p>
+        </p:txBody>
+      </p:sp>
+      <p:sp>
+        <p:nvSpPr>
+          <p:cNvPr id="19" name="Rectangle 18"/>
+          <p:cNvSpPr/>
+          <p:nvPr/>
+        </p:nvSpPr>
+        <p:spPr>
+          <a:xfrm>
+            <a:off x="6101640" y="1520984"/>
+            <a:ext cx="1371600" cy="1371600"/>
+          </a:xfrm>
+          <a:prstGeom prst="rect">
+            <a:avLst/>
+          </a:prstGeom>
+          <a:solidFill>
+            <a:schemeClr val="accent1"/>
+          </a:solidFill>
+          <a:scene3d>
+            <a:camera prst="isometricLeftDown"/>
+            <a:lightRig rig="threePt" dir="t"/>
+          </a:scene3d>
+          <a:sp3d extrusionH="1270000">
+            <a:extrusionClr>
+              <a:schemeClr val="accent5">
+                <a:lumMod val="75000"/>
+              </a:schemeClr>
+            </a:extrusionClr>
+          </a:sp3d>
+        </p:spPr>
+        <p:style>
+          <a:lnRef idx="2">
+            <a:schemeClr val="accent1">
+              <a:shade val="50000"/>
+            </a:schemeClr>
+          </a:lnRef>
+          <a:fillRef idx="1">
+            <a:schemeClr val="accent1"/>
+          </a:fillRef>
+          <a:effectRef idx="0">
+            <a:schemeClr val="accent1"/>
+          </a:effectRef>
+          <a:fontRef idx="minor">
+            <a:schemeClr val="lt1"/>
+          </a:fontRef>
+        </p:style>
+        <p:txBody>
+          <a:bodyPr rtlCol="0" anchor="ctr"/>
+          <a:lstStyle/>
+          <a:p>
+            <a:pPr algn="ctr"/>
+            <a:endParaRPr lang="en-US" dirty="0"/>
+          </a:p>
+        </p:txBody>
+      </p:sp>
+      <p:sp>
+        <p:nvSpPr>
+          <p:cNvPr id="22" name="Rectangle 21"/>
+          <p:cNvSpPr/>
+          <p:nvPr/>
+        </p:nvSpPr>
+        <p:spPr>
+          <a:xfrm>
+            <a:off x="2314544" y="3765848"/>
+            <a:ext cx="1371600" cy="1371600"/>
+          </a:xfrm>
+          <a:prstGeom prst="rect">
+            <a:avLst/>
+          </a:prstGeom>
+          <a:scene3d>
+            <a:camera prst="isometricLeftDown"/>
+            <a:lightRig rig="threePt" dir="t"/>
+          </a:scene3d>
+          <a:sp3d extrusionH="1270000"/>
+        </p:spPr>
+        <p:style>
+          <a:lnRef idx="2">
+            <a:schemeClr val="accent1">
+              <a:shade val="50000"/>
+            </a:schemeClr>
+          </a:lnRef>
+          <a:fillRef idx="1">
+            <a:schemeClr val="accent1"/>
+          </a:fillRef>
+          <a:effectRef idx="0">
+            <a:schemeClr val="accent1"/>
+          </a:effectRef>
+          <a:fontRef idx="minor">
+            <a:schemeClr val="lt1"/>
+          </a:fontRef>
+        </p:style>
+        <p:txBody>
+          <a:bodyPr rtlCol="0" anchor="ctr"/>
+          <a:lstStyle/>
+          <a:p>
+            <a:pPr algn="ctr"/>
+            <a:endParaRPr lang="en-US" dirty="0"/>
+          </a:p>
+        </p:txBody>
+      </p:sp>
+      <p:sp>
+        <p:nvSpPr>
+          <p:cNvPr id="23" name="Rectangle 22"/>
+          <p:cNvSpPr/>
+          <p:nvPr/>
+        </p:nvSpPr>
+        <p:spPr>
+          <a:xfrm>
+            <a:off x="3564098" y="4492750"/>
+            <a:ext cx="1371600" cy="1371600"/>
+          </a:xfrm>
+          <a:prstGeom prst="rect">
+            <a:avLst/>
+          </a:prstGeom>
+          <a:solidFill>
+            <a:schemeClr val="accent4"/>
+          </a:solidFill>
+          <a:scene3d>
+            <a:camera prst="isometricLeftDown"/>
+            <a:lightRig rig="threePt" dir="t"/>
+          </a:scene3d>
+          <a:sp3d extrusionH="1270000">
+            <a:extrusionClr>
+              <a:schemeClr val="accent4">
+                <a:lumMod val="75000"/>
+              </a:schemeClr>
+            </a:extrusionClr>
+          </a:sp3d>
+        </p:spPr>
+        <p:style>
+          <a:lnRef idx="2">
+            <a:schemeClr val="accent1">
+              <a:shade val="50000"/>
+            </a:schemeClr>
+          </a:lnRef>
+          <a:fillRef idx="1">
+            <a:schemeClr val="accent1"/>
+          </a:fillRef>
+          <a:effectRef idx="0">
+            <a:schemeClr val="accent1"/>
+          </a:effectRef>
+          <a:fontRef idx="minor">
+            <a:schemeClr val="lt1"/>
+          </a:fontRef>
+        </p:style>
+        <p:txBody>
+          <a:bodyPr rtlCol="0" anchor="ctr"/>
+          <a:lstStyle/>
+          <a:p>
+            <a:pPr algn="ctr"/>
+            <a:r>
+              <a:rPr lang="en-US" dirty="0"/>
+              <a:t>Consumer</a:t>
+            </a:r>
+          </a:p>
+          <a:p>
+            <a:pPr algn="ctr"/>
+            <a:r>
+              <a:rPr lang="en-US" dirty="0"/>
+              <a:t>Approach</a:t>
+            </a:r>
+          </a:p>
+        </p:txBody>
+      </p:sp>
+      <p:sp>
+        <p:nvSpPr>
+          <p:cNvPr id="29" name="TextBox 28"/>
+          <p:cNvSpPr txBox="1"/>
+          <p:nvPr/>
+        </p:nvSpPr>
+        <p:spPr>
+          <a:xfrm rot="19705333">
+            <a:off x="5993001" y="4827571"/>
+            <a:ext cx="1828800" cy="369332"/>
+          </a:xfrm>
+          <a:prstGeom prst="rect">
+            <a:avLst/>
+          </a:prstGeom>
+          <a:noFill/>
+        </p:spPr>
+        <p:txBody>
+          <a:bodyPr wrap="square" rtlCol="0">
+            <a:spAutoFit/>
+          </a:bodyPr>
+          <a:lstStyle/>
+          <a:p>
+            <a:pPr algn="ctr"/>
+            <a:r>
+              <a:rPr lang="en-US" b="1" dirty="0"/>
+              <a:t>Membership</a:t>
+            </a:r>
+          </a:p>
+        </p:txBody>
+      </p:sp>
+      <p:sp>
+        <p:nvSpPr>
+          <p:cNvPr id="30" name="TextBox 29"/>
+          <p:cNvSpPr txBox="1"/>
+          <p:nvPr/>
+        </p:nvSpPr>
+        <p:spPr>
+          <a:xfrm rot="2239251">
+            <a:off x="7664732" y="4614208"/>
+            <a:ext cx="1371600" cy="379828"/>
+          </a:xfrm>
+          <a:prstGeom prst="rect">
+            <a:avLst/>
+          </a:prstGeom>
+          <a:noFill/>
+        </p:spPr>
+        <p:txBody>
+          <a:bodyPr wrap="square" rtlCol="0">
+            <a:spAutoFit/>
+          </a:bodyPr>
+          <a:lstStyle/>
+          <a:p>
+            <a:r>
+              <a:rPr lang="en-US" dirty="0"/>
+              <a:t>Exclusive</a:t>
+            </a:r>
+          </a:p>
+        </p:txBody>
+      </p:sp>
+      <p:sp>
+        <p:nvSpPr>
+          <p:cNvPr id="31" name="TextBox 30"/>
+          <p:cNvSpPr txBox="1"/>
+          <p:nvPr/>
+        </p:nvSpPr>
+        <p:spPr>
+          <a:xfrm rot="2300708">
+            <a:off x="5006913" y="6130548"/>
+            <a:ext cx="1371600" cy="379828"/>
+          </a:xfrm>
+          <a:prstGeom prst="rect">
+            <a:avLst/>
+          </a:prstGeom>
+          <a:noFill/>
+        </p:spPr>
+        <p:txBody>
+          <a:bodyPr wrap="square" rtlCol="0">
+            <a:spAutoFit/>
+          </a:bodyPr>
+          <a:lstStyle/>
+          <a:p>
+            <a:r>
+              <a:rPr lang="en-US" dirty="0"/>
+              <a:t>Inclusive</a:t>
+            </a:r>
+          </a:p>
+        </p:txBody>
+      </p:sp>
+      <p:sp>
+        <p:nvSpPr>
+          <p:cNvPr id="32" name="TextBox 31"/>
+          <p:cNvSpPr txBox="1"/>
+          <p:nvPr/>
+        </p:nvSpPr>
+        <p:spPr>
+          <a:xfrm rot="1851826">
+            <a:off x="2615296" y="5288868"/>
+            <a:ext cx="1371600" cy="379828"/>
+          </a:xfrm>
+          <a:prstGeom prst="rect">
+            <a:avLst/>
+          </a:prstGeom>
+          <a:noFill/>
+        </p:spPr>
+        <p:txBody>
+          <a:bodyPr wrap="square" rtlCol="0">
+            <a:spAutoFit/>
+          </a:bodyPr>
+          <a:lstStyle/>
+          <a:p>
+            <a:pPr algn="ctr"/>
+            <a:r>
+              <a:rPr lang="en-US" b="1" dirty="0"/>
+              <a:t>Rules</a:t>
+            </a:r>
+          </a:p>
+        </p:txBody>
+      </p:sp>
+      <p:sp>
+        <p:nvSpPr>
+          <p:cNvPr id="33" name="TextBox 32"/>
+          <p:cNvSpPr txBox="1"/>
+          <p:nvPr/>
+        </p:nvSpPr>
+        <p:spPr>
+          <a:xfrm rot="16200000">
+            <a:off x="7477022" y="2176624"/>
+            <a:ext cx="1828800" cy="379828"/>
+          </a:xfrm>
+          <a:prstGeom prst="rect">
+            <a:avLst/>
+          </a:prstGeom>
+          <a:noFill/>
+        </p:spPr>
+        <p:txBody>
+          <a:bodyPr wrap="square" rtlCol="0">
+            <a:spAutoFit/>
+          </a:bodyPr>
+          <a:lstStyle/>
+          <a:p>
+            <a:pPr algn="ctr"/>
+            <a:r>
+              <a:rPr lang="en-US" b="1" dirty="0"/>
+              <a:t>Accountability</a:t>
+            </a:r>
+          </a:p>
+        </p:txBody>
+      </p:sp>
+      <p:sp>
+        <p:nvSpPr>
+          <p:cNvPr id="34" name="TextBox 33"/>
+          <p:cNvSpPr txBox="1"/>
+          <p:nvPr/>
+        </p:nvSpPr>
+        <p:spPr>
+          <a:xfrm rot="19887021">
+            <a:off x="8538070" y="832456"/>
+            <a:ext cx="1920240" cy="646331"/>
+          </a:xfrm>
+          <a:prstGeom prst="rect">
+            <a:avLst/>
+          </a:prstGeom>
+          <a:noFill/>
+        </p:spPr>
+        <p:txBody>
+          <a:bodyPr wrap="square" rtlCol="0">
+            <a:spAutoFit/>
+          </a:bodyPr>
+          <a:lstStyle/>
+          <a:p>
+            <a:r>
+              <a:rPr lang="en-US" dirty="0"/>
+              <a:t>Nonconformity severely punished</a:t>
+            </a:r>
+          </a:p>
+        </p:txBody>
+      </p:sp>
+      <p:sp>
+        <p:nvSpPr>
+          <p:cNvPr id="35" name="TextBox 34"/>
+          <p:cNvSpPr txBox="1"/>
+          <p:nvPr/>
+        </p:nvSpPr>
+        <p:spPr>
+          <a:xfrm rot="19814100">
+            <a:off x="8549122" y="2330804"/>
+            <a:ext cx="1828800" cy="646331"/>
+          </a:xfrm>
+          <a:prstGeom prst="rect">
+            <a:avLst/>
+          </a:prstGeom>
+          <a:noFill/>
+        </p:spPr>
+        <p:txBody>
+          <a:bodyPr wrap="square" rtlCol="0">
+            <a:spAutoFit/>
+          </a:bodyPr>
+          <a:lstStyle/>
+          <a:p>
+            <a:r>
+              <a:rPr lang="en-US" dirty="0"/>
+              <a:t>Nonconformity mildly punished</a:t>
+            </a:r>
+          </a:p>
+        </p:txBody>
+      </p:sp>
+      <p:sp>
+        <p:nvSpPr>
+          <p:cNvPr id="36" name="TextBox 35"/>
+          <p:cNvSpPr txBox="1"/>
+          <p:nvPr/>
+        </p:nvSpPr>
+        <p:spPr>
+          <a:xfrm rot="19226394">
+            <a:off x="1166951" y="5187961"/>
+            <a:ext cx="1828800" cy="923330"/>
+          </a:xfrm>
+          <a:prstGeom prst="rect">
+            <a:avLst/>
+          </a:prstGeom>
+          <a:noFill/>
+        </p:spPr>
+        <p:txBody>
+          <a:bodyPr wrap="square" rtlCol="0">
+            <a:spAutoFit/>
+          </a:bodyPr>
+          <a:lstStyle/>
+          <a:p>
+            <a:pPr algn="r"/>
+            <a:r>
+              <a:rPr lang="en-US" dirty="0"/>
+              <a:t>Strict</a:t>
+            </a:r>
+            <a:br>
+              <a:rPr lang="en-US" dirty="0"/>
+            </a:br>
+            <a:r>
+              <a:rPr lang="en-US" dirty="0"/>
+              <a:t> Adherence Expected</a:t>
+            </a:r>
+          </a:p>
+        </p:txBody>
+      </p:sp>
+      <p:sp>
+        <p:nvSpPr>
+          <p:cNvPr id="37" name="TextBox 36"/>
+          <p:cNvSpPr txBox="1"/>
+          <p:nvPr/>
+        </p:nvSpPr>
+        <p:spPr>
+          <a:xfrm rot="19216229">
+            <a:off x="2706027" y="5912452"/>
+            <a:ext cx="1645920" cy="923330"/>
+          </a:xfrm>
+          <a:prstGeom prst="rect">
+            <a:avLst/>
+          </a:prstGeom>
+          <a:noFill/>
+        </p:spPr>
+        <p:txBody>
+          <a:bodyPr wrap="square" rtlCol="0">
+            <a:spAutoFit/>
+          </a:bodyPr>
+          <a:lstStyle/>
+          <a:p>
+            <a:pPr algn="r"/>
+            <a:r>
+              <a:rPr lang="en-US" dirty="0"/>
+              <a:t>Loose Adherence Allowed</a:t>
+            </a:r>
+          </a:p>
+        </p:txBody>
+      </p:sp>
+      <p:sp>
+        <p:nvSpPr>
+          <p:cNvPr id="24" name="Rectangle 23"/>
+          <p:cNvSpPr/>
+          <p:nvPr/>
+        </p:nvSpPr>
+        <p:spPr>
+          <a:xfrm>
+            <a:off x="2313117" y="2339425"/>
+            <a:ext cx="1371600" cy="1371600"/>
+          </a:xfrm>
+          <a:prstGeom prst="rect">
+            <a:avLst/>
+          </a:prstGeom>
+          <a:solidFill>
+            <a:schemeClr val="accent6"/>
+          </a:solidFill>
+          <a:scene3d>
+            <a:camera prst="isometricLeftDown"/>
+            <a:lightRig rig="threePt" dir="t"/>
+          </a:scene3d>
+          <a:sp3d extrusionH="1270000">
+            <a:extrusionClr>
+              <a:schemeClr val="accent6">
+                <a:lumMod val="75000"/>
+              </a:schemeClr>
+            </a:extrusionClr>
+          </a:sp3d>
+        </p:spPr>
+        <p:style>
+          <a:lnRef idx="2">
+            <a:schemeClr val="accent1">
+              <a:shade val="50000"/>
+            </a:schemeClr>
+          </a:lnRef>
+          <a:fillRef idx="1">
+            <a:schemeClr val="accent1"/>
+          </a:fillRef>
+          <a:effectRef idx="0">
+            <a:schemeClr val="accent1"/>
+          </a:effectRef>
+          <a:fontRef idx="minor">
+            <a:schemeClr val="lt1"/>
+          </a:fontRef>
+        </p:style>
+        <p:txBody>
+          <a:bodyPr rtlCol="0" anchor="ctr"/>
+          <a:lstStyle/>
+          <a:p>
+            <a:pPr algn="ctr"/>
+            <a:r>
+              <a:rPr lang="en-US" dirty="0"/>
+              <a:t>Business Approach</a:t>
+            </a:r>
+          </a:p>
+        </p:txBody>
+      </p:sp>
+      <p:sp>
+        <p:nvSpPr>
+          <p:cNvPr id="25" name="Rectangle 24"/>
+          <p:cNvSpPr/>
+          <p:nvPr/>
+        </p:nvSpPr>
+        <p:spPr>
+          <a:xfrm>
+            <a:off x="3564098" y="3059838"/>
+            <a:ext cx="1371600" cy="1371600"/>
+          </a:xfrm>
+          <a:prstGeom prst="rect">
+            <a:avLst/>
+          </a:prstGeom>
+          <a:scene3d>
+            <a:camera prst="isometricLeftDown"/>
+            <a:lightRig rig="threePt" dir="t"/>
+          </a:scene3d>
+          <a:sp3d extrusionH="1270000"/>
+        </p:spPr>
+        <p:style>
+          <a:lnRef idx="2">
+            <a:schemeClr val="accent1">
+              <a:shade val="50000"/>
+            </a:schemeClr>
+          </a:lnRef>
+          <a:fillRef idx="1">
+            <a:schemeClr val="accent1"/>
+          </a:fillRef>
+          <a:effectRef idx="0">
+            <a:schemeClr val="accent1"/>
+          </a:effectRef>
+          <a:fontRef idx="minor">
+            <a:schemeClr val="lt1"/>
+          </a:fontRef>
+        </p:style>
+        <p:txBody>
+          <a:bodyPr rtlCol="0" anchor="ctr"/>
+          <a:lstStyle/>
+          <a:p>
+            <a:pPr algn="ctr"/>
+            <a:endParaRPr lang="en-US"/>
+          </a:p>
+        </p:txBody>
+      </p:sp>
+      <p:sp>
+        <p:nvSpPr>
+          <p:cNvPr id="38" name="Freeform: Shape 37"/>
+          <p:cNvSpPr/>
+          <p:nvPr/>
+        </p:nvSpPr>
+        <p:spPr>
+          <a:xfrm>
+            <a:off x="1633483" y="3263711"/>
+            <a:ext cx="7793501" cy="2799470"/>
+          </a:xfrm>
+          <a:custGeom>
+            <a:avLst/>
+            <a:gdLst>
+              <a:gd name="connsiteX0" fmla="*/ 0 w 7793501"/>
+              <a:gd name="connsiteY0" fmla="*/ 1012873 h 2799470"/>
+              <a:gd name="connsiteX1" fmla="*/ 3108960 w 7793501"/>
+              <a:gd name="connsiteY1" fmla="*/ 2799470 h 2799470"/>
+              <a:gd name="connsiteX2" fmla="*/ 7793501 w 7793501"/>
+              <a:gd name="connsiteY2" fmla="*/ 0 h 2799470"/>
+            </a:gdLst>
+            <a:ahLst/>
+            <a:cxnLst>
+              <a:cxn ang="0">
+                <a:pos x="connsiteX0" y="connsiteY0"/>
+              </a:cxn>
+              <a:cxn ang="0">
+                <a:pos x="connsiteX1" y="connsiteY1"/>
+              </a:cxn>
+              <a:cxn ang="0">
+                <a:pos x="connsiteX2" y="connsiteY2"/>
+              </a:cxn>
+            </a:cxnLst>
+            <a:rect l="l" t="t" r="r" b="b"/>
+            <a:pathLst>
+              <a:path w="7793501" h="2799470">
+                <a:moveTo>
+                  <a:pt x="0" y="1012873"/>
+                </a:moveTo>
+                <a:lnTo>
+                  <a:pt x="3108960" y="2799470"/>
+                </a:lnTo>
+                <a:lnTo>
+                  <a:pt x="7793501" y="0"/>
+                </a:lnTo>
+              </a:path>
+            </a:pathLst>
+          </a:custGeom>
+          <a:noFill/>
+          <a:ln w="25400">
+            <a:solidFill>
+              <a:schemeClr val="tx1"/>
+            </a:solidFill>
+            <a:headEnd type="triangle" w="lg" len="med"/>
+            <a:tailEnd type="triangle" w="lg" len="med"/>
+          </a:ln>
+        </p:spPr>
+        <p:style>
+          <a:lnRef idx="2">
+            <a:schemeClr val="accent1">
+              <a:shade val="50000"/>
+            </a:schemeClr>
+          </a:lnRef>
+          <a:fillRef idx="1">
+            <a:schemeClr val="accent1"/>
+          </a:fillRef>
+          <a:effectRef idx="0">
+            <a:schemeClr val="accent1"/>
+          </a:effectRef>
+          <a:fontRef idx="minor">
+            <a:schemeClr val="lt1"/>
+          </a:fontRef>
+        </p:style>
+        <p:txBody>
+          <a:bodyPr rtlCol="0" anchor="ctr"/>
+          <a:lstStyle/>
+          <a:p>
+            <a:pPr algn="ctr"/>
+            <a:endParaRPr lang="en-US"/>
+          </a:p>
+        </p:txBody>
+      </p:sp>
+      <p:cxnSp>
+        <p:nvCxnSpPr>
+          <p:cNvPr id="40" name="Straight Arrow Connector 39"/>
+          <p:cNvCxnSpPr>
+            <a:stCxn id="38" idx="1"/>
+          </p:cNvCxnSpPr>
+          <p:nvPr/>
+        </p:nvCxnSpPr>
+        <p:spPr>
+          <a:xfrm flipV="1">
+            <a:off x="4742443" y="1068430"/>
+            <a:ext cx="0" cy="4994751"/>
+          </a:xfrm>
+          <a:prstGeom prst="straightConnector1">
+            <a:avLst/>
+          </a:prstGeom>
+          <a:ln w="25400">
+            <a:solidFill>
+              <a:schemeClr val="bg2">
+                <a:lumMod val="50000"/>
+              </a:schemeClr>
+            </a:solidFill>
+            <a:tailEnd type="triangle" w="lg" len="med"/>
+          </a:ln>
+        </p:spPr>
+        <p:style>
+          <a:lnRef idx="1">
+            <a:schemeClr val="accent1"/>
+          </a:lnRef>
+          <a:fillRef idx="0">
+            <a:schemeClr val="accent1"/>
+          </a:fillRef>
+          <a:effectRef idx="0">
+            <a:schemeClr val="accent1"/>
+          </a:effectRef>
+          <a:fontRef idx="minor">
+            <a:schemeClr val="tx1"/>
+          </a:fontRef>
+        </p:style>
+      </p:cxnSp>
+      <p:cxnSp>
+        <p:nvCxnSpPr>
+          <p:cNvPr id="26" name="Straight Arrow Connector 25"/>
+          <p:cNvCxnSpPr/>
+          <p:nvPr/>
+        </p:nvCxnSpPr>
+        <p:spPr>
+          <a:xfrm flipV="1">
+            <a:off x="8201508" y="317782"/>
+            <a:ext cx="0" cy="3657600"/>
+          </a:xfrm>
+          <a:prstGeom prst="straightConnector1">
+            <a:avLst/>
+          </a:prstGeom>
+          <a:ln w="25400">
+            <a:solidFill>
+              <a:schemeClr val="bg2">
+                <a:lumMod val="50000"/>
+              </a:schemeClr>
+            </a:solidFill>
+            <a:tailEnd type="triangle" w="lg" len="med"/>
+          </a:ln>
+        </p:spPr>
+        <p:style>
+          <a:lnRef idx="1">
+            <a:schemeClr val="accent1"/>
+          </a:lnRef>
+          <a:fillRef idx="0">
+            <a:schemeClr val="accent1"/>
+          </a:fillRef>
+          <a:effectRef idx="0">
+            <a:schemeClr val="accent1"/>
+          </a:effectRef>
+          <a:fontRef idx="minor">
+            <a:schemeClr val="tx1"/>
+          </a:fontRef>
+        </p:style>
+      </p:cxnSp>
+    </p:spTree>
+    <p:extLst>
+      <p:ext uri="{BB962C8B-B14F-4D97-AF65-F5344CB8AC3E}">
+        <p14:creationId xmlns:p14="http://schemas.microsoft.com/office/powerpoint/2010/main" val="2273035398"/>
       </p:ext>
     </p:extLst>
   </p:cSld>

</xml_diff>

<commit_message>
Updated Monti framework for understanding community
</commit_message>
<xml_diff>
--- a/Notes/SOC5060_Framework_Monti_MakingCommunity_2019v00.pptx
+++ b/Notes/SOC5060_Framework_Monti_MakingCommunity_2019v00.pptx
@@ -242,7 +242,7 @@
           <a:p>
             <a:fld id="{40CF262A-BA9E-4FD4-B7A4-17D33C6E7493}" type="datetimeFigureOut">
               <a:rPr lang="en-US" smtClean="0"/>
-              <a:t>10/6/2019</a:t>
+              <a:t>10/9/2019</a:t>
             </a:fld>
             <a:endParaRPr lang="en-US"/>
           </a:p>
@@ -410,7 +410,7 @@
           <a:p>
             <a:fld id="{40CF262A-BA9E-4FD4-B7A4-17D33C6E7493}" type="datetimeFigureOut">
               <a:rPr lang="en-US" smtClean="0"/>
-              <a:t>10/6/2019</a:t>
+              <a:t>10/9/2019</a:t>
             </a:fld>
             <a:endParaRPr lang="en-US"/>
           </a:p>
@@ -588,7 +588,7 @@
           <a:p>
             <a:fld id="{40CF262A-BA9E-4FD4-B7A4-17D33C6E7493}" type="datetimeFigureOut">
               <a:rPr lang="en-US" smtClean="0"/>
-              <a:t>10/6/2019</a:t>
+              <a:t>10/9/2019</a:t>
             </a:fld>
             <a:endParaRPr lang="en-US"/>
           </a:p>
@@ -756,7 +756,7 @@
           <a:p>
             <a:fld id="{40CF262A-BA9E-4FD4-B7A4-17D33C6E7493}" type="datetimeFigureOut">
               <a:rPr lang="en-US" smtClean="0"/>
-              <a:t>10/6/2019</a:t>
+              <a:t>10/9/2019</a:t>
             </a:fld>
             <a:endParaRPr lang="en-US"/>
           </a:p>
@@ -1001,7 +1001,7 @@
           <a:p>
             <a:fld id="{40CF262A-BA9E-4FD4-B7A4-17D33C6E7493}" type="datetimeFigureOut">
               <a:rPr lang="en-US" smtClean="0"/>
-              <a:t>10/6/2019</a:t>
+              <a:t>10/9/2019</a:t>
             </a:fld>
             <a:endParaRPr lang="en-US"/>
           </a:p>
@@ -1230,7 +1230,7 @@
           <a:p>
             <a:fld id="{40CF262A-BA9E-4FD4-B7A4-17D33C6E7493}" type="datetimeFigureOut">
               <a:rPr lang="en-US" smtClean="0"/>
-              <a:t>10/6/2019</a:t>
+              <a:t>10/9/2019</a:t>
             </a:fld>
             <a:endParaRPr lang="en-US"/>
           </a:p>
@@ -1594,7 +1594,7 @@
           <a:p>
             <a:fld id="{40CF262A-BA9E-4FD4-B7A4-17D33C6E7493}" type="datetimeFigureOut">
               <a:rPr lang="en-US" smtClean="0"/>
-              <a:t>10/6/2019</a:t>
+              <a:t>10/9/2019</a:t>
             </a:fld>
             <a:endParaRPr lang="en-US"/>
           </a:p>
@@ -1711,7 +1711,7 @@
           <a:p>
             <a:fld id="{40CF262A-BA9E-4FD4-B7A4-17D33C6E7493}" type="datetimeFigureOut">
               <a:rPr lang="en-US" smtClean="0"/>
-              <a:t>10/6/2019</a:t>
+              <a:t>10/9/2019</a:t>
             </a:fld>
             <a:endParaRPr lang="en-US"/>
           </a:p>
@@ -1806,7 +1806,7 @@
           <a:p>
             <a:fld id="{40CF262A-BA9E-4FD4-B7A4-17D33C6E7493}" type="datetimeFigureOut">
               <a:rPr lang="en-US" smtClean="0"/>
-              <a:t>10/6/2019</a:t>
+              <a:t>10/9/2019</a:t>
             </a:fld>
             <a:endParaRPr lang="en-US"/>
           </a:p>
@@ -2081,7 +2081,7 @@
           <a:p>
             <a:fld id="{40CF262A-BA9E-4FD4-B7A4-17D33C6E7493}" type="datetimeFigureOut">
               <a:rPr lang="en-US" smtClean="0"/>
-              <a:t>10/6/2019</a:t>
+              <a:t>10/9/2019</a:t>
             </a:fld>
             <a:endParaRPr lang="en-US"/>
           </a:p>
@@ -2333,7 +2333,7 @@
           <a:p>
             <a:fld id="{40CF262A-BA9E-4FD4-B7A4-17D33C6E7493}" type="datetimeFigureOut">
               <a:rPr lang="en-US" smtClean="0"/>
-              <a:t>10/6/2019</a:t>
+              <a:t>10/9/2019</a:t>
             </a:fld>
             <a:endParaRPr lang="en-US"/>
           </a:p>
@@ -2544,7 +2544,7 @@
           <a:p>
             <a:fld id="{40CF262A-BA9E-4FD4-B7A4-17D33C6E7493}" type="datetimeFigureOut">
               <a:rPr lang="en-US" smtClean="0"/>
-              <a:t>10/6/2019</a:t>
+              <a:t>10/9/2019</a:t>
             </a:fld>
             <a:endParaRPr lang="en-US"/>
           </a:p>
@@ -2951,124 +2951,13 @@
       </p:grpSpPr>
       <p:sp>
         <p:nvSpPr>
-          <p:cNvPr id="20" name="Rectangle 19"/>
-          <p:cNvSpPr/>
-          <p:nvPr/>
-        </p:nvSpPr>
-        <p:spPr>
-          <a:xfrm>
-            <a:off x="4825244" y="2111057"/>
-            <a:ext cx="1371600" cy="1371600"/>
-          </a:xfrm>
-          <a:prstGeom prst="rect">
-            <a:avLst/>
-          </a:prstGeom>
-          <a:solidFill>
-            <a:schemeClr val="accent1"/>
-          </a:solidFill>
-          <a:scene3d>
-            <a:camera prst="isometricLeftDown"/>
-            <a:lightRig rig="threePt" dir="t"/>
-          </a:scene3d>
-          <a:sp3d extrusionH="1270000">
-            <a:extrusionClr>
-              <a:schemeClr val="accent5">
-                <a:lumMod val="75000"/>
-              </a:schemeClr>
-            </a:extrusionClr>
-          </a:sp3d>
-        </p:spPr>
-        <p:style>
-          <a:lnRef idx="2">
-            <a:schemeClr val="accent1">
-              <a:shade val="50000"/>
-            </a:schemeClr>
-          </a:lnRef>
-          <a:fillRef idx="1">
-            <a:schemeClr val="accent1"/>
-          </a:fillRef>
-          <a:effectRef idx="0">
-            <a:schemeClr val="accent1"/>
-          </a:effectRef>
-          <a:fontRef idx="minor">
-            <a:schemeClr val="lt1"/>
-          </a:fontRef>
-        </p:style>
-        <p:txBody>
-          <a:bodyPr rtlCol="0" anchor="t"/>
-          <a:lstStyle/>
-          <a:p>
-            <a:pPr algn="ctr"/>
-            <a:endParaRPr lang="en-US" dirty="0"/>
-          </a:p>
-        </p:txBody>
-      </p:sp>
-      <p:sp>
-        <p:nvSpPr>
-          <p:cNvPr id="21" name="Rectangle 20"/>
-          <p:cNvSpPr/>
-          <p:nvPr/>
-        </p:nvSpPr>
-        <p:spPr>
-          <a:xfrm>
-            <a:off x="6101640" y="2917185"/>
-            <a:ext cx="1371600" cy="1371600"/>
-          </a:xfrm>
-          <a:prstGeom prst="rect">
-            <a:avLst/>
-          </a:prstGeom>
-          <a:solidFill>
-            <a:srgbClr val="7030A0"/>
-          </a:solidFill>
-          <a:scene3d>
-            <a:camera prst="isometricLeftDown"/>
-            <a:lightRig rig="threePt" dir="t"/>
-          </a:scene3d>
-          <a:sp3d extrusionH="1270000">
-            <a:extrusionClr>
-              <a:schemeClr val="accent5">
-                <a:lumMod val="50000"/>
-              </a:schemeClr>
-            </a:extrusionClr>
-          </a:sp3d>
-        </p:spPr>
-        <p:style>
-          <a:lnRef idx="2">
-            <a:schemeClr val="accent1">
-              <a:shade val="50000"/>
-            </a:schemeClr>
-          </a:lnRef>
-          <a:fillRef idx="1">
-            <a:schemeClr val="accent1"/>
-          </a:fillRef>
-          <a:effectRef idx="0">
-            <a:schemeClr val="accent1"/>
-          </a:effectRef>
-          <a:fontRef idx="minor">
-            <a:schemeClr val="lt1"/>
-          </a:fontRef>
-        </p:style>
-        <p:txBody>
-          <a:bodyPr rtlCol="0" anchor="ctr"/>
-          <a:lstStyle/>
-          <a:p>
-            <a:pPr algn="ctr"/>
-            <a:r>
-              <a:rPr lang="en-US" dirty="0"/>
-              <a:t>Ethnic Approach</a:t>
-            </a:r>
-          </a:p>
-        </p:txBody>
-      </p:sp>
-      <p:sp>
-        <p:nvSpPr>
           <p:cNvPr id="18" name="Rectangle 17"/>
           <p:cNvSpPr/>
           <p:nvPr/>
         </p:nvSpPr>
         <p:spPr>
           <a:xfrm>
-            <a:off x="4825244" y="714856"/>
+            <a:off x="4833633" y="2224876"/>
             <a:ext cx="1371600" cy="1371600"/>
           </a:xfrm>
           <a:prstGeom prst="rect">
@@ -3108,7 +2997,7 @@
           </a:fontRef>
         </p:style>
         <p:txBody>
-          <a:bodyPr rtlCol="0" anchor="ctr"/>
+          <a:bodyPr rtlCol="0" anchor="t"/>
           <a:lstStyle/>
           <a:p>
             <a:pPr algn="ctr"/>
@@ -3121,13 +3010,13 @@
       </p:sp>
       <p:sp>
         <p:nvSpPr>
-          <p:cNvPr id="19" name="Rectangle 18"/>
+          <p:cNvPr id="20" name="Rectangle 19"/>
           <p:cNvSpPr/>
           <p:nvPr/>
         </p:nvSpPr>
         <p:spPr>
           <a:xfrm>
-            <a:off x="6101640" y="1520984"/>
+            <a:off x="4844433" y="838737"/>
             <a:ext cx="1371600" cy="1371600"/>
           </a:xfrm>
           <a:prstGeom prst="rect">
@@ -3165,6 +3054,117 @@
           </a:fontRef>
         </p:style>
         <p:txBody>
+          <a:bodyPr rtlCol="0" anchor="t"/>
+          <a:lstStyle/>
+          <a:p>
+            <a:pPr algn="ctr"/>
+            <a:endParaRPr lang="en-US" dirty="0"/>
+          </a:p>
+        </p:txBody>
+      </p:sp>
+      <p:sp>
+        <p:nvSpPr>
+          <p:cNvPr id="21" name="Rectangle 20"/>
+          <p:cNvSpPr/>
+          <p:nvPr/>
+        </p:nvSpPr>
+        <p:spPr>
+          <a:xfrm>
+            <a:off x="6110029" y="2959130"/>
+            <a:ext cx="1371600" cy="1371600"/>
+          </a:xfrm>
+          <a:prstGeom prst="rect">
+            <a:avLst/>
+          </a:prstGeom>
+          <a:solidFill>
+            <a:srgbClr val="7030A0"/>
+          </a:solidFill>
+          <a:scene3d>
+            <a:camera prst="isometricLeftDown"/>
+            <a:lightRig rig="threePt" dir="t"/>
+          </a:scene3d>
+          <a:sp3d extrusionH="1270000">
+            <a:extrusionClr>
+              <a:schemeClr val="accent5">
+                <a:lumMod val="50000"/>
+              </a:schemeClr>
+            </a:extrusionClr>
+          </a:sp3d>
+        </p:spPr>
+        <p:style>
+          <a:lnRef idx="2">
+            <a:schemeClr val="accent1">
+              <a:shade val="50000"/>
+            </a:schemeClr>
+          </a:lnRef>
+          <a:fillRef idx="1">
+            <a:schemeClr val="accent1"/>
+          </a:fillRef>
+          <a:effectRef idx="0">
+            <a:schemeClr val="accent1"/>
+          </a:effectRef>
+          <a:fontRef idx="minor">
+            <a:schemeClr val="lt1"/>
+          </a:fontRef>
+        </p:style>
+        <p:txBody>
+          <a:bodyPr rtlCol="0" anchor="ctr"/>
+          <a:lstStyle/>
+          <a:p>
+            <a:pPr algn="ctr"/>
+            <a:r>
+              <a:rPr lang="en-US" dirty="0"/>
+              <a:t>Ethnic Approach</a:t>
+            </a:r>
+          </a:p>
+        </p:txBody>
+      </p:sp>
+      <p:sp>
+        <p:nvSpPr>
+          <p:cNvPr id="19" name="Rectangle 18"/>
+          <p:cNvSpPr/>
+          <p:nvPr/>
+        </p:nvSpPr>
+        <p:spPr>
+          <a:xfrm>
+            <a:off x="6110029" y="1562929"/>
+            <a:ext cx="1371600" cy="1371600"/>
+          </a:xfrm>
+          <a:prstGeom prst="rect">
+            <a:avLst/>
+          </a:prstGeom>
+          <a:solidFill>
+            <a:schemeClr val="accent1"/>
+          </a:solidFill>
+          <a:scene3d>
+            <a:camera prst="isometricLeftDown"/>
+            <a:lightRig rig="threePt" dir="t"/>
+          </a:scene3d>
+          <a:sp3d extrusionH="1270000">
+            <a:extrusionClr>
+              <a:schemeClr val="accent5">
+                <a:lumMod val="75000"/>
+              </a:schemeClr>
+            </a:extrusionClr>
+          </a:sp3d>
+        </p:spPr>
+        <p:style>
+          <a:lnRef idx="2">
+            <a:schemeClr val="accent1">
+              <a:shade val="50000"/>
+            </a:schemeClr>
+          </a:lnRef>
+          <a:fillRef idx="1">
+            <a:schemeClr val="accent1"/>
+          </a:fillRef>
+          <a:effectRef idx="0">
+            <a:schemeClr val="accent1"/>
+          </a:effectRef>
+          <a:fontRef idx="minor">
+            <a:schemeClr val="lt1"/>
+          </a:fontRef>
+        </p:style>
+        <p:txBody>
           <a:bodyPr rtlCol="0" anchor="ctr"/>
           <a:lstStyle/>
           <a:p>
@@ -3220,70 +3220,6 @@
       </p:sp>
       <p:sp>
         <p:nvSpPr>
-          <p:cNvPr id="23" name="Rectangle 22"/>
-          <p:cNvSpPr/>
-          <p:nvPr/>
-        </p:nvSpPr>
-        <p:spPr>
-          <a:xfrm>
-            <a:off x="3564098" y="4492750"/>
-            <a:ext cx="1371600" cy="1371600"/>
-          </a:xfrm>
-          <a:prstGeom prst="rect">
-            <a:avLst/>
-          </a:prstGeom>
-          <a:solidFill>
-            <a:schemeClr val="accent4"/>
-          </a:solidFill>
-          <a:scene3d>
-            <a:camera prst="isometricLeftDown"/>
-            <a:lightRig rig="threePt" dir="t"/>
-          </a:scene3d>
-          <a:sp3d extrusionH="1270000">
-            <a:extrusionClr>
-              <a:schemeClr val="accent4">
-                <a:lumMod val="75000"/>
-              </a:schemeClr>
-            </a:extrusionClr>
-          </a:sp3d>
-        </p:spPr>
-        <p:style>
-          <a:lnRef idx="2">
-            <a:schemeClr val="accent1">
-              <a:shade val="50000"/>
-            </a:schemeClr>
-          </a:lnRef>
-          <a:fillRef idx="1">
-            <a:schemeClr val="accent1"/>
-          </a:fillRef>
-          <a:effectRef idx="0">
-            <a:schemeClr val="accent1"/>
-          </a:effectRef>
-          <a:fontRef idx="minor">
-            <a:schemeClr val="lt1"/>
-          </a:fontRef>
-        </p:style>
-        <p:txBody>
-          <a:bodyPr rtlCol="0" anchor="ctr"/>
-          <a:lstStyle/>
-          <a:p>
-            <a:pPr algn="ctr"/>
-            <a:r>
-              <a:rPr lang="en-US" dirty="0"/>
-              <a:t>Consumer</a:t>
-            </a:r>
-          </a:p>
-          <a:p>
-            <a:pPr algn="ctr"/>
-            <a:r>
-              <a:rPr lang="en-US" dirty="0"/>
-              <a:t>Approach</a:t>
-            </a:r>
-          </a:p>
-        </p:txBody>
-      </p:sp>
-      <p:sp>
-        <p:nvSpPr>
           <p:cNvPr id="29" name="TextBox 28"/>
           <p:cNvSpPr txBox="1"/>
           <p:nvPr/>
@@ -3320,8 +3256,8 @@
         </p:nvSpPr>
         <p:spPr>
           <a:xfrm rot="2239251">
-            <a:off x="7664732" y="4614208"/>
-            <a:ext cx="1371600" cy="379828"/>
+            <a:off x="7664732" y="4480957"/>
+            <a:ext cx="1371600" cy="646331"/>
           </a:xfrm>
           <a:prstGeom prst="rect">
             <a:avLst/>
@@ -3336,7 +3272,7 @@
           <a:p>
             <a:r>
               <a:rPr lang="en-US" dirty="0"/>
-              <a:t>Exclusive</a:t>
+              <a:t>Membership is restricted</a:t>
             </a:r>
           </a:p>
         </p:txBody>
@@ -3349,8 +3285,8 @@
         </p:nvSpPr>
         <p:spPr>
           <a:xfrm rot="2300708">
-            <a:off x="5006913" y="6130548"/>
-            <a:ext cx="1371600" cy="379828"/>
+            <a:off x="5006913" y="5997297"/>
+            <a:ext cx="1371600" cy="646331"/>
           </a:xfrm>
           <a:prstGeom prst="rect">
             <a:avLst/>
@@ -3365,7 +3301,7 @@
           <a:p>
             <a:r>
               <a:rPr lang="en-US" dirty="0"/>
-              <a:t>Inclusive</a:t>
+              <a:t>Membership is open</a:t>
             </a:r>
           </a:p>
         </p:txBody>
@@ -3438,8 +3374,8 @@
         </p:nvSpPr>
         <p:spPr>
           <a:xfrm rot="19887021">
-            <a:off x="8554747" y="898009"/>
-            <a:ext cx="1645920" cy="646331"/>
+            <a:off x="8515834" y="606553"/>
+            <a:ext cx="2286000" cy="923330"/>
           </a:xfrm>
           <a:prstGeom prst="rect">
             <a:avLst/>
@@ -3454,7 +3390,7 @@
           <a:p>
             <a:r>
               <a:rPr lang="en-US" dirty="0"/>
-              <a:t>Government enforces rules</a:t>
+              <a:t>Community members care a great deal that others follow the rules</a:t>
             </a:r>
           </a:p>
         </p:txBody>
@@ -3467,8 +3403,8 @@
         </p:nvSpPr>
         <p:spPr>
           <a:xfrm rot="19814100">
-            <a:off x="8549122" y="2330804"/>
-            <a:ext cx="1828800" cy="646331"/>
+            <a:off x="8518962" y="2078820"/>
+            <a:ext cx="2286000" cy="923330"/>
           </a:xfrm>
           <a:prstGeom prst="rect">
             <a:avLst/>
@@ -3483,7 +3419,7 @@
           <a:p>
             <a:r>
               <a:rPr lang="en-US" dirty="0"/>
-              <a:t>Community enforces rules</a:t>
+              <a:t>Community members care very little if others follow the rules</a:t>
             </a:r>
           </a:p>
         </p:txBody>
@@ -3496,8 +3432,8 @@
         </p:nvSpPr>
         <p:spPr>
           <a:xfrm rot="19226394">
-            <a:off x="1166951" y="5187961"/>
-            <a:ext cx="1828800" cy="923330"/>
+            <a:off x="1166951" y="5326461"/>
+            <a:ext cx="1828800" cy="646331"/>
           </a:xfrm>
           <a:prstGeom prst="rect">
             <a:avLst/>
@@ -3513,14 +3449,7 @@
             <a:pPr algn="r"/>
             <a:r>
               <a:rPr lang="en-US" dirty="0"/>
-              <a:t>Strict</a:t>
-            </a:r>
-            <a:br>
-              <a:rPr lang="en-US" dirty="0"/>
-            </a:br>
-            <a:r>
-              <a:rPr lang="en-US" dirty="0"/>
-              <a:t> Adherence Expected</a:t>
+              <a:t>Fairly rigid about community rules</a:t>
             </a:r>
           </a:p>
         </p:txBody>
@@ -3533,8 +3462,8 @@
         </p:nvSpPr>
         <p:spPr>
           <a:xfrm rot="19216229">
-            <a:off x="2706027" y="5912452"/>
-            <a:ext cx="1645920" cy="923330"/>
+            <a:off x="2706027" y="6050952"/>
+            <a:ext cx="1645920" cy="646331"/>
           </a:xfrm>
           <a:prstGeom prst="rect">
             <a:avLst/>
@@ -3550,7 +3479,7 @@
             <a:pPr algn="r"/>
             <a:r>
               <a:rPr lang="en-US" dirty="0"/>
-              <a:t>Loose Adherence Allowed</a:t>
+              <a:t>Flexible about the rules</a:t>
             </a:r>
           </a:p>
         </p:txBody>
@@ -3620,7 +3549,7 @@
         </p:nvSpPr>
         <p:spPr>
           <a:xfrm>
-            <a:off x="3564098" y="3059838"/>
+            <a:off x="3564098" y="4485968"/>
             <a:ext cx="1371600" cy="1371600"/>
           </a:xfrm>
           <a:prstGeom prst="rect">
@@ -3741,16 +3670,14 @@
       </p:sp>
       <p:cxnSp>
         <p:nvCxnSpPr>
-          <p:cNvPr id="40" name="Straight Arrow Connector 39"/>
-          <p:cNvCxnSpPr>
-            <a:stCxn id="38" idx="1"/>
-          </p:cNvCxnSpPr>
+          <p:cNvPr id="26" name="Straight Arrow Connector 25"/>
+          <p:cNvCxnSpPr/>
           <p:nvPr/>
         </p:nvCxnSpPr>
         <p:spPr>
           <a:xfrm flipV="1">
-            <a:off x="4742443" y="1068430"/>
-            <a:ext cx="0" cy="4994751"/>
+            <a:off x="8201508" y="326171"/>
+            <a:ext cx="0" cy="3657600"/>
           </a:xfrm>
           <a:prstGeom prst="straightConnector1">
             <a:avLst/>
@@ -3779,16 +3706,82 @@
           </a:fontRef>
         </p:style>
       </p:cxnSp>
+      <p:sp>
+        <p:nvSpPr>
+          <p:cNvPr id="23" name="Rectangle 22"/>
+          <p:cNvSpPr/>
+          <p:nvPr/>
+        </p:nvSpPr>
+        <p:spPr>
+          <a:xfrm>
+            <a:off x="3570486" y="3113368"/>
+            <a:ext cx="1371600" cy="1371600"/>
+          </a:xfrm>
+          <a:prstGeom prst="rect">
+            <a:avLst/>
+          </a:prstGeom>
+          <a:solidFill>
+            <a:schemeClr val="accent4"/>
+          </a:solidFill>
+          <a:scene3d>
+            <a:camera prst="isometricLeftDown"/>
+            <a:lightRig rig="threePt" dir="t"/>
+          </a:scene3d>
+          <a:sp3d extrusionH="1270000">
+            <a:extrusionClr>
+              <a:schemeClr val="accent4">
+                <a:lumMod val="75000"/>
+              </a:schemeClr>
+            </a:extrusionClr>
+          </a:sp3d>
+        </p:spPr>
+        <p:style>
+          <a:lnRef idx="2">
+            <a:schemeClr val="accent1">
+              <a:shade val="50000"/>
+            </a:schemeClr>
+          </a:lnRef>
+          <a:fillRef idx="1">
+            <a:schemeClr val="accent1"/>
+          </a:fillRef>
+          <a:effectRef idx="0">
+            <a:schemeClr val="accent1"/>
+          </a:effectRef>
+          <a:fontRef idx="minor">
+            <a:schemeClr val="lt1"/>
+          </a:fontRef>
+        </p:style>
+        <p:txBody>
+          <a:bodyPr rtlCol="0" anchor="ctr"/>
+          <a:lstStyle/>
+          <a:p>
+            <a:pPr algn="ctr"/>
+            <a:r>
+              <a:rPr lang="en-US" dirty="0"/>
+              <a:t>Consumer</a:t>
+            </a:r>
+          </a:p>
+          <a:p>
+            <a:pPr algn="ctr"/>
+            <a:r>
+              <a:rPr lang="en-US" dirty="0"/>
+              <a:t>Approach</a:t>
+            </a:r>
+          </a:p>
+        </p:txBody>
+      </p:sp>
       <p:cxnSp>
         <p:nvCxnSpPr>
-          <p:cNvPr id="26" name="Straight Arrow Connector 25"/>
-          <p:cNvCxnSpPr/>
+          <p:cNvPr id="40" name="Straight Arrow Connector 39"/>
+          <p:cNvCxnSpPr>
+            <a:stCxn id="38" idx="1"/>
+          </p:cNvCxnSpPr>
           <p:nvPr/>
         </p:nvCxnSpPr>
         <p:spPr>
           <a:xfrm flipV="1">
-            <a:off x="8201508" y="317782"/>
-            <a:ext cx="0" cy="3657600"/>
+            <a:off x="4742443" y="1068430"/>
+            <a:ext cx="0" cy="4994751"/>
           </a:xfrm>
           <a:prstGeom prst="straightConnector1">
             <a:avLst/>
@@ -3849,124 +3842,13 @@
       </p:grpSpPr>
       <p:sp>
         <p:nvSpPr>
-          <p:cNvPr id="20" name="Rectangle 19"/>
-          <p:cNvSpPr/>
-          <p:nvPr/>
-        </p:nvSpPr>
-        <p:spPr>
-          <a:xfrm>
-            <a:off x="4825244" y="2111057"/>
-            <a:ext cx="1371600" cy="1371600"/>
-          </a:xfrm>
-          <a:prstGeom prst="rect">
-            <a:avLst/>
-          </a:prstGeom>
-          <a:solidFill>
-            <a:schemeClr val="accent1"/>
-          </a:solidFill>
-          <a:scene3d>
-            <a:camera prst="isometricLeftDown"/>
-            <a:lightRig rig="threePt" dir="t"/>
-          </a:scene3d>
-          <a:sp3d extrusionH="1270000">
-            <a:extrusionClr>
-              <a:schemeClr val="accent5">
-                <a:lumMod val="75000"/>
-              </a:schemeClr>
-            </a:extrusionClr>
-          </a:sp3d>
-        </p:spPr>
-        <p:style>
-          <a:lnRef idx="2">
-            <a:schemeClr val="accent1">
-              <a:shade val="50000"/>
-            </a:schemeClr>
-          </a:lnRef>
-          <a:fillRef idx="1">
-            <a:schemeClr val="accent1"/>
-          </a:fillRef>
-          <a:effectRef idx="0">
-            <a:schemeClr val="accent1"/>
-          </a:effectRef>
-          <a:fontRef idx="minor">
-            <a:schemeClr val="lt1"/>
-          </a:fontRef>
-        </p:style>
-        <p:txBody>
-          <a:bodyPr rtlCol="0" anchor="t"/>
-          <a:lstStyle/>
-          <a:p>
-            <a:pPr algn="ctr"/>
-            <a:endParaRPr lang="en-US" dirty="0"/>
-          </a:p>
-        </p:txBody>
-      </p:sp>
-      <p:sp>
-        <p:nvSpPr>
-          <p:cNvPr id="21" name="Rectangle 20"/>
-          <p:cNvSpPr/>
-          <p:nvPr/>
-        </p:nvSpPr>
-        <p:spPr>
-          <a:xfrm>
-            <a:off x="6101640" y="2917185"/>
-            <a:ext cx="1371600" cy="1371600"/>
-          </a:xfrm>
-          <a:prstGeom prst="rect">
-            <a:avLst/>
-          </a:prstGeom>
-          <a:solidFill>
-            <a:srgbClr val="7030A0"/>
-          </a:solidFill>
-          <a:scene3d>
-            <a:camera prst="isometricLeftDown"/>
-            <a:lightRig rig="threePt" dir="t"/>
-          </a:scene3d>
-          <a:sp3d extrusionH="1270000">
-            <a:extrusionClr>
-              <a:schemeClr val="accent5">
-                <a:lumMod val="50000"/>
-              </a:schemeClr>
-            </a:extrusionClr>
-          </a:sp3d>
-        </p:spPr>
-        <p:style>
-          <a:lnRef idx="2">
-            <a:schemeClr val="accent1">
-              <a:shade val="50000"/>
-            </a:schemeClr>
-          </a:lnRef>
-          <a:fillRef idx="1">
-            <a:schemeClr val="accent1"/>
-          </a:fillRef>
-          <a:effectRef idx="0">
-            <a:schemeClr val="accent1"/>
-          </a:effectRef>
-          <a:fontRef idx="minor">
-            <a:schemeClr val="lt1"/>
-          </a:fontRef>
-        </p:style>
-        <p:txBody>
-          <a:bodyPr rtlCol="0" anchor="ctr"/>
-          <a:lstStyle/>
-          <a:p>
-            <a:pPr algn="ctr"/>
-            <a:r>
-              <a:rPr lang="en-US" dirty="0"/>
-              <a:t>Ethnic Approach</a:t>
-            </a:r>
-          </a:p>
-        </p:txBody>
-      </p:sp>
-      <p:sp>
-        <p:nvSpPr>
           <p:cNvPr id="18" name="Rectangle 17"/>
           <p:cNvSpPr/>
           <p:nvPr/>
         </p:nvSpPr>
         <p:spPr>
           <a:xfrm>
-            <a:off x="4825244" y="714856"/>
+            <a:off x="4833633" y="2224876"/>
             <a:ext cx="1371600" cy="1371600"/>
           </a:xfrm>
           <a:prstGeom prst="rect">
@@ -4006,26 +3888,26 @@
           </a:fontRef>
         </p:style>
         <p:txBody>
-          <a:bodyPr rtlCol="0" anchor="ctr"/>
+          <a:bodyPr rtlCol="0" anchor="t"/>
           <a:lstStyle/>
           <a:p>
             <a:pPr algn="ctr"/>
             <a:r>
               <a:rPr lang="en-US" dirty="0"/>
-              <a:t>Government Approach</a:t>
-            </a:r>
-          </a:p>
-        </p:txBody>
-      </p:sp>
-      <p:sp>
-        <p:nvSpPr>
-          <p:cNvPr id="19" name="Rectangle 18"/>
+              <a:t>Nationalistic</a:t>
+            </a:r>
+          </a:p>
+        </p:txBody>
+      </p:sp>
+      <p:sp>
+        <p:nvSpPr>
+          <p:cNvPr id="20" name="Rectangle 19"/>
           <p:cNvSpPr/>
           <p:nvPr/>
         </p:nvSpPr>
         <p:spPr>
           <a:xfrm>
-            <a:off x="6101640" y="1520984"/>
+            <a:off x="4844433" y="838737"/>
             <a:ext cx="1371600" cy="1371600"/>
           </a:xfrm>
           <a:prstGeom prst="rect">
@@ -4063,6 +3945,118 @@
           </a:fontRef>
         </p:style>
         <p:txBody>
+          <a:bodyPr rtlCol="0" anchor="t"/>
+          <a:lstStyle/>
+          <a:p>
+            <a:pPr algn="ctr"/>
+            <a:endParaRPr lang="en-US" dirty="0"/>
+          </a:p>
+        </p:txBody>
+      </p:sp>
+      <p:sp>
+        <p:nvSpPr>
+          <p:cNvPr id="21" name="Rectangle 20"/>
+          <p:cNvSpPr/>
+          <p:nvPr/>
+        </p:nvSpPr>
+        <p:spPr>
+          <a:xfrm>
+            <a:off x="6110029" y="2959130"/>
+            <a:ext cx="1371600" cy="1371600"/>
+          </a:xfrm>
+          <a:prstGeom prst="rect">
+            <a:avLst/>
+          </a:prstGeom>
+          <a:solidFill>
+            <a:srgbClr val="7030A0"/>
+          </a:solidFill>
+          <a:scene3d>
+            <a:camera prst="isometricLeftDown"/>
+            <a:lightRig rig="threePt" dir="t"/>
+          </a:scene3d>
+          <a:sp3d extrusionH="1270000">
+            <a:extrusionClr>
+              <a:schemeClr val="accent5">
+                <a:lumMod val="50000"/>
+              </a:schemeClr>
+            </a:extrusionClr>
+          </a:sp3d>
+        </p:spPr>
+        <p:style>
+          <a:lnRef idx="2">
+            <a:schemeClr val="accent1">
+              <a:shade val="50000"/>
+            </a:schemeClr>
+          </a:lnRef>
+          <a:fillRef idx="1">
+            <a:schemeClr val="accent1"/>
+          </a:fillRef>
+          <a:effectRef idx="0">
+            <a:schemeClr val="accent1"/>
+          </a:effectRef>
+          <a:fontRef idx="minor">
+            <a:schemeClr val="lt1"/>
+          </a:fontRef>
+        </p:style>
+        <p:txBody>
+          <a:bodyPr rtlCol="0" anchor="ctr"/>
+          <a:lstStyle/>
+          <a:p>
+            <a:pPr algn="ctr"/>
+            <a:r>
+              <a:rPr lang="en-US" dirty="0" err="1"/>
+              <a:t>Tribalistic</a:t>
+            </a:r>
+            <a:endParaRPr lang="en-US" dirty="0"/>
+          </a:p>
+        </p:txBody>
+      </p:sp>
+      <p:sp>
+        <p:nvSpPr>
+          <p:cNvPr id="19" name="Rectangle 18"/>
+          <p:cNvSpPr/>
+          <p:nvPr/>
+        </p:nvSpPr>
+        <p:spPr>
+          <a:xfrm>
+            <a:off x="6110029" y="1562929"/>
+            <a:ext cx="1371600" cy="1371600"/>
+          </a:xfrm>
+          <a:prstGeom prst="rect">
+            <a:avLst/>
+          </a:prstGeom>
+          <a:solidFill>
+            <a:schemeClr val="accent1"/>
+          </a:solidFill>
+          <a:scene3d>
+            <a:camera prst="isometricLeftDown"/>
+            <a:lightRig rig="threePt" dir="t"/>
+          </a:scene3d>
+          <a:sp3d extrusionH="1270000">
+            <a:extrusionClr>
+              <a:schemeClr val="accent5">
+                <a:lumMod val="75000"/>
+              </a:schemeClr>
+            </a:extrusionClr>
+          </a:sp3d>
+        </p:spPr>
+        <p:style>
+          <a:lnRef idx="2">
+            <a:schemeClr val="accent1">
+              <a:shade val="50000"/>
+            </a:schemeClr>
+          </a:lnRef>
+          <a:fillRef idx="1">
+            <a:schemeClr val="accent1"/>
+          </a:fillRef>
+          <a:effectRef idx="0">
+            <a:schemeClr val="accent1"/>
+          </a:effectRef>
+          <a:fontRef idx="minor">
+            <a:schemeClr val="lt1"/>
+          </a:fontRef>
+        </p:style>
+        <p:txBody>
           <a:bodyPr rtlCol="0" anchor="ctr"/>
           <a:lstStyle/>
           <a:p>
@@ -4118,70 +4112,6 @@
       </p:sp>
       <p:sp>
         <p:nvSpPr>
-          <p:cNvPr id="23" name="Rectangle 22"/>
-          <p:cNvSpPr/>
-          <p:nvPr/>
-        </p:nvSpPr>
-        <p:spPr>
-          <a:xfrm>
-            <a:off x="3564098" y="4492750"/>
-            <a:ext cx="1371600" cy="1371600"/>
-          </a:xfrm>
-          <a:prstGeom prst="rect">
-            <a:avLst/>
-          </a:prstGeom>
-          <a:solidFill>
-            <a:schemeClr val="accent4"/>
-          </a:solidFill>
-          <a:scene3d>
-            <a:camera prst="isometricLeftDown"/>
-            <a:lightRig rig="threePt" dir="t"/>
-          </a:scene3d>
-          <a:sp3d extrusionH="1270000">
-            <a:extrusionClr>
-              <a:schemeClr val="accent4">
-                <a:lumMod val="75000"/>
-              </a:schemeClr>
-            </a:extrusionClr>
-          </a:sp3d>
-        </p:spPr>
-        <p:style>
-          <a:lnRef idx="2">
-            <a:schemeClr val="accent1">
-              <a:shade val="50000"/>
-            </a:schemeClr>
-          </a:lnRef>
-          <a:fillRef idx="1">
-            <a:schemeClr val="accent1"/>
-          </a:fillRef>
-          <a:effectRef idx="0">
-            <a:schemeClr val="accent1"/>
-          </a:effectRef>
-          <a:fontRef idx="minor">
-            <a:schemeClr val="lt1"/>
-          </a:fontRef>
-        </p:style>
-        <p:txBody>
-          <a:bodyPr rtlCol="0" anchor="ctr"/>
-          <a:lstStyle/>
-          <a:p>
-            <a:pPr algn="ctr"/>
-            <a:r>
-              <a:rPr lang="en-US" dirty="0"/>
-              <a:t>Consumer</a:t>
-            </a:r>
-          </a:p>
-          <a:p>
-            <a:pPr algn="ctr"/>
-            <a:r>
-              <a:rPr lang="en-US" dirty="0"/>
-              <a:t>Approach</a:t>
-            </a:r>
-          </a:p>
-        </p:txBody>
-      </p:sp>
-      <p:sp>
-        <p:nvSpPr>
           <p:cNvPr id="29" name="TextBox 28"/>
           <p:cNvSpPr txBox="1"/>
           <p:nvPr/>
@@ -4218,8 +4148,8 @@
         </p:nvSpPr>
         <p:spPr>
           <a:xfrm rot="2239251">
-            <a:off x="7664732" y="4614208"/>
-            <a:ext cx="1371600" cy="379828"/>
+            <a:off x="7664732" y="4480957"/>
+            <a:ext cx="1371600" cy="646331"/>
           </a:xfrm>
           <a:prstGeom prst="rect">
             <a:avLst/>
@@ -4234,7 +4164,7 @@
           <a:p>
             <a:r>
               <a:rPr lang="en-US" dirty="0"/>
-              <a:t>Exclusive</a:t>
+              <a:t>Membership is restricted</a:t>
             </a:r>
           </a:p>
         </p:txBody>
@@ -4247,8 +4177,8 @@
         </p:nvSpPr>
         <p:spPr>
           <a:xfrm rot="2300708">
-            <a:off x="5006913" y="6130548"/>
-            <a:ext cx="1371600" cy="379828"/>
+            <a:off x="5006913" y="5997297"/>
+            <a:ext cx="1371600" cy="646331"/>
           </a:xfrm>
           <a:prstGeom prst="rect">
             <a:avLst/>
@@ -4263,7 +4193,7 @@
           <a:p>
             <a:r>
               <a:rPr lang="en-US" dirty="0"/>
-              <a:t>Inclusive</a:t>
+              <a:t>Membership is open</a:t>
             </a:r>
           </a:p>
         </p:txBody>
@@ -4336,8 +4266,8 @@
         </p:nvSpPr>
         <p:spPr>
           <a:xfrm rot="19887021">
-            <a:off x="8538070" y="832456"/>
-            <a:ext cx="1920240" cy="646331"/>
+            <a:off x="8515834" y="606553"/>
+            <a:ext cx="2286000" cy="923330"/>
           </a:xfrm>
           <a:prstGeom prst="rect">
             <a:avLst/>
@@ -4352,7 +4282,7 @@
           <a:p>
             <a:r>
               <a:rPr lang="en-US" dirty="0"/>
-              <a:t>Nonconformity severely punished</a:t>
+              <a:t>Community members care a great deal that others follow the rules</a:t>
             </a:r>
           </a:p>
         </p:txBody>
@@ -4365,8 +4295,8 @@
         </p:nvSpPr>
         <p:spPr>
           <a:xfrm rot="19814100">
-            <a:off x="8549122" y="2330804"/>
-            <a:ext cx="1828800" cy="646331"/>
+            <a:off x="8518962" y="2078820"/>
+            <a:ext cx="2286000" cy="923330"/>
           </a:xfrm>
           <a:prstGeom prst="rect">
             <a:avLst/>
@@ -4381,7 +4311,7 @@
           <a:p>
             <a:r>
               <a:rPr lang="en-US" dirty="0"/>
-              <a:t>Nonconformity mildly punished</a:t>
+              <a:t>Community members care very little if others follow the rules</a:t>
             </a:r>
           </a:p>
         </p:txBody>
@@ -4394,8 +4324,8 @@
         </p:nvSpPr>
         <p:spPr>
           <a:xfrm rot="19226394">
-            <a:off x="1166951" y="5187961"/>
-            <a:ext cx="1828800" cy="923330"/>
+            <a:off x="1166951" y="5326461"/>
+            <a:ext cx="1828800" cy="646331"/>
           </a:xfrm>
           <a:prstGeom prst="rect">
             <a:avLst/>
@@ -4411,14 +4341,7 @@
             <a:pPr algn="r"/>
             <a:r>
               <a:rPr lang="en-US" dirty="0"/>
-              <a:t>Strict</a:t>
-            </a:r>
-            <a:br>
-              <a:rPr lang="en-US" dirty="0"/>
-            </a:br>
-            <a:r>
-              <a:rPr lang="en-US" dirty="0"/>
-              <a:t> Adherence Expected</a:t>
+              <a:t>Fairly rigid about community rules</a:t>
             </a:r>
           </a:p>
         </p:txBody>
@@ -4431,8 +4354,8 @@
         </p:nvSpPr>
         <p:spPr>
           <a:xfrm rot="19216229">
-            <a:off x="2706027" y="5912452"/>
-            <a:ext cx="1645920" cy="923330"/>
+            <a:off x="2706027" y="6050952"/>
+            <a:ext cx="1645920" cy="646331"/>
           </a:xfrm>
           <a:prstGeom prst="rect">
             <a:avLst/>
@@ -4448,7 +4371,7 @@
             <a:pPr algn="r"/>
             <a:r>
               <a:rPr lang="en-US" dirty="0"/>
-              <a:t>Loose Adherence Allowed</a:t>
+              <a:t>Flexible about the rules</a:t>
             </a:r>
           </a:p>
         </p:txBody>
@@ -4505,8 +4428,13 @@
             <a:pPr algn="ctr"/>
             <a:r>
               <a:rPr lang="en-US" dirty="0"/>
-              <a:t>Business Approach</a:t>
-            </a:r>
+              <a:t>Commercial-</a:t>
+            </a:r>
+            <a:r>
+              <a:rPr lang="en-US" dirty="0" err="1"/>
+              <a:t>istic</a:t>
+            </a:r>
+            <a:endParaRPr lang="en-US" dirty="0"/>
           </a:p>
         </p:txBody>
       </p:sp>
@@ -4518,7 +4446,7 @@
         </p:nvSpPr>
         <p:spPr>
           <a:xfrm>
-            <a:off x="3564098" y="3059838"/>
+            <a:off x="3564098" y="4485968"/>
             <a:ext cx="1371600" cy="1371600"/>
           </a:xfrm>
           <a:prstGeom prst="rect">
@@ -4639,16 +4567,14 @@
       </p:sp>
       <p:cxnSp>
         <p:nvCxnSpPr>
-          <p:cNvPr id="40" name="Straight Arrow Connector 39"/>
-          <p:cNvCxnSpPr>
-            <a:stCxn id="38" idx="1"/>
-          </p:cNvCxnSpPr>
+          <p:cNvPr id="26" name="Straight Arrow Connector 25"/>
+          <p:cNvCxnSpPr/>
           <p:nvPr/>
         </p:nvCxnSpPr>
         <p:spPr>
           <a:xfrm flipV="1">
-            <a:off x="4742443" y="1068430"/>
-            <a:ext cx="0" cy="4994751"/>
+            <a:off x="8201508" y="326171"/>
+            <a:ext cx="0" cy="3657600"/>
           </a:xfrm>
           <a:prstGeom prst="straightConnector1">
             <a:avLst/>
@@ -4677,16 +4603,80 @@
           </a:fontRef>
         </p:style>
       </p:cxnSp>
+      <p:sp>
+        <p:nvSpPr>
+          <p:cNvPr id="23" name="Rectangle 22"/>
+          <p:cNvSpPr/>
+          <p:nvPr/>
+        </p:nvSpPr>
+        <p:spPr>
+          <a:xfrm>
+            <a:off x="3570486" y="3113368"/>
+            <a:ext cx="1371600" cy="1371600"/>
+          </a:xfrm>
+          <a:prstGeom prst="rect">
+            <a:avLst/>
+          </a:prstGeom>
+          <a:solidFill>
+            <a:schemeClr val="accent4"/>
+          </a:solidFill>
+          <a:scene3d>
+            <a:camera prst="isometricLeftDown"/>
+            <a:lightRig rig="threePt" dir="t"/>
+          </a:scene3d>
+          <a:sp3d extrusionH="1270000">
+            <a:extrusionClr>
+              <a:schemeClr val="accent4">
+                <a:lumMod val="75000"/>
+              </a:schemeClr>
+            </a:extrusionClr>
+          </a:sp3d>
+        </p:spPr>
+        <p:style>
+          <a:lnRef idx="2">
+            <a:schemeClr val="accent1">
+              <a:shade val="50000"/>
+            </a:schemeClr>
+          </a:lnRef>
+          <a:fillRef idx="1">
+            <a:schemeClr val="accent1"/>
+          </a:fillRef>
+          <a:effectRef idx="0">
+            <a:schemeClr val="accent1"/>
+          </a:effectRef>
+          <a:fontRef idx="minor">
+            <a:schemeClr val="lt1"/>
+          </a:fontRef>
+        </p:style>
+        <p:txBody>
+          <a:bodyPr rtlCol="0" anchor="ctr"/>
+          <a:lstStyle/>
+          <a:p>
+            <a:pPr algn="ctr"/>
+            <a:r>
+              <a:rPr lang="en-US" dirty="0"/>
+              <a:t>Individual-</a:t>
+            </a:r>
+            <a:r>
+              <a:rPr lang="en-US" dirty="0" err="1"/>
+              <a:t>istic</a:t>
+            </a:r>
+            <a:endParaRPr lang="en-US" dirty="0"/>
+          </a:p>
+        </p:txBody>
+      </p:sp>
       <p:cxnSp>
         <p:nvCxnSpPr>
-          <p:cNvPr id="26" name="Straight Arrow Connector 25"/>
-          <p:cNvCxnSpPr/>
+          <p:cNvPr id="40" name="Straight Arrow Connector 39"/>
+          <p:cNvCxnSpPr>
+            <a:stCxn id="38" idx="1"/>
+          </p:cNvCxnSpPr>
           <p:nvPr/>
         </p:nvCxnSpPr>
         <p:spPr>
           <a:xfrm flipV="1">
-            <a:off x="8201508" y="317782"/>
-            <a:ext cx="0" cy="3657600"/>
+            <a:off x="4742443" y="1068430"/>
+            <a:ext cx="0" cy="4994751"/>
           </a:xfrm>
           <a:prstGeom prst="straightConnector1">
             <a:avLst/>
@@ -4718,7 +4708,7 @@
     </p:spTree>
     <p:extLst>
       <p:ext uri="{BB962C8B-B14F-4D97-AF65-F5344CB8AC3E}">
-        <p14:creationId xmlns:p14="http://schemas.microsoft.com/office/powerpoint/2010/main" val="2273035398"/>
+        <p14:creationId xmlns:p14="http://schemas.microsoft.com/office/powerpoint/2010/main" val="1848157991"/>
       </p:ext>
     </p:extLst>
   </p:cSld>

</xml_diff>

<commit_message>
Added critique of Heokstra & Gerteis (2019) to draft of final paper
</commit_message>
<xml_diff>
--- a/Notes/SOC5060_Framework_Monti_MakingCommunity_2019v00.pptx
+++ b/Notes/SOC5060_Framework_Monti_MakingCommunity_2019v00.pptx
@@ -242,7 +242,7 @@
           <a:p>
             <a:fld id="{40CF262A-BA9E-4FD4-B7A4-17D33C6E7493}" type="datetimeFigureOut">
               <a:rPr lang="en-US" smtClean="0"/>
-              <a:t>10/9/2019</a:t>
+              <a:t>10/17/2019</a:t>
             </a:fld>
             <a:endParaRPr lang="en-US"/>
           </a:p>
@@ -410,7 +410,7 @@
           <a:p>
             <a:fld id="{40CF262A-BA9E-4FD4-B7A4-17D33C6E7493}" type="datetimeFigureOut">
               <a:rPr lang="en-US" smtClean="0"/>
-              <a:t>10/9/2019</a:t>
+              <a:t>10/17/2019</a:t>
             </a:fld>
             <a:endParaRPr lang="en-US"/>
           </a:p>
@@ -588,7 +588,7 @@
           <a:p>
             <a:fld id="{40CF262A-BA9E-4FD4-B7A4-17D33C6E7493}" type="datetimeFigureOut">
               <a:rPr lang="en-US" smtClean="0"/>
-              <a:t>10/9/2019</a:t>
+              <a:t>10/17/2019</a:t>
             </a:fld>
             <a:endParaRPr lang="en-US"/>
           </a:p>
@@ -756,7 +756,7 @@
           <a:p>
             <a:fld id="{40CF262A-BA9E-4FD4-B7A4-17D33C6E7493}" type="datetimeFigureOut">
               <a:rPr lang="en-US" smtClean="0"/>
-              <a:t>10/9/2019</a:t>
+              <a:t>10/17/2019</a:t>
             </a:fld>
             <a:endParaRPr lang="en-US"/>
           </a:p>
@@ -1001,7 +1001,7 @@
           <a:p>
             <a:fld id="{40CF262A-BA9E-4FD4-B7A4-17D33C6E7493}" type="datetimeFigureOut">
               <a:rPr lang="en-US" smtClean="0"/>
-              <a:t>10/9/2019</a:t>
+              <a:t>10/17/2019</a:t>
             </a:fld>
             <a:endParaRPr lang="en-US"/>
           </a:p>
@@ -1230,7 +1230,7 @@
           <a:p>
             <a:fld id="{40CF262A-BA9E-4FD4-B7A4-17D33C6E7493}" type="datetimeFigureOut">
               <a:rPr lang="en-US" smtClean="0"/>
-              <a:t>10/9/2019</a:t>
+              <a:t>10/17/2019</a:t>
             </a:fld>
             <a:endParaRPr lang="en-US"/>
           </a:p>
@@ -1594,7 +1594,7 @@
           <a:p>
             <a:fld id="{40CF262A-BA9E-4FD4-B7A4-17D33C6E7493}" type="datetimeFigureOut">
               <a:rPr lang="en-US" smtClean="0"/>
-              <a:t>10/9/2019</a:t>
+              <a:t>10/17/2019</a:t>
             </a:fld>
             <a:endParaRPr lang="en-US"/>
           </a:p>
@@ -1711,7 +1711,7 @@
           <a:p>
             <a:fld id="{40CF262A-BA9E-4FD4-B7A4-17D33C6E7493}" type="datetimeFigureOut">
               <a:rPr lang="en-US" smtClean="0"/>
-              <a:t>10/9/2019</a:t>
+              <a:t>10/17/2019</a:t>
             </a:fld>
             <a:endParaRPr lang="en-US"/>
           </a:p>
@@ -1806,7 +1806,7 @@
           <a:p>
             <a:fld id="{40CF262A-BA9E-4FD4-B7A4-17D33C6E7493}" type="datetimeFigureOut">
               <a:rPr lang="en-US" smtClean="0"/>
-              <a:t>10/9/2019</a:t>
+              <a:t>10/17/2019</a:t>
             </a:fld>
             <a:endParaRPr lang="en-US"/>
           </a:p>
@@ -2081,7 +2081,7 @@
           <a:p>
             <a:fld id="{40CF262A-BA9E-4FD4-B7A4-17D33C6E7493}" type="datetimeFigureOut">
               <a:rPr lang="en-US" smtClean="0"/>
-              <a:t>10/9/2019</a:t>
+              <a:t>10/17/2019</a:t>
             </a:fld>
             <a:endParaRPr lang="en-US"/>
           </a:p>
@@ -2333,7 +2333,7 @@
           <a:p>
             <a:fld id="{40CF262A-BA9E-4FD4-B7A4-17D33C6E7493}" type="datetimeFigureOut">
               <a:rPr lang="en-US" smtClean="0"/>
-              <a:t>10/9/2019</a:t>
+              <a:t>10/17/2019</a:t>
             </a:fld>
             <a:endParaRPr lang="en-US"/>
           </a:p>
@@ -2544,7 +2544,7 @@
           <a:p>
             <a:fld id="{40CF262A-BA9E-4FD4-B7A4-17D33C6E7493}" type="datetimeFigureOut">
               <a:rPr lang="en-US" smtClean="0"/>
-              <a:t>10/9/2019</a:t>
+              <a:t>10/17/2019</a:t>
             </a:fld>
             <a:endParaRPr lang="en-US"/>
           </a:p>
@@ -2949,867 +2949,882 @@
           <a:chExt cx="0" cy="0"/>
         </a:xfrm>
       </p:grpSpPr>
-      <p:sp>
-        <p:nvSpPr>
-          <p:cNvPr id="18" name="Rectangle 17"/>
-          <p:cNvSpPr/>
+      <p:grpSp>
+        <p:nvGrpSpPr>
+          <p:cNvPr id="2" name="Group 1"/>
+          <p:cNvGrpSpPr/>
           <p:nvPr/>
-        </p:nvSpPr>
-        <p:spPr>
+        </p:nvGrpSpPr>
+        <p:grpSpPr>
           <a:xfrm>
-            <a:off x="4833633" y="2224876"/>
-            <a:ext cx="1371600" cy="1371600"/>
+            <a:off x="1166951" y="326171"/>
+            <a:ext cx="9638011" cy="6371112"/>
+            <a:chOff x="1166951" y="326171"/>
+            <a:chExt cx="9638011" cy="6371112"/>
           </a:xfrm>
-          <a:prstGeom prst="rect">
-            <a:avLst/>
-          </a:prstGeom>
-          <a:solidFill>
-            <a:schemeClr val="bg1">
-              <a:lumMod val="65000"/>
-            </a:schemeClr>
-          </a:solidFill>
-          <a:scene3d>
-            <a:camera prst="isometricLeftDown"/>
-            <a:lightRig rig="threePt" dir="t"/>
-          </a:scene3d>
-          <a:sp3d extrusionH="1270000">
-            <a:extrusionClr>
+        </p:grpSpPr>
+        <p:sp>
+          <p:nvSpPr>
+            <p:cNvPr id="18" name="Rectangle 17"/>
+            <p:cNvSpPr/>
+            <p:nvPr/>
+          </p:nvSpPr>
+          <p:spPr>
+            <a:xfrm>
+              <a:off x="4833633" y="2224876"/>
+              <a:ext cx="1371600" cy="1371600"/>
+            </a:xfrm>
+            <a:prstGeom prst="rect">
+              <a:avLst/>
+            </a:prstGeom>
+            <a:solidFill>
               <a:schemeClr val="bg1">
-                <a:lumMod val="75000"/>
-              </a:schemeClr>
-            </a:extrusionClr>
-          </a:sp3d>
-        </p:spPr>
-        <p:style>
-          <a:lnRef idx="2">
-            <a:schemeClr val="accent1">
-              <a:shade val="50000"/>
-            </a:schemeClr>
-          </a:lnRef>
-          <a:fillRef idx="1">
-            <a:schemeClr val="accent1"/>
-          </a:fillRef>
-          <a:effectRef idx="0">
-            <a:schemeClr val="accent1"/>
-          </a:effectRef>
-          <a:fontRef idx="minor">
-            <a:schemeClr val="lt1"/>
-          </a:fontRef>
-        </p:style>
-        <p:txBody>
-          <a:bodyPr rtlCol="0" anchor="t"/>
-          <a:lstStyle/>
-          <a:p>
-            <a:pPr algn="ctr"/>
-            <a:r>
-              <a:rPr lang="en-US" dirty="0"/>
-              <a:t>Government Approach</a:t>
-            </a:r>
-          </a:p>
-        </p:txBody>
-      </p:sp>
-      <p:sp>
-        <p:nvSpPr>
-          <p:cNvPr id="20" name="Rectangle 19"/>
-          <p:cNvSpPr/>
-          <p:nvPr/>
-        </p:nvSpPr>
-        <p:spPr>
-          <a:xfrm>
-            <a:off x="4844433" y="838737"/>
-            <a:ext cx="1371600" cy="1371600"/>
-          </a:xfrm>
-          <a:prstGeom prst="rect">
-            <a:avLst/>
-          </a:prstGeom>
-          <a:solidFill>
-            <a:schemeClr val="accent1"/>
-          </a:solidFill>
-          <a:scene3d>
-            <a:camera prst="isometricLeftDown"/>
-            <a:lightRig rig="threePt" dir="t"/>
-          </a:scene3d>
-          <a:sp3d extrusionH="1270000">
-            <a:extrusionClr>
-              <a:schemeClr val="accent5">
-                <a:lumMod val="75000"/>
-              </a:schemeClr>
-            </a:extrusionClr>
-          </a:sp3d>
-        </p:spPr>
-        <p:style>
-          <a:lnRef idx="2">
-            <a:schemeClr val="accent1">
-              <a:shade val="50000"/>
-            </a:schemeClr>
-          </a:lnRef>
-          <a:fillRef idx="1">
-            <a:schemeClr val="accent1"/>
-          </a:fillRef>
-          <a:effectRef idx="0">
-            <a:schemeClr val="accent1"/>
-          </a:effectRef>
-          <a:fontRef idx="minor">
-            <a:schemeClr val="lt1"/>
-          </a:fontRef>
-        </p:style>
-        <p:txBody>
-          <a:bodyPr rtlCol="0" anchor="t"/>
-          <a:lstStyle/>
-          <a:p>
-            <a:pPr algn="ctr"/>
-            <a:endParaRPr lang="en-US" dirty="0"/>
-          </a:p>
-        </p:txBody>
-      </p:sp>
-      <p:sp>
-        <p:nvSpPr>
-          <p:cNvPr id="21" name="Rectangle 20"/>
-          <p:cNvSpPr/>
-          <p:nvPr/>
-        </p:nvSpPr>
-        <p:spPr>
-          <a:xfrm>
-            <a:off x="6110029" y="2959130"/>
-            <a:ext cx="1371600" cy="1371600"/>
-          </a:xfrm>
-          <a:prstGeom prst="rect">
-            <a:avLst/>
-          </a:prstGeom>
-          <a:solidFill>
-            <a:srgbClr val="7030A0"/>
-          </a:solidFill>
-          <a:scene3d>
-            <a:camera prst="isometricLeftDown"/>
-            <a:lightRig rig="threePt" dir="t"/>
-          </a:scene3d>
-          <a:sp3d extrusionH="1270000">
-            <a:extrusionClr>
-              <a:schemeClr val="accent5">
-                <a:lumMod val="50000"/>
-              </a:schemeClr>
-            </a:extrusionClr>
-          </a:sp3d>
-        </p:spPr>
-        <p:style>
-          <a:lnRef idx="2">
-            <a:schemeClr val="accent1">
-              <a:shade val="50000"/>
-            </a:schemeClr>
-          </a:lnRef>
-          <a:fillRef idx="1">
-            <a:schemeClr val="accent1"/>
-          </a:fillRef>
-          <a:effectRef idx="0">
-            <a:schemeClr val="accent1"/>
-          </a:effectRef>
-          <a:fontRef idx="minor">
-            <a:schemeClr val="lt1"/>
-          </a:fontRef>
-        </p:style>
-        <p:txBody>
-          <a:bodyPr rtlCol="0" anchor="ctr"/>
-          <a:lstStyle/>
-          <a:p>
-            <a:pPr algn="ctr"/>
-            <a:r>
-              <a:rPr lang="en-US" dirty="0"/>
-              <a:t>Ethnic Approach</a:t>
-            </a:r>
-          </a:p>
-        </p:txBody>
-      </p:sp>
-      <p:sp>
-        <p:nvSpPr>
-          <p:cNvPr id="19" name="Rectangle 18"/>
-          <p:cNvSpPr/>
-          <p:nvPr/>
-        </p:nvSpPr>
-        <p:spPr>
-          <a:xfrm>
-            <a:off x="6110029" y="1562929"/>
-            <a:ext cx="1371600" cy="1371600"/>
-          </a:xfrm>
-          <a:prstGeom prst="rect">
-            <a:avLst/>
-          </a:prstGeom>
-          <a:solidFill>
-            <a:schemeClr val="accent1"/>
-          </a:solidFill>
-          <a:scene3d>
-            <a:camera prst="isometricLeftDown"/>
-            <a:lightRig rig="threePt" dir="t"/>
-          </a:scene3d>
-          <a:sp3d extrusionH="1270000">
-            <a:extrusionClr>
-              <a:schemeClr val="accent5">
-                <a:lumMod val="75000"/>
-              </a:schemeClr>
-            </a:extrusionClr>
-          </a:sp3d>
-        </p:spPr>
-        <p:style>
-          <a:lnRef idx="2">
-            <a:schemeClr val="accent1">
-              <a:shade val="50000"/>
-            </a:schemeClr>
-          </a:lnRef>
-          <a:fillRef idx="1">
-            <a:schemeClr val="accent1"/>
-          </a:fillRef>
-          <a:effectRef idx="0">
-            <a:schemeClr val="accent1"/>
-          </a:effectRef>
-          <a:fontRef idx="minor">
-            <a:schemeClr val="lt1"/>
-          </a:fontRef>
-        </p:style>
-        <p:txBody>
-          <a:bodyPr rtlCol="0" anchor="ctr"/>
-          <a:lstStyle/>
-          <a:p>
-            <a:pPr algn="ctr"/>
-            <a:endParaRPr lang="en-US" dirty="0"/>
-          </a:p>
-        </p:txBody>
-      </p:sp>
-      <p:sp>
-        <p:nvSpPr>
-          <p:cNvPr id="22" name="Rectangle 21"/>
-          <p:cNvSpPr/>
-          <p:nvPr/>
-        </p:nvSpPr>
-        <p:spPr>
-          <a:xfrm>
-            <a:off x="2314544" y="3765848"/>
-            <a:ext cx="1371600" cy="1371600"/>
-          </a:xfrm>
-          <a:prstGeom prst="rect">
-            <a:avLst/>
-          </a:prstGeom>
-          <a:scene3d>
-            <a:camera prst="isometricLeftDown"/>
-            <a:lightRig rig="threePt" dir="t"/>
-          </a:scene3d>
-          <a:sp3d extrusionH="1270000"/>
-        </p:spPr>
-        <p:style>
-          <a:lnRef idx="2">
-            <a:schemeClr val="accent1">
-              <a:shade val="50000"/>
-            </a:schemeClr>
-          </a:lnRef>
-          <a:fillRef idx="1">
-            <a:schemeClr val="accent1"/>
-          </a:fillRef>
-          <a:effectRef idx="0">
-            <a:schemeClr val="accent1"/>
-          </a:effectRef>
-          <a:fontRef idx="minor">
-            <a:schemeClr val="lt1"/>
-          </a:fontRef>
-        </p:style>
-        <p:txBody>
-          <a:bodyPr rtlCol="0" anchor="ctr"/>
-          <a:lstStyle/>
-          <a:p>
-            <a:pPr algn="ctr"/>
-            <a:endParaRPr lang="en-US" dirty="0"/>
-          </a:p>
-        </p:txBody>
-      </p:sp>
-      <p:sp>
-        <p:nvSpPr>
-          <p:cNvPr id="29" name="TextBox 28"/>
-          <p:cNvSpPr txBox="1"/>
-          <p:nvPr/>
-        </p:nvSpPr>
-        <p:spPr>
-          <a:xfrm rot="19705333">
-            <a:off x="5993001" y="4827571"/>
-            <a:ext cx="1828800" cy="369332"/>
-          </a:xfrm>
-          <a:prstGeom prst="rect">
-            <a:avLst/>
-          </a:prstGeom>
-          <a:noFill/>
-        </p:spPr>
-        <p:txBody>
-          <a:bodyPr wrap="square" rtlCol="0">
-            <a:spAutoFit/>
-          </a:bodyPr>
-          <a:lstStyle/>
-          <a:p>
-            <a:pPr algn="ctr"/>
-            <a:r>
-              <a:rPr lang="en-US" b="1" dirty="0"/>
-              <a:t>Membership</a:t>
-            </a:r>
-          </a:p>
-        </p:txBody>
-      </p:sp>
-      <p:sp>
-        <p:nvSpPr>
-          <p:cNvPr id="30" name="TextBox 29"/>
-          <p:cNvSpPr txBox="1"/>
-          <p:nvPr/>
-        </p:nvSpPr>
-        <p:spPr>
-          <a:xfrm rot="2239251">
-            <a:off x="7664732" y="4480957"/>
-            <a:ext cx="1371600" cy="646331"/>
-          </a:xfrm>
-          <a:prstGeom prst="rect">
-            <a:avLst/>
-          </a:prstGeom>
-          <a:noFill/>
-        </p:spPr>
-        <p:txBody>
-          <a:bodyPr wrap="square" rtlCol="0">
-            <a:spAutoFit/>
-          </a:bodyPr>
-          <a:lstStyle/>
-          <a:p>
-            <a:r>
-              <a:rPr lang="en-US" dirty="0"/>
-              <a:t>Membership is restricted</a:t>
-            </a:r>
-          </a:p>
-        </p:txBody>
-      </p:sp>
-      <p:sp>
-        <p:nvSpPr>
-          <p:cNvPr id="31" name="TextBox 30"/>
-          <p:cNvSpPr txBox="1"/>
-          <p:nvPr/>
-        </p:nvSpPr>
-        <p:spPr>
-          <a:xfrm rot="2300708">
-            <a:off x="5006913" y="5997297"/>
-            <a:ext cx="1371600" cy="646331"/>
-          </a:xfrm>
-          <a:prstGeom prst="rect">
-            <a:avLst/>
-          </a:prstGeom>
-          <a:noFill/>
-        </p:spPr>
-        <p:txBody>
-          <a:bodyPr wrap="square" rtlCol="0">
-            <a:spAutoFit/>
-          </a:bodyPr>
-          <a:lstStyle/>
-          <a:p>
-            <a:r>
-              <a:rPr lang="en-US" dirty="0"/>
-              <a:t>Membership is open</a:t>
-            </a:r>
-          </a:p>
-        </p:txBody>
-      </p:sp>
-      <p:sp>
-        <p:nvSpPr>
-          <p:cNvPr id="32" name="TextBox 31"/>
-          <p:cNvSpPr txBox="1"/>
-          <p:nvPr/>
-        </p:nvSpPr>
-        <p:spPr>
-          <a:xfrm rot="1851826">
-            <a:off x="2615296" y="5288868"/>
-            <a:ext cx="1371600" cy="379828"/>
-          </a:xfrm>
-          <a:prstGeom prst="rect">
-            <a:avLst/>
-          </a:prstGeom>
-          <a:noFill/>
-        </p:spPr>
-        <p:txBody>
-          <a:bodyPr wrap="square" rtlCol="0">
-            <a:spAutoFit/>
-          </a:bodyPr>
-          <a:lstStyle/>
-          <a:p>
-            <a:pPr algn="ctr"/>
-            <a:r>
-              <a:rPr lang="en-US" b="1" dirty="0"/>
-              <a:t>Rules</a:t>
-            </a:r>
-          </a:p>
-        </p:txBody>
-      </p:sp>
-      <p:sp>
-        <p:nvSpPr>
-          <p:cNvPr id="33" name="TextBox 32"/>
-          <p:cNvSpPr txBox="1"/>
-          <p:nvPr/>
-        </p:nvSpPr>
-        <p:spPr>
-          <a:xfrm rot="16200000">
-            <a:off x="7477022" y="2176624"/>
-            <a:ext cx="1828800" cy="379828"/>
-          </a:xfrm>
-          <a:prstGeom prst="rect">
-            <a:avLst/>
-          </a:prstGeom>
-          <a:noFill/>
-        </p:spPr>
-        <p:txBody>
-          <a:bodyPr wrap="square" rtlCol="0">
-            <a:spAutoFit/>
-          </a:bodyPr>
-          <a:lstStyle/>
-          <a:p>
-            <a:pPr algn="ctr"/>
-            <a:r>
-              <a:rPr lang="en-US" b="1" dirty="0"/>
-              <a:t>Accountability</a:t>
-            </a:r>
-          </a:p>
-        </p:txBody>
-      </p:sp>
-      <p:sp>
-        <p:nvSpPr>
-          <p:cNvPr id="34" name="TextBox 33"/>
-          <p:cNvSpPr txBox="1"/>
-          <p:nvPr/>
-        </p:nvSpPr>
-        <p:spPr>
-          <a:xfrm rot="19887021">
-            <a:off x="8515834" y="606553"/>
-            <a:ext cx="2286000" cy="923330"/>
-          </a:xfrm>
-          <a:prstGeom prst="rect">
-            <a:avLst/>
-          </a:prstGeom>
-          <a:noFill/>
-        </p:spPr>
-        <p:txBody>
-          <a:bodyPr wrap="square" rtlCol="0">
-            <a:spAutoFit/>
-          </a:bodyPr>
-          <a:lstStyle/>
-          <a:p>
-            <a:r>
-              <a:rPr lang="en-US" dirty="0"/>
-              <a:t>Community members care a great deal that others follow the rules</a:t>
-            </a:r>
-          </a:p>
-        </p:txBody>
-      </p:sp>
-      <p:sp>
-        <p:nvSpPr>
-          <p:cNvPr id="35" name="TextBox 34"/>
-          <p:cNvSpPr txBox="1"/>
-          <p:nvPr/>
-        </p:nvSpPr>
-        <p:spPr>
-          <a:xfrm rot="19814100">
-            <a:off x="8518962" y="2078820"/>
-            <a:ext cx="2286000" cy="923330"/>
-          </a:xfrm>
-          <a:prstGeom prst="rect">
-            <a:avLst/>
-          </a:prstGeom>
-          <a:noFill/>
-        </p:spPr>
-        <p:txBody>
-          <a:bodyPr wrap="square" rtlCol="0">
-            <a:spAutoFit/>
-          </a:bodyPr>
-          <a:lstStyle/>
-          <a:p>
-            <a:r>
-              <a:rPr lang="en-US" dirty="0"/>
-              <a:t>Community members care very little if others follow the rules</a:t>
-            </a:r>
-          </a:p>
-        </p:txBody>
-      </p:sp>
-      <p:sp>
-        <p:nvSpPr>
-          <p:cNvPr id="36" name="TextBox 35"/>
-          <p:cNvSpPr txBox="1"/>
-          <p:nvPr/>
-        </p:nvSpPr>
-        <p:spPr>
-          <a:xfrm rot="19226394">
-            <a:off x="1166951" y="5326461"/>
-            <a:ext cx="1828800" cy="646331"/>
-          </a:xfrm>
-          <a:prstGeom prst="rect">
-            <a:avLst/>
-          </a:prstGeom>
-          <a:noFill/>
-        </p:spPr>
-        <p:txBody>
-          <a:bodyPr wrap="square" rtlCol="0">
-            <a:spAutoFit/>
-          </a:bodyPr>
-          <a:lstStyle/>
-          <a:p>
-            <a:pPr algn="r"/>
-            <a:r>
-              <a:rPr lang="en-US" dirty="0"/>
-              <a:t>Fairly rigid about community rules</a:t>
-            </a:r>
-          </a:p>
-        </p:txBody>
-      </p:sp>
-      <p:sp>
-        <p:nvSpPr>
-          <p:cNvPr id="37" name="TextBox 36"/>
-          <p:cNvSpPr txBox="1"/>
-          <p:nvPr/>
-        </p:nvSpPr>
-        <p:spPr>
-          <a:xfrm rot="19216229">
-            <a:off x="2706027" y="6050952"/>
-            <a:ext cx="1645920" cy="646331"/>
-          </a:xfrm>
-          <a:prstGeom prst="rect">
-            <a:avLst/>
-          </a:prstGeom>
-          <a:noFill/>
-        </p:spPr>
-        <p:txBody>
-          <a:bodyPr wrap="square" rtlCol="0">
-            <a:spAutoFit/>
-          </a:bodyPr>
-          <a:lstStyle/>
-          <a:p>
-            <a:pPr algn="r"/>
-            <a:r>
-              <a:rPr lang="en-US" dirty="0"/>
-              <a:t>Flexible about the rules</a:t>
-            </a:r>
-          </a:p>
-        </p:txBody>
-      </p:sp>
-      <p:sp>
-        <p:nvSpPr>
-          <p:cNvPr id="24" name="Rectangle 23"/>
-          <p:cNvSpPr/>
-          <p:nvPr/>
-        </p:nvSpPr>
-        <p:spPr>
-          <a:xfrm>
-            <a:off x="2313117" y="2339425"/>
-            <a:ext cx="1371600" cy="1371600"/>
-          </a:xfrm>
-          <a:prstGeom prst="rect">
-            <a:avLst/>
-          </a:prstGeom>
-          <a:solidFill>
-            <a:schemeClr val="accent6"/>
-          </a:solidFill>
-          <a:scene3d>
-            <a:camera prst="isometricLeftDown"/>
-            <a:lightRig rig="threePt" dir="t"/>
-          </a:scene3d>
-          <a:sp3d extrusionH="1270000">
-            <a:extrusionClr>
-              <a:schemeClr val="accent6">
-                <a:lumMod val="75000"/>
-              </a:schemeClr>
-            </a:extrusionClr>
-          </a:sp3d>
-        </p:spPr>
-        <p:style>
-          <a:lnRef idx="2">
-            <a:schemeClr val="accent1">
-              <a:shade val="50000"/>
-            </a:schemeClr>
-          </a:lnRef>
-          <a:fillRef idx="1">
-            <a:schemeClr val="accent1"/>
-          </a:fillRef>
-          <a:effectRef idx="0">
-            <a:schemeClr val="accent1"/>
-          </a:effectRef>
-          <a:fontRef idx="minor">
-            <a:schemeClr val="lt1"/>
-          </a:fontRef>
-        </p:style>
-        <p:txBody>
-          <a:bodyPr rtlCol="0" anchor="ctr"/>
-          <a:lstStyle/>
-          <a:p>
-            <a:pPr algn="ctr"/>
-            <a:r>
-              <a:rPr lang="en-US" dirty="0"/>
-              <a:t>Business Approach</a:t>
-            </a:r>
-          </a:p>
-        </p:txBody>
-      </p:sp>
-      <p:sp>
-        <p:nvSpPr>
-          <p:cNvPr id="25" name="Rectangle 24"/>
-          <p:cNvSpPr/>
-          <p:nvPr/>
-        </p:nvSpPr>
-        <p:spPr>
-          <a:xfrm>
-            <a:off x="3564098" y="4485968"/>
-            <a:ext cx="1371600" cy="1371600"/>
-          </a:xfrm>
-          <a:prstGeom prst="rect">
-            <a:avLst/>
-          </a:prstGeom>
-          <a:scene3d>
-            <a:camera prst="isometricLeftDown"/>
-            <a:lightRig rig="threePt" dir="t"/>
-          </a:scene3d>
-          <a:sp3d extrusionH="1270000"/>
-        </p:spPr>
-        <p:style>
-          <a:lnRef idx="2">
-            <a:schemeClr val="accent1">
-              <a:shade val="50000"/>
-            </a:schemeClr>
-          </a:lnRef>
-          <a:fillRef idx="1">
-            <a:schemeClr val="accent1"/>
-          </a:fillRef>
-          <a:effectRef idx="0">
-            <a:schemeClr val="accent1"/>
-          </a:effectRef>
-          <a:fontRef idx="minor">
-            <a:schemeClr val="lt1"/>
-          </a:fontRef>
-        </p:style>
-        <p:txBody>
-          <a:bodyPr rtlCol="0" anchor="ctr"/>
-          <a:lstStyle/>
-          <a:p>
-            <a:pPr algn="ctr"/>
-            <a:endParaRPr lang="en-US"/>
-          </a:p>
-        </p:txBody>
-      </p:sp>
-      <p:sp>
-        <p:nvSpPr>
-          <p:cNvPr id="38" name="Freeform: Shape 37"/>
-          <p:cNvSpPr/>
-          <p:nvPr/>
-        </p:nvSpPr>
-        <p:spPr>
-          <a:xfrm>
-            <a:off x="1633483" y="3263711"/>
-            <a:ext cx="7793501" cy="2799470"/>
-          </a:xfrm>
-          <a:custGeom>
-            <a:avLst/>
-            <a:gdLst>
-              <a:gd name="connsiteX0" fmla="*/ 0 w 7793501"/>
-              <a:gd name="connsiteY0" fmla="*/ 1012873 h 2799470"/>
-              <a:gd name="connsiteX1" fmla="*/ 3108960 w 7793501"/>
-              <a:gd name="connsiteY1" fmla="*/ 2799470 h 2799470"/>
-              <a:gd name="connsiteX2" fmla="*/ 7793501 w 7793501"/>
-              <a:gd name="connsiteY2" fmla="*/ 0 h 2799470"/>
-            </a:gdLst>
-            <a:ahLst/>
-            <a:cxnLst>
-              <a:cxn ang="0">
-                <a:pos x="connsiteX0" y="connsiteY0"/>
-              </a:cxn>
-              <a:cxn ang="0">
-                <a:pos x="connsiteX1" y="connsiteY1"/>
-              </a:cxn>
-              <a:cxn ang="0">
-                <a:pos x="connsiteX2" y="connsiteY2"/>
-              </a:cxn>
-            </a:cxnLst>
-            <a:rect l="l" t="t" r="r" b="b"/>
-            <a:pathLst>
-              <a:path w="7793501" h="2799470">
-                <a:moveTo>
-                  <a:pt x="0" y="1012873"/>
-                </a:moveTo>
-                <a:lnTo>
-                  <a:pt x="3108960" y="2799470"/>
-                </a:lnTo>
-                <a:lnTo>
-                  <a:pt x="7793501" y="0"/>
-                </a:lnTo>
-              </a:path>
-            </a:pathLst>
-          </a:custGeom>
-          <a:noFill/>
-          <a:ln w="25400">
-            <a:solidFill>
-              <a:schemeClr val="tx1"/>
-            </a:solidFill>
-            <a:headEnd type="triangle" w="lg" len="med"/>
-            <a:tailEnd type="triangle" w="lg" len="med"/>
-          </a:ln>
-        </p:spPr>
-        <p:style>
-          <a:lnRef idx="2">
-            <a:schemeClr val="accent1">
-              <a:shade val="50000"/>
-            </a:schemeClr>
-          </a:lnRef>
-          <a:fillRef idx="1">
-            <a:schemeClr val="accent1"/>
-          </a:fillRef>
-          <a:effectRef idx="0">
-            <a:schemeClr val="accent1"/>
-          </a:effectRef>
-          <a:fontRef idx="minor">
-            <a:schemeClr val="lt1"/>
-          </a:fontRef>
-        </p:style>
-        <p:txBody>
-          <a:bodyPr rtlCol="0" anchor="ctr"/>
-          <a:lstStyle/>
-          <a:p>
-            <a:pPr algn="ctr"/>
-            <a:endParaRPr lang="en-US"/>
-          </a:p>
-        </p:txBody>
-      </p:sp>
-      <p:cxnSp>
-        <p:nvCxnSpPr>
-          <p:cNvPr id="26" name="Straight Arrow Connector 25"/>
-          <p:cNvCxnSpPr/>
-          <p:nvPr/>
-        </p:nvCxnSpPr>
-        <p:spPr>
-          <a:xfrm flipV="1">
-            <a:off x="8201508" y="326171"/>
-            <a:ext cx="0" cy="3657600"/>
-          </a:xfrm>
-          <a:prstGeom prst="straightConnector1">
-            <a:avLst/>
-          </a:prstGeom>
-          <a:ln w="25400">
-            <a:solidFill>
-              <a:schemeClr val="bg2">
-                <a:lumMod val="50000"/>
+                <a:lumMod val="65000"/>
               </a:schemeClr>
             </a:solidFill>
-            <a:tailEnd type="triangle" w="lg" len="med"/>
-          </a:ln>
-        </p:spPr>
-        <p:style>
-          <a:lnRef idx="1">
-            <a:schemeClr val="accent1"/>
-          </a:lnRef>
-          <a:fillRef idx="0">
-            <a:schemeClr val="accent1"/>
-          </a:fillRef>
-          <a:effectRef idx="0">
-            <a:schemeClr val="accent1"/>
-          </a:effectRef>
-          <a:fontRef idx="minor">
-            <a:schemeClr val="tx1"/>
-          </a:fontRef>
-        </p:style>
-      </p:cxnSp>
-      <p:sp>
-        <p:nvSpPr>
-          <p:cNvPr id="23" name="Rectangle 22"/>
-          <p:cNvSpPr/>
-          <p:nvPr/>
-        </p:nvSpPr>
-        <p:spPr>
-          <a:xfrm>
-            <a:off x="3570486" y="3113368"/>
-            <a:ext cx="1371600" cy="1371600"/>
-          </a:xfrm>
-          <a:prstGeom prst="rect">
-            <a:avLst/>
-          </a:prstGeom>
-          <a:solidFill>
-            <a:schemeClr val="accent4"/>
-          </a:solidFill>
-          <a:scene3d>
-            <a:camera prst="isometricLeftDown"/>
-            <a:lightRig rig="threePt" dir="t"/>
-          </a:scene3d>
-          <a:sp3d extrusionH="1270000">
-            <a:extrusionClr>
-              <a:schemeClr val="accent4">
-                <a:lumMod val="75000"/>
+            <a:scene3d>
+              <a:camera prst="isometricLeftDown"/>
+              <a:lightRig rig="threePt" dir="t"/>
+            </a:scene3d>
+            <a:sp3d extrusionH="1270000">
+              <a:extrusionClr>
+                <a:schemeClr val="bg1">
+                  <a:lumMod val="75000"/>
+                </a:schemeClr>
+              </a:extrusionClr>
+            </a:sp3d>
+          </p:spPr>
+          <p:style>
+            <a:lnRef idx="2">
+              <a:schemeClr val="accent1">
+                <a:shade val="50000"/>
               </a:schemeClr>
-            </a:extrusionClr>
-          </a:sp3d>
-        </p:spPr>
-        <p:style>
-          <a:lnRef idx="2">
-            <a:schemeClr val="accent1">
-              <a:shade val="50000"/>
-            </a:schemeClr>
-          </a:lnRef>
-          <a:fillRef idx="1">
-            <a:schemeClr val="accent1"/>
-          </a:fillRef>
-          <a:effectRef idx="0">
-            <a:schemeClr val="accent1"/>
-          </a:effectRef>
-          <a:fontRef idx="minor">
-            <a:schemeClr val="lt1"/>
-          </a:fontRef>
-        </p:style>
-        <p:txBody>
-          <a:bodyPr rtlCol="0" anchor="ctr"/>
-          <a:lstStyle/>
-          <a:p>
-            <a:pPr algn="ctr"/>
-            <a:r>
-              <a:rPr lang="en-US" dirty="0"/>
-              <a:t>Consumer</a:t>
-            </a:r>
-          </a:p>
-          <a:p>
-            <a:pPr algn="ctr"/>
-            <a:r>
-              <a:rPr lang="en-US" dirty="0"/>
-              <a:t>Approach</a:t>
-            </a:r>
-          </a:p>
-        </p:txBody>
-      </p:sp>
-      <p:cxnSp>
-        <p:nvCxnSpPr>
-          <p:cNvPr id="40" name="Straight Arrow Connector 39"/>
-          <p:cNvCxnSpPr>
-            <a:stCxn id="38" idx="1"/>
-          </p:cNvCxnSpPr>
-          <p:nvPr/>
-        </p:nvCxnSpPr>
-        <p:spPr>
-          <a:xfrm flipV="1">
-            <a:off x="4742443" y="1068430"/>
-            <a:ext cx="0" cy="4994751"/>
-          </a:xfrm>
-          <a:prstGeom prst="straightConnector1">
-            <a:avLst/>
-          </a:prstGeom>
-          <a:ln w="25400">
+            </a:lnRef>
+            <a:fillRef idx="1">
+              <a:schemeClr val="accent1"/>
+            </a:fillRef>
+            <a:effectRef idx="0">
+              <a:schemeClr val="accent1"/>
+            </a:effectRef>
+            <a:fontRef idx="minor">
+              <a:schemeClr val="lt1"/>
+            </a:fontRef>
+          </p:style>
+          <p:txBody>
+            <a:bodyPr rtlCol="0" anchor="t"/>
+            <a:lstStyle/>
+            <a:p>
+              <a:pPr algn="ctr"/>
+              <a:r>
+                <a:rPr lang="en-US" dirty="0"/>
+                <a:t>Government Approach</a:t>
+              </a:r>
+            </a:p>
+          </p:txBody>
+        </p:sp>
+        <p:sp>
+          <p:nvSpPr>
+            <p:cNvPr id="20" name="Rectangle 19"/>
+            <p:cNvSpPr/>
+            <p:nvPr/>
+          </p:nvSpPr>
+          <p:spPr>
+            <a:xfrm>
+              <a:off x="4844433" y="838737"/>
+              <a:ext cx="1371600" cy="1371600"/>
+            </a:xfrm>
+            <a:prstGeom prst="rect">
+              <a:avLst/>
+            </a:prstGeom>
             <a:solidFill>
-              <a:schemeClr val="bg2">
-                <a:lumMod val="50000"/>
+              <a:schemeClr val="accent1"/>
+            </a:solidFill>
+            <a:scene3d>
+              <a:camera prst="isometricLeftDown"/>
+              <a:lightRig rig="threePt" dir="t"/>
+            </a:scene3d>
+            <a:sp3d extrusionH="1270000">
+              <a:extrusionClr>
+                <a:schemeClr val="accent5">
+                  <a:lumMod val="75000"/>
+                </a:schemeClr>
+              </a:extrusionClr>
+            </a:sp3d>
+          </p:spPr>
+          <p:style>
+            <a:lnRef idx="2">
+              <a:schemeClr val="accent1">
+                <a:shade val="50000"/>
               </a:schemeClr>
+            </a:lnRef>
+            <a:fillRef idx="1">
+              <a:schemeClr val="accent1"/>
+            </a:fillRef>
+            <a:effectRef idx="0">
+              <a:schemeClr val="accent1"/>
+            </a:effectRef>
+            <a:fontRef idx="minor">
+              <a:schemeClr val="lt1"/>
+            </a:fontRef>
+          </p:style>
+          <p:txBody>
+            <a:bodyPr rtlCol="0" anchor="t"/>
+            <a:lstStyle/>
+            <a:p>
+              <a:pPr algn="ctr"/>
+              <a:endParaRPr lang="en-US" dirty="0"/>
+            </a:p>
+          </p:txBody>
+        </p:sp>
+        <p:sp>
+          <p:nvSpPr>
+            <p:cNvPr id="21" name="Rectangle 20"/>
+            <p:cNvSpPr/>
+            <p:nvPr/>
+          </p:nvSpPr>
+          <p:spPr>
+            <a:xfrm>
+              <a:off x="6110029" y="2959130"/>
+              <a:ext cx="1371600" cy="1371600"/>
+            </a:xfrm>
+            <a:prstGeom prst="rect">
+              <a:avLst/>
+            </a:prstGeom>
+            <a:solidFill>
+              <a:srgbClr val="7030A0"/>
             </a:solidFill>
-            <a:tailEnd type="triangle" w="lg" len="med"/>
-          </a:ln>
-        </p:spPr>
-        <p:style>
-          <a:lnRef idx="1">
-            <a:schemeClr val="accent1"/>
-          </a:lnRef>
-          <a:fillRef idx="0">
-            <a:schemeClr val="accent1"/>
-          </a:fillRef>
-          <a:effectRef idx="0">
-            <a:schemeClr val="accent1"/>
-          </a:effectRef>
-          <a:fontRef idx="minor">
-            <a:schemeClr val="tx1"/>
-          </a:fontRef>
-        </p:style>
-      </p:cxnSp>
+            <a:scene3d>
+              <a:camera prst="isometricLeftDown"/>
+              <a:lightRig rig="threePt" dir="t"/>
+            </a:scene3d>
+            <a:sp3d extrusionH="1270000">
+              <a:extrusionClr>
+                <a:schemeClr val="accent5">
+                  <a:lumMod val="50000"/>
+                </a:schemeClr>
+              </a:extrusionClr>
+            </a:sp3d>
+          </p:spPr>
+          <p:style>
+            <a:lnRef idx="2">
+              <a:schemeClr val="accent1">
+                <a:shade val="50000"/>
+              </a:schemeClr>
+            </a:lnRef>
+            <a:fillRef idx="1">
+              <a:schemeClr val="accent1"/>
+            </a:fillRef>
+            <a:effectRef idx="0">
+              <a:schemeClr val="accent1"/>
+            </a:effectRef>
+            <a:fontRef idx="minor">
+              <a:schemeClr val="lt1"/>
+            </a:fontRef>
+          </p:style>
+          <p:txBody>
+            <a:bodyPr rtlCol="0" anchor="ctr"/>
+            <a:lstStyle/>
+            <a:p>
+              <a:pPr algn="ctr"/>
+              <a:r>
+                <a:rPr lang="en-US" dirty="0"/>
+                <a:t>Ethnic Approach</a:t>
+              </a:r>
+            </a:p>
+          </p:txBody>
+        </p:sp>
+        <p:sp>
+          <p:nvSpPr>
+            <p:cNvPr id="19" name="Rectangle 18"/>
+            <p:cNvSpPr/>
+            <p:nvPr/>
+          </p:nvSpPr>
+          <p:spPr>
+            <a:xfrm>
+              <a:off x="6110029" y="1562929"/>
+              <a:ext cx="1371600" cy="1371600"/>
+            </a:xfrm>
+            <a:prstGeom prst="rect">
+              <a:avLst/>
+            </a:prstGeom>
+            <a:solidFill>
+              <a:schemeClr val="accent1"/>
+            </a:solidFill>
+            <a:scene3d>
+              <a:camera prst="isometricLeftDown"/>
+              <a:lightRig rig="threePt" dir="t"/>
+            </a:scene3d>
+            <a:sp3d extrusionH="1270000">
+              <a:extrusionClr>
+                <a:schemeClr val="accent5">
+                  <a:lumMod val="75000"/>
+                </a:schemeClr>
+              </a:extrusionClr>
+            </a:sp3d>
+          </p:spPr>
+          <p:style>
+            <a:lnRef idx="2">
+              <a:schemeClr val="accent1">
+                <a:shade val="50000"/>
+              </a:schemeClr>
+            </a:lnRef>
+            <a:fillRef idx="1">
+              <a:schemeClr val="accent1"/>
+            </a:fillRef>
+            <a:effectRef idx="0">
+              <a:schemeClr val="accent1"/>
+            </a:effectRef>
+            <a:fontRef idx="minor">
+              <a:schemeClr val="lt1"/>
+            </a:fontRef>
+          </p:style>
+          <p:txBody>
+            <a:bodyPr rtlCol="0" anchor="ctr"/>
+            <a:lstStyle/>
+            <a:p>
+              <a:pPr algn="ctr"/>
+              <a:endParaRPr lang="en-US" dirty="0"/>
+            </a:p>
+          </p:txBody>
+        </p:sp>
+        <p:sp>
+          <p:nvSpPr>
+            <p:cNvPr id="22" name="Rectangle 21"/>
+            <p:cNvSpPr/>
+            <p:nvPr/>
+          </p:nvSpPr>
+          <p:spPr>
+            <a:xfrm>
+              <a:off x="2314544" y="3765848"/>
+              <a:ext cx="1371600" cy="1371600"/>
+            </a:xfrm>
+            <a:prstGeom prst="rect">
+              <a:avLst/>
+            </a:prstGeom>
+            <a:scene3d>
+              <a:camera prst="isometricLeftDown"/>
+              <a:lightRig rig="threePt" dir="t"/>
+            </a:scene3d>
+            <a:sp3d extrusionH="1270000"/>
+          </p:spPr>
+          <p:style>
+            <a:lnRef idx="2">
+              <a:schemeClr val="accent1">
+                <a:shade val="50000"/>
+              </a:schemeClr>
+            </a:lnRef>
+            <a:fillRef idx="1">
+              <a:schemeClr val="accent1"/>
+            </a:fillRef>
+            <a:effectRef idx="0">
+              <a:schemeClr val="accent1"/>
+            </a:effectRef>
+            <a:fontRef idx="minor">
+              <a:schemeClr val="lt1"/>
+            </a:fontRef>
+          </p:style>
+          <p:txBody>
+            <a:bodyPr rtlCol="0" anchor="ctr"/>
+            <a:lstStyle/>
+            <a:p>
+              <a:pPr algn="ctr"/>
+              <a:endParaRPr lang="en-US" dirty="0"/>
+            </a:p>
+          </p:txBody>
+        </p:sp>
+        <p:sp>
+          <p:nvSpPr>
+            <p:cNvPr id="29" name="TextBox 28"/>
+            <p:cNvSpPr txBox="1"/>
+            <p:nvPr/>
+          </p:nvSpPr>
+          <p:spPr>
+            <a:xfrm rot="19705333">
+              <a:off x="5993001" y="4827571"/>
+              <a:ext cx="1828800" cy="369332"/>
+            </a:xfrm>
+            <a:prstGeom prst="rect">
+              <a:avLst/>
+            </a:prstGeom>
+            <a:noFill/>
+          </p:spPr>
+          <p:txBody>
+            <a:bodyPr wrap="square" rtlCol="0">
+              <a:spAutoFit/>
+            </a:bodyPr>
+            <a:lstStyle/>
+            <a:p>
+              <a:pPr algn="ctr"/>
+              <a:r>
+                <a:rPr lang="en-US" b="1" dirty="0"/>
+                <a:t>Membership</a:t>
+              </a:r>
+            </a:p>
+          </p:txBody>
+        </p:sp>
+        <p:sp>
+          <p:nvSpPr>
+            <p:cNvPr id="30" name="TextBox 29"/>
+            <p:cNvSpPr txBox="1"/>
+            <p:nvPr/>
+          </p:nvSpPr>
+          <p:spPr>
+            <a:xfrm rot="2239251">
+              <a:off x="7664732" y="4480957"/>
+              <a:ext cx="1371600" cy="646331"/>
+            </a:xfrm>
+            <a:prstGeom prst="rect">
+              <a:avLst/>
+            </a:prstGeom>
+            <a:noFill/>
+          </p:spPr>
+          <p:txBody>
+            <a:bodyPr wrap="square" rtlCol="0">
+              <a:spAutoFit/>
+            </a:bodyPr>
+            <a:lstStyle/>
+            <a:p>
+              <a:r>
+                <a:rPr lang="en-US" dirty="0"/>
+                <a:t>Membership is restricted</a:t>
+              </a:r>
+            </a:p>
+          </p:txBody>
+        </p:sp>
+        <p:sp>
+          <p:nvSpPr>
+            <p:cNvPr id="31" name="TextBox 30"/>
+            <p:cNvSpPr txBox="1"/>
+            <p:nvPr/>
+          </p:nvSpPr>
+          <p:spPr>
+            <a:xfrm rot="2300708">
+              <a:off x="5006913" y="5997297"/>
+              <a:ext cx="1371600" cy="646331"/>
+            </a:xfrm>
+            <a:prstGeom prst="rect">
+              <a:avLst/>
+            </a:prstGeom>
+            <a:noFill/>
+          </p:spPr>
+          <p:txBody>
+            <a:bodyPr wrap="square" rtlCol="0">
+              <a:spAutoFit/>
+            </a:bodyPr>
+            <a:lstStyle/>
+            <a:p>
+              <a:r>
+                <a:rPr lang="en-US" dirty="0"/>
+                <a:t>Membership is open</a:t>
+              </a:r>
+            </a:p>
+          </p:txBody>
+        </p:sp>
+        <p:sp>
+          <p:nvSpPr>
+            <p:cNvPr id="32" name="TextBox 31"/>
+            <p:cNvSpPr txBox="1"/>
+            <p:nvPr/>
+          </p:nvSpPr>
+          <p:spPr>
+            <a:xfrm rot="1851826">
+              <a:off x="2615296" y="5288868"/>
+              <a:ext cx="1371600" cy="379828"/>
+            </a:xfrm>
+            <a:prstGeom prst="rect">
+              <a:avLst/>
+            </a:prstGeom>
+            <a:noFill/>
+          </p:spPr>
+          <p:txBody>
+            <a:bodyPr wrap="square" rtlCol="0">
+              <a:spAutoFit/>
+            </a:bodyPr>
+            <a:lstStyle/>
+            <a:p>
+              <a:pPr algn="ctr"/>
+              <a:r>
+                <a:rPr lang="en-US" b="1" dirty="0"/>
+                <a:t>Rules</a:t>
+              </a:r>
+            </a:p>
+          </p:txBody>
+        </p:sp>
+        <p:sp>
+          <p:nvSpPr>
+            <p:cNvPr id="33" name="TextBox 32"/>
+            <p:cNvSpPr txBox="1"/>
+            <p:nvPr/>
+          </p:nvSpPr>
+          <p:spPr>
+            <a:xfrm rot="16200000">
+              <a:off x="7477022" y="2176624"/>
+              <a:ext cx="1828800" cy="379828"/>
+            </a:xfrm>
+            <a:prstGeom prst="rect">
+              <a:avLst/>
+            </a:prstGeom>
+            <a:noFill/>
+          </p:spPr>
+          <p:txBody>
+            <a:bodyPr wrap="square" rtlCol="0">
+              <a:spAutoFit/>
+            </a:bodyPr>
+            <a:lstStyle/>
+            <a:p>
+              <a:pPr algn="ctr"/>
+              <a:r>
+                <a:rPr lang="en-US" b="1" dirty="0"/>
+                <a:t>Accountability</a:t>
+              </a:r>
+            </a:p>
+          </p:txBody>
+        </p:sp>
+        <p:sp>
+          <p:nvSpPr>
+            <p:cNvPr id="34" name="TextBox 33"/>
+            <p:cNvSpPr txBox="1"/>
+            <p:nvPr/>
+          </p:nvSpPr>
+          <p:spPr>
+            <a:xfrm rot="19887021">
+              <a:off x="8515834" y="606553"/>
+              <a:ext cx="2286000" cy="923330"/>
+            </a:xfrm>
+            <a:prstGeom prst="rect">
+              <a:avLst/>
+            </a:prstGeom>
+            <a:noFill/>
+          </p:spPr>
+          <p:txBody>
+            <a:bodyPr wrap="square" rtlCol="0">
+              <a:spAutoFit/>
+            </a:bodyPr>
+            <a:lstStyle/>
+            <a:p>
+              <a:r>
+                <a:rPr lang="en-US" dirty="0"/>
+                <a:t>Community members care a great deal that others follow the rules</a:t>
+              </a:r>
+            </a:p>
+          </p:txBody>
+        </p:sp>
+        <p:sp>
+          <p:nvSpPr>
+            <p:cNvPr id="35" name="TextBox 34"/>
+            <p:cNvSpPr txBox="1"/>
+            <p:nvPr/>
+          </p:nvSpPr>
+          <p:spPr>
+            <a:xfrm rot="19814100">
+              <a:off x="8518962" y="2078820"/>
+              <a:ext cx="2286000" cy="923330"/>
+            </a:xfrm>
+            <a:prstGeom prst="rect">
+              <a:avLst/>
+            </a:prstGeom>
+            <a:noFill/>
+          </p:spPr>
+          <p:txBody>
+            <a:bodyPr wrap="square" rtlCol="0">
+              <a:spAutoFit/>
+            </a:bodyPr>
+            <a:lstStyle/>
+            <a:p>
+              <a:r>
+                <a:rPr lang="en-US" dirty="0"/>
+                <a:t>Community members care very little if others follow the rules</a:t>
+              </a:r>
+            </a:p>
+          </p:txBody>
+        </p:sp>
+        <p:sp>
+          <p:nvSpPr>
+            <p:cNvPr id="36" name="TextBox 35"/>
+            <p:cNvSpPr txBox="1"/>
+            <p:nvPr/>
+          </p:nvSpPr>
+          <p:spPr>
+            <a:xfrm rot="19226394">
+              <a:off x="1166951" y="5326461"/>
+              <a:ext cx="1828800" cy="646331"/>
+            </a:xfrm>
+            <a:prstGeom prst="rect">
+              <a:avLst/>
+            </a:prstGeom>
+            <a:noFill/>
+          </p:spPr>
+          <p:txBody>
+            <a:bodyPr wrap="square" rtlCol="0">
+              <a:spAutoFit/>
+            </a:bodyPr>
+            <a:lstStyle/>
+            <a:p>
+              <a:pPr algn="r"/>
+              <a:r>
+                <a:rPr lang="en-US" dirty="0"/>
+                <a:t>Fairly rigid about community rules</a:t>
+              </a:r>
+            </a:p>
+          </p:txBody>
+        </p:sp>
+        <p:sp>
+          <p:nvSpPr>
+            <p:cNvPr id="37" name="TextBox 36"/>
+            <p:cNvSpPr txBox="1"/>
+            <p:nvPr/>
+          </p:nvSpPr>
+          <p:spPr>
+            <a:xfrm rot="19216229">
+              <a:off x="2706027" y="6050952"/>
+              <a:ext cx="1645920" cy="646331"/>
+            </a:xfrm>
+            <a:prstGeom prst="rect">
+              <a:avLst/>
+            </a:prstGeom>
+            <a:noFill/>
+          </p:spPr>
+          <p:txBody>
+            <a:bodyPr wrap="square" rtlCol="0">
+              <a:spAutoFit/>
+            </a:bodyPr>
+            <a:lstStyle/>
+            <a:p>
+              <a:pPr algn="r"/>
+              <a:r>
+                <a:rPr lang="en-US" dirty="0"/>
+                <a:t>Flexible about the rules</a:t>
+              </a:r>
+            </a:p>
+          </p:txBody>
+        </p:sp>
+        <p:sp>
+          <p:nvSpPr>
+            <p:cNvPr id="24" name="Rectangle 23"/>
+            <p:cNvSpPr/>
+            <p:nvPr/>
+          </p:nvSpPr>
+          <p:spPr>
+            <a:xfrm>
+              <a:off x="2313117" y="2339425"/>
+              <a:ext cx="1371600" cy="1371600"/>
+            </a:xfrm>
+            <a:prstGeom prst="rect">
+              <a:avLst/>
+            </a:prstGeom>
+            <a:solidFill>
+              <a:schemeClr val="accent6"/>
+            </a:solidFill>
+            <a:scene3d>
+              <a:camera prst="isometricLeftDown"/>
+              <a:lightRig rig="threePt" dir="t"/>
+            </a:scene3d>
+            <a:sp3d extrusionH="1270000">
+              <a:extrusionClr>
+                <a:schemeClr val="accent6">
+                  <a:lumMod val="75000"/>
+                </a:schemeClr>
+              </a:extrusionClr>
+            </a:sp3d>
+          </p:spPr>
+          <p:style>
+            <a:lnRef idx="2">
+              <a:schemeClr val="accent1">
+                <a:shade val="50000"/>
+              </a:schemeClr>
+            </a:lnRef>
+            <a:fillRef idx="1">
+              <a:schemeClr val="accent1"/>
+            </a:fillRef>
+            <a:effectRef idx="0">
+              <a:schemeClr val="accent1"/>
+            </a:effectRef>
+            <a:fontRef idx="minor">
+              <a:schemeClr val="lt1"/>
+            </a:fontRef>
+          </p:style>
+          <p:txBody>
+            <a:bodyPr rtlCol="0" anchor="ctr"/>
+            <a:lstStyle/>
+            <a:p>
+              <a:pPr algn="ctr"/>
+              <a:r>
+                <a:rPr lang="en-US" dirty="0"/>
+                <a:t>Business Approach</a:t>
+              </a:r>
+            </a:p>
+          </p:txBody>
+        </p:sp>
+        <p:sp>
+          <p:nvSpPr>
+            <p:cNvPr id="25" name="Rectangle 24"/>
+            <p:cNvSpPr/>
+            <p:nvPr/>
+          </p:nvSpPr>
+          <p:spPr>
+            <a:xfrm>
+              <a:off x="3564098" y="4485968"/>
+              <a:ext cx="1371600" cy="1371600"/>
+            </a:xfrm>
+            <a:prstGeom prst="rect">
+              <a:avLst/>
+            </a:prstGeom>
+            <a:scene3d>
+              <a:camera prst="isometricLeftDown"/>
+              <a:lightRig rig="threePt" dir="t"/>
+            </a:scene3d>
+            <a:sp3d extrusionH="1270000"/>
+          </p:spPr>
+          <p:style>
+            <a:lnRef idx="2">
+              <a:schemeClr val="accent1">
+                <a:shade val="50000"/>
+              </a:schemeClr>
+            </a:lnRef>
+            <a:fillRef idx="1">
+              <a:schemeClr val="accent1"/>
+            </a:fillRef>
+            <a:effectRef idx="0">
+              <a:schemeClr val="accent1"/>
+            </a:effectRef>
+            <a:fontRef idx="minor">
+              <a:schemeClr val="lt1"/>
+            </a:fontRef>
+          </p:style>
+          <p:txBody>
+            <a:bodyPr rtlCol="0" anchor="ctr"/>
+            <a:lstStyle/>
+            <a:p>
+              <a:pPr algn="ctr"/>
+              <a:endParaRPr lang="en-US"/>
+            </a:p>
+          </p:txBody>
+        </p:sp>
+        <p:sp>
+          <p:nvSpPr>
+            <p:cNvPr id="38" name="Freeform: Shape 37"/>
+            <p:cNvSpPr/>
+            <p:nvPr/>
+          </p:nvSpPr>
+          <p:spPr>
+            <a:xfrm>
+              <a:off x="1633483" y="3263711"/>
+              <a:ext cx="7793501" cy="2799470"/>
+            </a:xfrm>
+            <a:custGeom>
+              <a:avLst/>
+              <a:gdLst>
+                <a:gd name="connsiteX0" fmla="*/ 0 w 7793501"/>
+                <a:gd name="connsiteY0" fmla="*/ 1012873 h 2799470"/>
+                <a:gd name="connsiteX1" fmla="*/ 3108960 w 7793501"/>
+                <a:gd name="connsiteY1" fmla="*/ 2799470 h 2799470"/>
+                <a:gd name="connsiteX2" fmla="*/ 7793501 w 7793501"/>
+                <a:gd name="connsiteY2" fmla="*/ 0 h 2799470"/>
+              </a:gdLst>
+              <a:ahLst/>
+              <a:cxnLst>
+                <a:cxn ang="0">
+                  <a:pos x="connsiteX0" y="connsiteY0"/>
+                </a:cxn>
+                <a:cxn ang="0">
+                  <a:pos x="connsiteX1" y="connsiteY1"/>
+                </a:cxn>
+                <a:cxn ang="0">
+                  <a:pos x="connsiteX2" y="connsiteY2"/>
+                </a:cxn>
+              </a:cxnLst>
+              <a:rect l="l" t="t" r="r" b="b"/>
+              <a:pathLst>
+                <a:path w="7793501" h="2799470">
+                  <a:moveTo>
+                    <a:pt x="0" y="1012873"/>
+                  </a:moveTo>
+                  <a:lnTo>
+                    <a:pt x="3108960" y="2799470"/>
+                  </a:lnTo>
+                  <a:lnTo>
+                    <a:pt x="7793501" y="0"/>
+                  </a:lnTo>
+                </a:path>
+              </a:pathLst>
+            </a:custGeom>
+            <a:noFill/>
+            <a:ln w="25400">
+              <a:solidFill>
+                <a:schemeClr val="tx1"/>
+              </a:solidFill>
+              <a:headEnd type="triangle" w="lg" len="med"/>
+              <a:tailEnd type="triangle" w="lg" len="med"/>
+            </a:ln>
+          </p:spPr>
+          <p:style>
+            <a:lnRef idx="2">
+              <a:schemeClr val="accent1">
+                <a:shade val="50000"/>
+              </a:schemeClr>
+            </a:lnRef>
+            <a:fillRef idx="1">
+              <a:schemeClr val="accent1"/>
+            </a:fillRef>
+            <a:effectRef idx="0">
+              <a:schemeClr val="accent1"/>
+            </a:effectRef>
+            <a:fontRef idx="minor">
+              <a:schemeClr val="lt1"/>
+            </a:fontRef>
+          </p:style>
+          <p:txBody>
+            <a:bodyPr rtlCol="0" anchor="ctr"/>
+            <a:lstStyle/>
+            <a:p>
+              <a:pPr algn="ctr"/>
+              <a:endParaRPr lang="en-US"/>
+            </a:p>
+          </p:txBody>
+        </p:sp>
+        <p:cxnSp>
+          <p:nvCxnSpPr>
+            <p:cNvPr id="26" name="Straight Arrow Connector 25"/>
+            <p:cNvCxnSpPr/>
+            <p:nvPr/>
+          </p:nvCxnSpPr>
+          <p:spPr>
+            <a:xfrm flipV="1">
+              <a:off x="8201508" y="326171"/>
+              <a:ext cx="0" cy="3657600"/>
+            </a:xfrm>
+            <a:prstGeom prst="straightConnector1">
+              <a:avLst/>
+            </a:prstGeom>
+            <a:ln w="25400">
+              <a:solidFill>
+                <a:schemeClr val="bg2">
+                  <a:lumMod val="50000"/>
+                </a:schemeClr>
+              </a:solidFill>
+              <a:tailEnd type="triangle" w="lg" len="med"/>
+            </a:ln>
+          </p:spPr>
+          <p:style>
+            <a:lnRef idx="1">
+              <a:schemeClr val="accent1"/>
+            </a:lnRef>
+            <a:fillRef idx="0">
+              <a:schemeClr val="accent1"/>
+            </a:fillRef>
+            <a:effectRef idx="0">
+              <a:schemeClr val="accent1"/>
+            </a:effectRef>
+            <a:fontRef idx="minor">
+              <a:schemeClr val="tx1"/>
+            </a:fontRef>
+          </p:style>
+        </p:cxnSp>
+        <p:sp>
+          <p:nvSpPr>
+            <p:cNvPr id="23" name="Rectangle 22"/>
+            <p:cNvSpPr/>
+            <p:nvPr/>
+          </p:nvSpPr>
+          <p:spPr>
+            <a:xfrm>
+              <a:off x="3570486" y="3113368"/>
+              <a:ext cx="1371600" cy="1371600"/>
+            </a:xfrm>
+            <a:prstGeom prst="rect">
+              <a:avLst/>
+            </a:prstGeom>
+            <a:solidFill>
+              <a:schemeClr val="accent4"/>
+            </a:solidFill>
+            <a:scene3d>
+              <a:camera prst="isometricLeftDown"/>
+              <a:lightRig rig="threePt" dir="t"/>
+            </a:scene3d>
+            <a:sp3d extrusionH="1270000">
+              <a:extrusionClr>
+                <a:schemeClr val="accent4">
+                  <a:lumMod val="75000"/>
+                </a:schemeClr>
+              </a:extrusionClr>
+            </a:sp3d>
+          </p:spPr>
+          <p:style>
+            <a:lnRef idx="2">
+              <a:schemeClr val="accent1">
+                <a:shade val="50000"/>
+              </a:schemeClr>
+            </a:lnRef>
+            <a:fillRef idx="1">
+              <a:schemeClr val="accent1"/>
+            </a:fillRef>
+            <a:effectRef idx="0">
+              <a:schemeClr val="accent1"/>
+            </a:effectRef>
+            <a:fontRef idx="minor">
+              <a:schemeClr val="lt1"/>
+            </a:fontRef>
+          </p:style>
+          <p:txBody>
+            <a:bodyPr rtlCol="0" anchor="ctr"/>
+            <a:lstStyle/>
+            <a:p>
+              <a:pPr algn="ctr"/>
+              <a:r>
+                <a:rPr lang="en-US" dirty="0"/>
+                <a:t>Consumer</a:t>
+              </a:r>
+            </a:p>
+            <a:p>
+              <a:pPr algn="ctr"/>
+              <a:r>
+                <a:rPr lang="en-US" dirty="0"/>
+                <a:t>Approach</a:t>
+              </a:r>
+            </a:p>
+          </p:txBody>
+        </p:sp>
+        <p:cxnSp>
+          <p:nvCxnSpPr>
+            <p:cNvPr id="40" name="Straight Arrow Connector 39"/>
+            <p:cNvCxnSpPr>
+              <a:stCxn id="38" idx="1"/>
+            </p:cNvCxnSpPr>
+            <p:nvPr/>
+          </p:nvCxnSpPr>
+          <p:spPr>
+            <a:xfrm flipV="1">
+              <a:off x="4742443" y="1068430"/>
+              <a:ext cx="0" cy="4994751"/>
+            </a:xfrm>
+            <a:prstGeom prst="straightConnector1">
+              <a:avLst/>
+            </a:prstGeom>
+            <a:ln w="25400">
+              <a:solidFill>
+                <a:schemeClr val="bg2">
+                  <a:lumMod val="50000"/>
+                </a:schemeClr>
+              </a:solidFill>
+              <a:tailEnd type="triangle" w="lg" len="med"/>
+            </a:ln>
+          </p:spPr>
+          <p:style>
+            <a:lnRef idx="1">
+              <a:schemeClr val="accent1"/>
+            </a:lnRef>
+            <a:fillRef idx="0">
+              <a:schemeClr val="accent1"/>
+            </a:fillRef>
+            <a:effectRef idx="0">
+              <a:schemeClr val="accent1"/>
+            </a:effectRef>
+            <a:fontRef idx="minor">
+              <a:schemeClr val="tx1"/>
+            </a:fontRef>
+          </p:style>
+        </p:cxnSp>
+      </p:grpSp>
     </p:spTree>
     <p:extLst>
       <p:ext uri="{BB962C8B-B14F-4D97-AF65-F5344CB8AC3E}">

</xml_diff>

<commit_message>
Modified figure of community dimensions and associated portions of background
</commit_message>
<xml_diff>
--- a/Notes/SOC5060_Framework_Monti_MakingCommunity_2019v00.pptx
+++ b/Notes/SOC5060_Framework_Monti_MakingCommunity_2019v00.pptx
@@ -242,7 +242,7 @@
           <a:p>
             <a:fld id="{40CF262A-BA9E-4FD4-B7A4-17D33C6E7493}" type="datetimeFigureOut">
               <a:rPr lang="en-US" smtClean="0"/>
-              <a:t>10/17/2019</a:t>
+              <a:t>11/16/2019</a:t>
             </a:fld>
             <a:endParaRPr lang="en-US"/>
           </a:p>
@@ -410,7 +410,7 @@
           <a:p>
             <a:fld id="{40CF262A-BA9E-4FD4-B7A4-17D33C6E7493}" type="datetimeFigureOut">
               <a:rPr lang="en-US" smtClean="0"/>
-              <a:t>10/17/2019</a:t>
+              <a:t>11/16/2019</a:t>
             </a:fld>
             <a:endParaRPr lang="en-US"/>
           </a:p>
@@ -588,7 +588,7 @@
           <a:p>
             <a:fld id="{40CF262A-BA9E-4FD4-B7A4-17D33C6E7493}" type="datetimeFigureOut">
               <a:rPr lang="en-US" smtClean="0"/>
-              <a:t>10/17/2019</a:t>
+              <a:t>11/16/2019</a:t>
             </a:fld>
             <a:endParaRPr lang="en-US"/>
           </a:p>
@@ -756,7 +756,7 @@
           <a:p>
             <a:fld id="{40CF262A-BA9E-4FD4-B7A4-17D33C6E7493}" type="datetimeFigureOut">
               <a:rPr lang="en-US" smtClean="0"/>
-              <a:t>10/17/2019</a:t>
+              <a:t>11/16/2019</a:t>
             </a:fld>
             <a:endParaRPr lang="en-US"/>
           </a:p>
@@ -1001,7 +1001,7 @@
           <a:p>
             <a:fld id="{40CF262A-BA9E-4FD4-B7A4-17D33C6E7493}" type="datetimeFigureOut">
               <a:rPr lang="en-US" smtClean="0"/>
-              <a:t>10/17/2019</a:t>
+              <a:t>11/16/2019</a:t>
             </a:fld>
             <a:endParaRPr lang="en-US"/>
           </a:p>
@@ -1230,7 +1230,7 @@
           <a:p>
             <a:fld id="{40CF262A-BA9E-4FD4-B7A4-17D33C6E7493}" type="datetimeFigureOut">
               <a:rPr lang="en-US" smtClean="0"/>
-              <a:t>10/17/2019</a:t>
+              <a:t>11/16/2019</a:t>
             </a:fld>
             <a:endParaRPr lang="en-US"/>
           </a:p>
@@ -1594,7 +1594,7 @@
           <a:p>
             <a:fld id="{40CF262A-BA9E-4FD4-B7A4-17D33C6E7493}" type="datetimeFigureOut">
               <a:rPr lang="en-US" smtClean="0"/>
-              <a:t>10/17/2019</a:t>
+              <a:t>11/16/2019</a:t>
             </a:fld>
             <a:endParaRPr lang="en-US"/>
           </a:p>
@@ -1711,7 +1711,7 @@
           <a:p>
             <a:fld id="{40CF262A-BA9E-4FD4-B7A4-17D33C6E7493}" type="datetimeFigureOut">
               <a:rPr lang="en-US" smtClean="0"/>
-              <a:t>10/17/2019</a:t>
+              <a:t>11/16/2019</a:t>
             </a:fld>
             <a:endParaRPr lang="en-US"/>
           </a:p>
@@ -1806,7 +1806,7 @@
           <a:p>
             <a:fld id="{40CF262A-BA9E-4FD4-B7A4-17D33C6E7493}" type="datetimeFigureOut">
               <a:rPr lang="en-US" smtClean="0"/>
-              <a:t>10/17/2019</a:t>
+              <a:t>11/16/2019</a:t>
             </a:fld>
             <a:endParaRPr lang="en-US"/>
           </a:p>
@@ -2081,7 +2081,7 @@
           <a:p>
             <a:fld id="{40CF262A-BA9E-4FD4-B7A4-17D33C6E7493}" type="datetimeFigureOut">
               <a:rPr lang="en-US" smtClean="0"/>
-              <a:t>10/17/2019</a:t>
+              <a:t>11/16/2019</a:t>
             </a:fld>
             <a:endParaRPr lang="en-US"/>
           </a:p>
@@ -2333,7 +2333,7 @@
           <a:p>
             <a:fld id="{40CF262A-BA9E-4FD4-B7A4-17D33C6E7493}" type="datetimeFigureOut">
               <a:rPr lang="en-US" smtClean="0"/>
-              <a:t>10/17/2019</a:t>
+              <a:t>11/16/2019</a:t>
             </a:fld>
             <a:endParaRPr lang="en-US"/>
           </a:p>
@@ -2544,7 +2544,7 @@
           <a:p>
             <a:fld id="{40CF262A-BA9E-4FD4-B7A4-17D33C6E7493}" type="datetimeFigureOut">
               <a:rPr lang="en-US" smtClean="0"/>
-              <a:t>10/17/2019</a:t>
+              <a:t>11/16/2019</a:t>
             </a:fld>
             <a:endParaRPr lang="en-US"/>
           </a:p>
@@ -3855,871 +3855,883 @@
           <a:chExt cx="0" cy="0"/>
         </a:xfrm>
       </p:grpSpPr>
-      <p:sp>
-        <p:nvSpPr>
-          <p:cNvPr id="18" name="Rectangle 17"/>
-          <p:cNvSpPr/>
+      <p:grpSp>
+        <p:nvGrpSpPr>
+          <p:cNvPr id="7" name="Group 6"/>
+          <p:cNvGrpSpPr/>
           <p:nvPr/>
-        </p:nvSpPr>
-        <p:spPr>
+        </p:nvGrpSpPr>
+        <p:grpSpPr>
           <a:xfrm>
-            <a:off x="4833633" y="2224876"/>
-            <a:ext cx="1371600" cy="1371600"/>
+            <a:off x="1166951" y="143296"/>
+            <a:ext cx="9638011" cy="6626507"/>
+            <a:chOff x="1166951" y="143296"/>
+            <a:chExt cx="9638011" cy="6626507"/>
           </a:xfrm>
-          <a:prstGeom prst="rect">
-            <a:avLst/>
-          </a:prstGeom>
-          <a:solidFill>
-            <a:schemeClr val="bg1">
-              <a:lumMod val="65000"/>
-            </a:schemeClr>
-          </a:solidFill>
-          <a:scene3d>
-            <a:camera prst="isometricLeftDown"/>
-            <a:lightRig rig="threePt" dir="t"/>
-          </a:scene3d>
-          <a:sp3d extrusionH="1270000">
-            <a:extrusionClr>
+        </p:grpSpPr>
+        <p:sp>
+          <p:nvSpPr>
+            <p:cNvPr id="19" name="Rectangle 18"/>
+            <p:cNvSpPr/>
+            <p:nvPr/>
+          </p:nvSpPr>
+          <p:spPr>
+            <a:xfrm>
+              <a:off x="4859048" y="2459253"/>
+              <a:ext cx="1371600" cy="1371600"/>
+            </a:xfrm>
+            <a:prstGeom prst="rect">
+              <a:avLst/>
+            </a:prstGeom>
+            <a:solidFill>
               <a:schemeClr val="bg1">
-                <a:lumMod val="75000"/>
-              </a:schemeClr>
-            </a:extrusionClr>
-          </a:sp3d>
-        </p:spPr>
-        <p:style>
-          <a:lnRef idx="2">
-            <a:schemeClr val="accent1">
-              <a:shade val="50000"/>
-            </a:schemeClr>
-          </a:lnRef>
-          <a:fillRef idx="1">
-            <a:schemeClr val="accent1"/>
-          </a:fillRef>
-          <a:effectRef idx="0">
-            <a:schemeClr val="accent1"/>
-          </a:effectRef>
-          <a:fontRef idx="minor">
-            <a:schemeClr val="lt1"/>
-          </a:fontRef>
-        </p:style>
-        <p:txBody>
-          <a:bodyPr rtlCol="0" anchor="t"/>
-          <a:lstStyle/>
-          <a:p>
-            <a:pPr algn="ctr"/>
-            <a:r>
-              <a:rPr lang="en-US" dirty="0"/>
-              <a:t>Nationalistic</a:t>
-            </a:r>
-          </a:p>
-        </p:txBody>
-      </p:sp>
-      <p:sp>
-        <p:nvSpPr>
-          <p:cNvPr id="20" name="Rectangle 19"/>
-          <p:cNvSpPr/>
-          <p:nvPr/>
-        </p:nvSpPr>
-        <p:spPr>
-          <a:xfrm>
-            <a:off x="4844433" y="838737"/>
-            <a:ext cx="1371600" cy="1371600"/>
-          </a:xfrm>
-          <a:prstGeom prst="rect">
-            <a:avLst/>
-          </a:prstGeom>
-          <a:solidFill>
-            <a:schemeClr val="accent1"/>
-          </a:solidFill>
-          <a:scene3d>
-            <a:camera prst="isometricLeftDown"/>
-            <a:lightRig rig="threePt" dir="t"/>
-          </a:scene3d>
-          <a:sp3d extrusionH="1270000">
-            <a:extrusionClr>
-              <a:schemeClr val="accent5">
-                <a:lumMod val="75000"/>
-              </a:schemeClr>
-            </a:extrusionClr>
-          </a:sp3d>
-        </p:spPr>
-        <p:style>
-          <a:lnRef idx="2">
-            <a:schemeClr val="accent1">
-              <a:shade val="50000"/>
-            </a:schemeClr>
-          </a:lnRef>
-          <a:fillRef idx="1">
-            <a:schemeClr val="accent1"/>
-          </a:fillRef>
-          <a:effectRef idx="0">
-            <a:schemeClr val="accent1"/>
-          </a:effectRef>
-          <a:fontRef idx="minor">
-            <a:schemeClr val="lt1"/>
-          </a:fontRef>
-        </p:style>
-        <p:txBody>
-          <a:bodyPr rtlCol="0" anchor="t"/>
-          <a:lstStyle/>
-          <a:p>
-            <a:pPr algn="ctr"/>
-            <a:endParaRPr lang="en-US" dirty="0"/>
-          </a:p>
-        </p:txBody>
-      </p:sp>
-      <p:sp>
-        <p:nvSpPr>
-          <p:cNvPr id="21" name="Rectangle 20"/>
-          <p:cNvSpPr/>
-          <p:nvPr/>
-        </p:nvSpPr>
-        <p:spPr>
-          <a:xfrm>
-            <a:off x="6110029" y="2959130"/>
-            <a:ext cx="1371600" cy="1371600"/>
-          </a:xfrm>
-          <a:prstGeom prst="rect">
-            <a:avLst/>
-          </a:prstGeom>
-          <a:solidFill>
-            <a:srgbClr val="7030A0"/>
-          </a:solidFill>
-          <a:scene3d>
-            <a:camera prst="isometricLeftDown"/>
-            <a:lightRig rig="threePt" dir="t"/>
-          </a:scene3d>
-          <a:sp3d extrusionH="1270000">
-            <a:extrusionClr>
-              <a:schemeClr val="accent5">
-                <a:lumMod val="50000"/>
-              </a:schemeClr>
-            </a:extrusionClr>
-          </a:sp3d>
-        </p:spPr>
-        <p:style>
-          <a:lnRef idx="2">
-            <a:schemeClr val="accent1">
-              <a:shade val="50000"/>
-            </a:schemeClr>
-          </a:lnRef>
-          <a:fillRef idx="1">
-            <a:schemeClr val="accent1"/>
-          </a:fillRef>
-          <a:effectRef idx="0">
-            <a:schemeClr val="accent1"/>
-          </a:effectRef>
-          <a:fontRef idx="minor">
-            <a:schemeClr val="lt1"/>
-          </a:fontRef>
-        </p:style>
-        <p:txBody>
-          <a:bodyPr rtlCol="0" anchor="ctr"/>
-          <a:lstStyle/>
-          <a:p>
-            <a:pPr algn="ctr"/>
-            <a:r>
-              <a:rPr lang="en-US" dirty="0" err="1"/>
-              <a:t>Tribalistic</a:t>
-            </a:r>
-            <a:endParaRPr lang="en-US" dirty="0"/>
-          </a:p>
-        </p:txBody>
-      </p:sp>
-      <p:sp>
-        <p:nvSpPr>
-          <p:cNvPr id="19" name="Rectangle 18"/>
-          <p:cNvSpPr/>
-          <p:nvPr/>
-        </p:nvSpPr>
-        <p:spPr>
-          <a:xfrm>
-            <a:off x="6110029" y="1562929"/>
-            <a:ext cx="1371600" cy="1371600"/>
-          </a:xfrm>
-          <a:prstGeom prst="rect">
-            <a:avLst/>
-          </a:prstGeom>
-          <a:solidFill>
-            <a:schemeClr val="accent1"/>
-          </a:solidFill>
-          <a:scene3d>
-            <a:camera prst="isometricLeftDown"/>
-            <a:lightRig rig="threePt" dir="t"/>
-          </a:scene3d>
-          <a:sp3d extrusionH="1270000">
-            <a:extrusionClr>
-              <a:schemeClr val="accent5">
-                <a:lumMod val="75000"/>
-              </a:schemeClr>
-            </a:extrusionClr>
-          </a:sp3d>
-        </p:spPr>
-        <p:style>
-          <a:lnRef idx="2">
-            <a:schemeClr val="accent1">
-              <a:shade val="50000"/>
-            </a:schemeClr>
-          </a:lnRef>
-          <a:fillRef idx="1">
-            <a:schemeClr val="accent1"/>
-          </a:fillRef>
-          <a:effectRef idx="0">
-            <a:schemeClr val="accent1"/>
-          </a:effectRef>
-          <a:fontRef idx="minor">
-            <a:schemeClr val="lt1"/>
-          </a:fontRef>
-        </p:style>
-        <p:txBody>
-          <a:bodyPr rtlCol="0" anchor="ctr"/>
-          <a:lstStyle/>
-          <a:p>
-            <a:pPr algn="ctr"/>
-            <a:endParaRPr lang="en-US" dirty="0"/>
-          </a:p>
-        </p:txBody>
-      </p:sp>
-      <p:sp>
-        <p:nvSpPr>
-          <p:cNvPr id="22" name="Rectangle 21"/>
-          <p:cNvSpPr/>
-          <p:nvPr/>
-        </p:nvSpPr>
-        <p:spPr>
-          <a:xfrm>
-            <a:off x="2314544" y="3765848"/>
-            <a:ext cx="1371600" cy="1371600"/>
-          </a:xfrm>
-          <a:prstGeom prst="rect">
-            <a:avLst/>
-          </a:prstGeom>
-          <a:scene3d>
-            <a:camera prst="isometricLeftDown"/>
-            <a:lightRig rig="threePt" dir="t"/>
-          </a:scene3d>
-          <a:sp3d extrusionH="1270000"/>
-        </p:spPr>
-        <p:style>
-          <a:lnRef idx="2">
-            <a:schemeClr val="accent1">
-              <a:shade val="50000"/>
-            </a:schemeClr>
-          </a:lnRef>
-          <a:fillRef idx="1">
-            <a:schemeClr val="accent1"/>
-          </a:fillRef>
-          <a:effectRef idx="0">
-            <a:schemeClr val="accent1"/>
-          </a:effectRef>
-          <a:fontRef idx="minor">
-            <a:schemeClr val="lt1"/>
-          </a:fontRef>
-        </p:style>
-        <p:txBody>
-          <a:bodyPr rtlCol="0" anchor="ctr"/>
-          <a:lstStyle/>
-          <a:p>
-            <a:pPr algn="ctr"/>
-            <a:endParaRPr lang="en-US" dirty="0"/>
-          </a:p>
-        </p:txBody>
-      </p:sp>
-      <p:sp>
-        <p:nvSpPr>
-          <p:cNvPr id="29" name="TextBox 28"/>
-          <p:cNvSpPr txBox="1"/>
-          <p:nvPr/>
-        </p:nvSpPr>
-        <p:spPr>
-          <a:xfrm rot="19705333">
-            <a:off x="5993001" y="4827571"/>
-            <a:ext cx="1828800" cy="369332"/>
-          </a:xfrm>
-          <a:prstGeom prst="rect">
-            <a:avLst/>
-          </a:prstGeom>
-          <a:noFill/>
-        </p:spPr>
-        <p:txBody>
-          <a:bodyPr wrap="square" rtlCol="0">
-            <a:spAutoFit/>
-          </a:bodyPr>
-          <a:lstStyle/>
-          <a:p>
-            <a:pPr algn="ctr"/>
-            <a:r>
-              <a:rPr lang="en-US" b="1" dirty="0"/>
-              <a:t>Membership</a:t>
-            </a:r>
-          </a:p>
-        </p:txBody>
-      </p:sp>
-      <p:sp>
-        <p:nvSpPr>
-          <p:cNvPr id="30" name="TextBox 29"/>
-          <p:cNvSpPr txBox="1"/>
-          <p:nvPr/>
-        </p:nvSpPr>
-        <p:spPr>
-          <a:xfrm rot="2239251">
-            <a:off x="7664732" y="4480957"/>
-            <a:ext cx="1371600" cy="646331"/>
-          </a:xfrm>
-          <a:prstGeom prst="rect">
-            <a:avLst/>
-          </a:prstGeom>
-          <a:noFill/>
-        </p:spPr>
-        <p:txBody>
-          <a:bodyPr wrap="square" rtlCol="0">
-            <a:spAutoFit/>
-          </a:bodyPr>
-          <a:lstStyle/>
-          <a:p>
-            <a:r>
-              <a:rPr lang="en-US" dirty="0"/>
-              <a:t>Membership is restricted</a:t>
-            </a:r>
-          </a:p>
-        </p:txBody>
-      </p:sp>
-      <p:sp>
-        <p:nvSpPr>
-          <p:cNvPr id="31" name="TextBox 30"/>
-          <p:cNvSpPr txBox="1"/>
-          <p:nvPr/>
-        </p:nvSpPr>
-        <p:spPr>
-          <a:xfrm rot="2300708">
-            <a:off x="5006913" y="5997297"/>
-            <a:ext cx="1371600" cy="646331"/>
-          </a:xfrm>
-          <a:prstGeom prst="rect">
-            <a:avLst/>
-          </a:prstGeom>
-          <a:noFill/>
-        </p:spPr>
-        <p:txBody>
-          <a:bodyPr wrap="square" rtlCol="0">
-            <a:spAutoFit/>
-          </a:bodyPr>
-          <a:lstStyle/>
-          <a:p>
-            <a:r>
-              <a:rPr lang="en-US" dirty="0"/>
-              <a:t>Membership is open</a:t>
-            </a:r>
-          </a:p>
-        </p:txBody>
-      </p:sp>
-      <p:sp>
-        <p:nvSpPr>
-          <p:cNvPr id="32" name="TextBox 31"/>
-          <p:cNvSpPr txBox="1"/>
-          <p:nvPr/>
-        </p:nvSpPr>
-        <p:spPr>
-          <a:xfrm rot="1851826">
-            <a:off x="2615296" y="5288868"/>
-            <a:ext cx="1371600" cy="379828"/>
-          </a:xfrm>
-          <a:prstGeom prst="rect">
-            <a:avLst/>
-          </a:prstGeom>
-          <a:noFill/>
-        </p:spPr>
-        <p:txBody>
-          <a:bodyPr wrap="square" rtlCol="0">
-            <a:spAutoFit/>
-          </a:bodyPr>
-          <a:lstStyle/>
-          <a:p>
-            <a:pPr algn="ctr"/>
-            <a:r>
-              <a:rPr lang="en-US" b="1" dirty="0"/>
-              <a:t>Rules</a:t>
-            </a:r>
-          </a:p>
-        </p:txBody>
-      </p:sp>
-      <p:sp>
-        <p:nvSpPr>
-          <p:cNvPr id="33" name="TextBox 32"/>
-          <p:cNvSpPr txBox="1"/>
-          <p:nvPr/>
-        </p:nvSpPr>
-        <p:spPr>
-          <a:xfrm rot="16200000">
-            <a:off x="7477022" y="2176624"/>
-            <a:ext cx="1828800" cy="379828"/>
-          </a:xfrm>
-          <a:prstGeom prst="rect">
-            <a:avLst/>
-          </a:prstGeom>
-          <a:noFill/>
-        </p:spPr>
-        <p:txBody>
-          <a:bodyPr wrap="square" rtlCol="0">
-            <a:spAutoFit/>
-          </a:bodyPr>
-          <a:lstStyle/>
-          <a:p>
-            <a:pPr algn="ctr"/>
-            <a:r>
-              <a:rPr lang="en-US" b="1" dirty="0"/>
-              <a:t>Accountability</a:t>
-            </a:r>
-          </a:p>
-        </p:txBody>
-      </p:sp>
-      <p:sp>
-        <p:nvSpPr>
-          <p:cNvPr id="34" name="TextBox 33"/>
-          <p:cNvSpPr txBox="1"/>
-          <p:nvPr/>
-        </p:nvSpPr>
-        <p:spPr>
-          <a:xfrm rot="19887021">
-            <a:off x="8515834" y="606553"/>
-            <a:ext cx="2286000" cy="923330"/>
-          </a:xfrm>
-          <a:prstGeom prst="rect">
-            <a:avLst/>
-          </a:prstGeom>
-          <a:noFill/>
-        </p:spPr>
-        <p:txBody>
-          <a:bodyPr wrap="square" rtlCol="0">
-            <a:spAutoFit/>
-          </a:bodyPr>
-          <a:lstStyle/>
-          <a:p>
-            <a:r>
-              <a:rPr lang="en-US" dirty="0"/>
-              <a:t>Community members care a great deal that others follow the rules</a:t>
-            </a:r>
-          </a:p>
-        </p:txBody>
-      </p:sp>
-      <p:sp>
-        <p:nvSpPr>
-          <p:cNvPr id="35" name="TextBox 34"/>
-          <p:cNvSpPr txBox="1"/>
-          <p:nvPr/>
-        </p:nvSpPr>
-        <p:spPr>
-          <a:xfrm rot="19814100">
-            <a:off x="8518962" y="2078820"/>
-            <a:ext cx="2286000" cy="923330"/>
-          </a:xfrm>
-          <a:prstGeom prst="rect">
-            <a:avLst/>
-          </a:prstGeom>
-          <a:noFill/>
-        </p:spPr>
-        <p:txBody>
-          <a:bodyPr wrap="square" rtlCol="0">
-            <a:spAutoFit/>
-          </a:bodyPr>
-          <a:lstStyle/>
-          <a:p>
-            <a:r>
-              <a:rPr lang="en-US" dirty="0"/>
-              <a:t>Community members care very little if others follow the rules</a:t>
-            </a:r>
-          </a:p>
-        </p:txBody>
-      </p:sp>
-      <p:sp>
-        <p:nvSpPr>
-          <p:cNvPr id="36" name="TextBox 35"/>
-          <p:cNvSpPr txBox="1"/>
-          <p:nvPr/>
-        </p:nvSpPr>
-        <p:spPr>
-          <a:xfrm rot="19226394">
-            <a:off x="1166951" y="5326461"/>
-            <a:ext cx="1828800" cy="646331"/>
-          </a:xfrm>
-          <a:prstGeom prst="rect">
-            <a:avLst/>
-          </a:prstGeom>
-          <a:noFill/>
-        </p:spPr>
-        <p:txBody>
-          <a:bodyPr wrap="square" rtlCol="0">
-            <a:spAutoFit/>
-          </a:bodyPr>
-          <a:lstStyle/>
-          <a:p>
-            <a:pPr algn="r"/>
-            <a:r>
-              <a:rPr lang="en-US" dirty="0"/>
-              <a:t>Fairly rigid about community rules</a:t>
-            </a:r>
-          </a:p>
-        </p:txBody>
-      </p:sp>
-      <p:sp>
-        <p:nvSpPr>
-          <p:cNvPr id="37" name="TextBox 36"/>
-          <p:cNvSpPr txBox="1"/>
-          <p:nvPr/>
-        </p:nvSpPr>
-        <p:spPr>
-          <a:xfrm rot="19216229">
-            <a:off x="2706027" y="6050952"/>
-            <a:ext cx="1645920" cy="646331"/>
-          </a:xfrm>
-          <a:prstGeom prst="rect">
-            <a:avLst/>
-          </a:prstGeom>
-          <a:noFill/>
-        </p:spPr>
-        <p:txBody>
-          <a:bodyPr wrap="square" rtlCol="0">
-            <a:spAutoFit/>
-          </a:bodyPr>
-          <a:lstStyle/>
-          <a:p>
-            <a:pPr algn="r"/>
-            <a:r>
-              <a:rPr lang="en-US" dirty="0"/>
-              <a:t>Flexible about the rules</a:t>
-            </a:r>
-          </a:p>
-        </p:txBody>
-      </p:sp>
-      <p:sp>
-        <p:nvSpPr>
-          <p:cNvPr id="24" name="Rectangle 23"/>
-          <p:cNvSpPr/>
-          <p:nvPr/>
-        </p:nvSpPr>
-        <p:spPr>
-          <a:xfrm>
-            <a:off x="2313117" y="2339425"/>
-            <a:ext cx="1371600" cy="1371600"/>
-          </a:xfrm>
-          <a:prstGeom prst="rect">
-            <a:avLst/>
-          </a:prstGeom>
-          <a:solidFill>
-            <a:schemeClr val="accent6"/>
-          </a:solidFill>
-          <a:scene3d>
-            <a:camera prst="isometricLeftDown"/>
-            <a:lightRig rig="threePt" dir="t"/>
-          </a:scene3d>
-          <a:sp3d extrusionH="1270000">
-            <a:extrusionClr>
-              <a:schemeClr val="accent6">
-                <a:lumMod val="75000"/>
-              </a:schemeClr>
-            </a:extrusionClr>
-          </a:sp3d>
-        </p:spPr>
-        <p:style>
-          <a:lnRef idx="2">
-            <a:schemeClr val="accent1">
-              <a:shade val="50000"/>
-            </a:schemeClr>
-          </a:lnRef>
-          <a:fillRef idx="1">
-            <a:schemeClr val="accent1"/>
-          </a:fillRef>
-          <a:effectRef idx="0">
-            <a:schemeClr val="accent1"/>
-          </a:effectRef>
-          <a:fontRef idx="minor">
-            <a:schemeClr val="lt1"/>
-          </a:fontRef>
-        </p:style>
-        <p:txBody>
-          <a:bodyPr rtlCol="0" anchor="ctr"/>
-          <a:lstStyle/>
-          <a:p>
-            <a:pPr algn="ctr"/>
-            <a:r>
-              <a:rPr lang="en-US" dirty="0"/>
-              <a:t>Commercial-</a:t>
-            </a:r>
-            <a:r>
-              <a:rPr lang="en-US" dirty="0" err="1"/>
-              <a:t>istic</a:t>
-            </a:r>
-            <a:endParaRPr lang="en-US" dirty="0"/>
-          </a:p>
-        </p:txBody>
-      </p:sp>
-      <p:sp>
-        <p:nvSpPr>
-          <p:cNvPr id="25" name="Rectangle 24"/>
-          <p:cNvSpPr/>
-          <p:nvPr/>
-        </p:nvSpPr>
-        <p:spPr>
-          <a:xfrm>
-            <a:off x="3564098" y="4485968"/>
-            <a:ext cx="1371600" cy="1371600"/>
-          </a:xfrm>
-          <a:prstGeom prst="rect">
-            <a:avLst/>
-          </a:prstGeom>
-          <a:scene3d>
-            <a:camera prst="isometricLeftDown"/>
-            <a:lightRig rig="threePt" dir="t"/>
-          </a:scene3d>
-          <a:sp3d extrusionH="1270000"/>
-        </p:spPr>
-        <p:style>
-          <a:lnRef idx="2">
-            <a:schemeClr val="accent1">
-              <a:shade val="50000"/>
-            </a:schemeClr>
-          </a:lnRef>
-          <a:fillRef idx="1">
-            <a:schemeClr val="accent1"/>
-          </a:fillRef>
-          <a:effectRef idx="0">
-            <a:schemeClr val="accent1"/>
-          </a:effectRef>
-          <a:fontRef idx="minor">
-            <a:schemeClr val="lt1"/>
-          </a:fontRef>
-        </p:style>
-        <p:txBody>
-          <a:bodyPr rtlCol="0" anchor="ctr"/>
-          <a:lstStyle/>
-          <a:p>
-            <a:pPr algn="ctr"/>
-            <a:endParaRPr lang="en-US"/>
-          </a:p>
-        </p:txBody>
-      </p:sp>
-      <p:sp>
-        <p:nvSpPr>
-          <p:cNvPr id="38" name="Freeform: Shape 37"/>
-          <p:cNvSpPr/>
-          <p:nvPr/>
-        </p:nvSpPr>
-        <p:spPr>
-          <a:xfrm>
-            <a:off x="1633483" y="3263711"/>
-            <a:ext cx="7793501" cy="2799470"/>
-          </a:xfrm>
-          <a:custGeom>
-            <a:avLst/>
-            <a:gdLst>
-              <a:gd name="connsiteX0" fmla="*/ 0 w 7793501"/>
-              <a:gd name="connsiteY0" fmla="*/ 1012873 h 2799470"/>
-              <a:gd name="connsiteX1" fmla="*/ 3108960 w 7793501"/>
-              <a:gd name="connsiteY1" fmla="*/ 2799470 h 2799470"/>
-              <a:gd name="connsiteX2" fmla="*/ 7793501 w 7793501"/>
-              <a:gd name="connsiteY2" fmla="*/ 0 h 2799470"/>
-            </a:gdLst>
-            <a:ahLst/>
-            <a:cxnLst>
-              <a:cxn ang="0">
-                <a:pos x="connsiteX0" y="connsiteY0"/>
-              </a:cxn>
-              <a:cxn ang="0">
-                <a:pos x="connsiteX1" y="connsiteY1"/>
-              </a:cxn>
-              <a:cxn ang="0">
-                <a:pos x="connsiteX2" y="connsiteY2"/>
-              </a:cxn>
-            </a:cxnLst>
-            <a:rect l="l" t="t" r="r" b="b"/>
-            <a:pathLst>
-              <a:path w="7793501" h="2799470">
-                <a:moveTo>
-                  <a:pt x="0" y="1012873"/>
-                </a:moveTo>
-                <a:lnTo>
-                  <a:pt x="3108960" y="2799470"/>
-                </a:lnTo>
-                <a:lnTo>
-                  <a:pt x="7793501" y="0"/>
-                </a:lnTo>
-              </a:path>
-            </a:pathLst>
-          </a:custGeom>
-          <a:noFill/>
-          <a:ln w="25400">
-            <a:solidFill>
-              <a:schemeClr val="tx1"/>
-            </a:solidFill>
-            <a:headEnd type="triangle" w="lg" len="med"/>
-            <a:tailEnd type="triangle" w="lg" len="med"/>
-          </a:ln>
-        </p:spPr>
-        <p:style>
-          <a:lnRef idx="2">
-            <a:schemeClr val="accent1">
-              <a:shade val="50000"/>
-            </a:schemeClr>
-          </a:lnRef>
-          <a:fillRef idx="1">
-            <a:schemeClr val="accent1"/>
-          </a:fillRef>
-          <a:effectRef idx="0">
-            <a:schemeClr val="accent1"/>
-          </a:effectRef>
-          <a:fontRef idx="minor">
-            <a:schemeClr val="lt1"/>
-          </a:fontRef>
-        </p:style>
-        <p:txBody>
-          <a:bodyPr rtlCol="0" anchor="ctr"/>
-          <a:lstStyle/>
-          <a:p>
-            <a:pPr algn="ctr"/>
-            <a:endParaRPr lang="en-US"/>
-          </a:p>
-        </p:txBody>
-      </p:sp>
-      <p:cxnSp>
-        <p:nvCxnSpPr>
-          <p:cNvPr id="26" name="Straight Arrow Connector 25"/>
-          <p:cNvCxnSpPr/>
-          <p:nvPr/>
-        </p:nvCxnSpPr>
-        <p:spPr>
-          <a:xfrm flipV="1">
-            <a:off x="8201508" y="326171"/>
-            <a:ext cx="0" cy="3657600"/>
-          </a:xfrm>
-          <a:prstGeom prst="straightConnector1">
-            <a:avLst/>
-          </a:prstGeom>
-          <a:ln w="25400">
-            <a:solidFill>
-              <a:schemeClr val="bg2">
-                <a:lumMod val="50000"/>
+                <a:lumMod val="65000"/>
               </a:schemeClr>
             </a:solidFill>
-            <a:tailEnd type="triangle" w="lg" len="med"/>
-          </a:ln>
-        </p:spPr>
-        <p:style>
-          <a:lnRef idx="1">
-            <a:schemeClr val="accent1"/>
-          </a:lnRef>
-          <a:fillRef idx="0">
-            <a:schemeClr val="accent1"/>
-          </a:fillRef>
-          <a:effectRef idx="0">
-            <a:schemeClr val="accent1"/>
-          </a:effectRef>
-          <a:fontRef idx="minor">
-            <a:schemeClr val="tx1"/>
-          </a:fontRef>
-        </p:style>
-      </p:cxnSp>
-      <p:sp>
-        <p:nvSpPr>
-          <p:cNvPr id="23" name="Rectangle 22"/>
-          <p:cNvSpPr/>
-          <p:nvPr/>
-        </p:nvSpPr>
-        <p:spPr>
-          <a:xfrm>
-            <a:off x="3570486" y="3113368"/>
-            <a:ext cx="1371600" cy="1371600"/>
-          </a:xfrm>
-          <a:prstGeom prst="rect">
-            <a:avLst/>
-          </a:prstGeom>
-          <a:solidFill>
-            <a:schemeClr val="accent4"/>
-          </a:solidFill>
-          <a:scene3d>
-            <a:camera prst="isometricLeftDown"/>
-            <a:lightRig rig="threePt" dir="t"/>
-          </a:scene3d>
-          <a:sp3d extrusionH="1270000">
-            <a:extrusionClr>
-              <a:schemeClr val="accent4">
-                <a:lumMod val="75000"/>
+            <a:scene3d>
+              <a:camera prst="isometricLeftDown"/>
+              <a:lightRig rig="threePt" dir="t"/>
+            </a:scene3d>
+            <a:sp3d extrusionH="1270000">
+              <a:extrusionClr>
+                <a:schemeClr val="bg1">
+                  <a:lumMod val="65000"/>
+                </a:schemeClr>
+              </a:extrusionClr>
+            </a:sp3d>
+          </p:spPr>
+          <p:style>
+            <a:lnRef idx="2">
+              <a:schemeClr val="accent1">
+                <a:shade val="50000"/>
               </a:schemeClr>
-            </a:extrusionClr>
-          </a:sp3d>
-        </p:spPr>
-        <p:style>
-          <a:lnRef idx="2">
-            <a:schemeClr val="accent1">
-              <a:shade val="50000"/>
-            </a:schemeClr>
-          </a:lnRef>
-          <a:fillRef idx="1">
-            <a:schemeClr val="accent1"/>
-          </a:fillRef>
-          <a:effectRef idx="0">
-            <a:schemeClr val="accent1"/>
-          </a:effectRef>
-          <a:fontRef idx="minor">
-            <a:schemeClr val="lt1"/>
-          </a:fontRef>
-        </p:style>
-        <p:txBody>
-          <a:bodyPr rtlCol="0" anchor="ctr"/>
-          <a:lstStyle/>
-          <a:p>
-            <a:pPr algn="ctr"/>
-            <a:r>
-              <a:rPr lang="en-US" dirty="0"/>
-              <a:t>Individual-</a:t>
-            </a:r>
-            <a:r>
-              <a:rPr lang="en-US" dirty="0" err="1"/>
-              <a:t>istic</a:t>
-            </a:r>
-            <a:endParaRPr lang="en-US" dirty="0"/>
-          </a:p>
-        </p:txBody>
-      </p:sp>
-      <p:cxnSp>
-        <p:nvCxnSpPr>
-          <p:cNvPr id="40" name="Straight Arrow Connector 39"/>
-          <p:cNvCxnSpPr>
-            <a:stCxn id="38" idx="1"/>
-          </p:cNvCxnSpPr>
-          <p:nvPr/>
-        </p:nvCxnSpPr>
-        <p:spPr>
-          <a:xfrm flipV="1">
-            <a:off x="4742443" y="1068430"/>
-            <a:ext cx="0" cy="4994751"/>
-          </a:xfrm>
-          <a:prstGeom prst="straightConnector1">
-            <a:avLst/>
-          </a:prstGeom>
-          <a:ln w="25400">
+            </a:lnRef>
+            <a:fillRef idx="1">
+              <a:schemeClr val="accent1"/>
+            </a:fillRef>
+            <a:effectRef idx="0">
+              <a:schemeClr val="accent1"/>
+            </a:effectRef>
+            <a:fontRef idx="minor">
+              <a:schemeClr val="lt1"/>
+            </a:fontRef>
+          </p:style>
+          <p:txBody>
+            <a:bodyPr rtlCol="0" anchor="ctr"/>
+            <a:lstStyle/>
+            <a:p>
+              <a:pPr algn="ctr"/>
+              <a:endParaRPr lang="en-US" dirty="0"/>
+            </a:p>
+          </p:txBody>
+        </p:sp>
+        <p:sp>
+          <p:nvSpPr>
+            <p:cNvPr id="23" name="Rectangle 22"/>
+            <p:cNvSpPr/>
+            <p:nvPr/>
+          </p:nvSpPr>
+          <p:spPr>
+            <a:xfrm>
+              <a:off x="2313117" y="3975233"/>
+              <a:ext cx="1371600" cy="1371600"/>
+            </a:xfrm>
+            <a:prstGeom prst="rect">
+              <a:avLst/>
+            </a:prstGeom>
             <a:solidFill>
-              <a:schemeClr val="bg2">
-                <a:lumMod val="50000"/>
+              <a:schemeClr val="accent4"/>
+            </a:solidFill>
+            <a:scene3d>
+              <a:camera prst="isometricLeftDown"/>
+              <a:lightRig rig="threePt" dir="t"/>
+            </a:scene3d>
+            <a:sp3d extrusionH="1270000">
+              <a:extrusionClr>
+                <a:schemeClr val="accent4">
+                  <a:lumMod val="75000"/>
+                </a:schemeClr>
+              </a:extrusionClr>
+            </a:sp3d>
+          </p:spPr>
+          <p:style>
+            <a:lnRef idx="2">
+              <a:schemeClr val="accent1">
+                <a:shade val="50000"/>
+              </a:schemeClr>
+            </a:lnRef>
+            <a:fillRef idx="1">
+              <a:schemeClr val="accent1"/>
+            </a:fillRef>
+            <a:effectRef idx="0">
+              <a:schemeClr val="accent1"/>
+            </a:effectRef>
+            <a:fontRef idx="minor">
+              <a:schemeClr val="lt1"/>
+            </a:fontRef>
+          </p:style>
+          <p:txBody>
+            <a:bodyPr rtlCol="0" anchor="ctr"/>
+            <a:lstStyle/>
+            <a:p>
+              <a:pPr algn="ctr"/>
+              <a:r>
+                <a:rPr lang="en-US" b="1" dirty="0"/>
+                <a:t>Consumer</a:t>
+              </a:r>
+            </a:p>
+          </p:txBody>
+        </p:sp>
+        <p:sp>
+          <p:nvSpPr>
+            <p:cNvPr id="20" name="Rectangle 19"/>
+            <p:cNvSpPr/>
+            <p:nvPr/>
+          </p:nvSpPr>
+          <p:spPr>
+            <a:xfrm>
+              <a:off x="4857685" y="1053021"/>
+              <a:ext cx="1371600" cy="1371600"/>
+            </a:xfrm>
+            <a:prstGeom prst="rect">
+              <a:avLst/>
+            </a:prstGeom>
+            <a:solidFill>
+              <a:schemeClr val="bg1">
+                <a:lumMod val="65000"/>
               </a:schemeClr>
             </a:solidFill>
-            <a:tailEnd type="triangle" w="lg" len="med"/>
-          </a:ln>
-        </p:spPr>
-        <p:style>
-          <a:lnRef idx="1">
-            <a:schemeClr val="accent1"/>
-          </a:lnRef>
-          <a:fillRef idx="0">
-            <a:schemeClr val="accent1"/>
-          </a:fillRef>
-          <a:effectRef idx="0">
-            <a:schemeClr val="accent1"/>
-          </a:effectRef>
-          <a:fontRef idx="minor">
-            <a:schemeClr val="tx1"/>
-          </a:fontRef>
-        </p:style>
-      </p:cxnSp>
+            <a:scene3d>
+              <a:camera prst="isometricLeftDown"/>
+              <a:lightRig rig="threePt" dir="t"/>
+            </a:scene3d>
+            <a:sp3d extrusionH="1270000">
+              <a:extrusionClr>
+                <a:schemeClr val="bg1">
+                  <a:lumMod val="65000"/>
+                </a:schemeClr>
+              </a:extrusionClr>
+            </a:sp3d>
+          </p:spPr>
+          <p:style>
+            <a:lnRef idx="2">
+              <a:schemeClr val="accent1">
+                <a:shade val="50000"/>
+              </a:schemeClr>
+            </a:lnRef>
+            <a:fillRef idx="1">
+              <a:schemeClr val="accent1"/>
+            </a:fillRef>
+            <a:effectRef idx="0">
+              <a:schemeClr val="accent1"/>
+            </a:effectRef>
+            <a:fontRef idx="minor">
+              <a:schemeClr val="lt1"/>
+            </a:fontRef>
+          </p:style>
+          <p:txBody>
+            <a:bodyPr rtlCol="0" anchor="t"/>
+            <a:lstStyle/>
+            <a:p>
+              <a:pPr algn="ctr"/>
+              <a:endParaRPr lang="en-US" dirty="0"/>
+            </a:p>
+          </p:txBody>
+        </p:sp>
+        <p:sp>
+          <p:nvSpPr>
+            <p:cNvPr id="21" name="Rectangle 20"/>
+            <p:cNvSpPr/>
+            <p:nvPr/>
+          </p:nvSpPr>
+          <p:spPr>
+            <a:xfrm>
+              <a:off x="6110029" y="3226422"/>
+              <a:ext cx="1371600" cy="1371600"/>
+            </a:xfrm>
+            <a:prstGeom prst="rect">
+              <a:avLst/>
+            </a:prstGeom>
+            <a:solidFill>
+              <a:srgbClr val="FF0000"/>
+            </a:solidFill>
+            <a:scene3d>
+              <a:camera prst="isometricLeftDown"/>
+              <a:lightRig rig="threePt" dir="t"/>
+            </a:scene3d>
+            <a:sp3d extrusionH="1270000">
+              <a:extrusionClr>
+                <a:srgbClr val="C00000"/>
+              </a:extrusionClr>
+            </a:sp3d>
+          </p:spPr>
+          <p:style>
+            <a:lnRef idx="2">
+              <a:schemeClr val="accent1">
+                <a:shade val="50000"/>
+              </a:schemeClr>
+            </a:lnRef>
+            <a:fillRef idx="1">
+              <a:schemeClr val="accent1"/>
+            </a:fillRef>
+            <a:effectRef idx="0">
+              <a:schemeClr val="accent1"/>
+            </a:effectRef>
+            <a:fontRef idx="minor">
+              <a:schemeClr val="lt1"/>
+            </a:fontRef>
+          </p:style>
+          <p:txBody>
+            <a:bodyPr rtlCol="0" anchor="ctr"/>
+            <a:lstStyle/>
+            <a:p>
+              <a:pPr algn="ctr"/>
+              <a:r>
+                <a:rPr lang="en-US" b="1" dirty="0"/>
+                <a:t>Ethnic</a:t>
+              </a:r>
+            </a:p>
+          </p:txBody>
+        </p:sp>
+        <p:sp>
+          <p:nvSpPr>
+            <p:cNvPr id="22" name="Rectangle 21"/>
+            <p:cNvSpPr/>
+            <p:nvPr/>
+          </p:nvSpPr>
+          <p:spPr>
+            <a:xfrm>
+              <a:off x="3562903" y="4706283"/>
+              <a:ext cx="1371600" cy="1371600"/>
+            </a:xfrm>
+            <a:prstGeom prst="rect">
+              <a:avLst/>
+            </a:prstGeom>
+            <a:solidFill>
+              <a:schemeClr val="bg1">
+                <a:lumMod val="65000"/>
+              </a:schemeClr>
+            </a:solidFill>
+            <a:scene3d>
+              <a:camera prst="isometricLeftDown"/>
+              <a:lightRig rig="threePt" dir="t"/>
+            </a:scene3d>
+            <a:sp3d extrusionH="1270000">
+              <a:extrusionClr>
+                <a:schemeClr val="bg1">
+                  <a:lumMod val="65000"/>
+                </a:schemeClr>
+              </a:extrusionClr>
+            </a:sp3d>
+          </p:spPr>
+          <p:style>
+            <a:lnRef idx="2">
+              <a:schemeClr val="accent1">
+                <a:shade val="50000"/>
+              </a:schemeClr>
+            </a:lnRef>
+            <a:fillRef idx="1">
+              <a:schemeClr val="accent1"/>
+            </a:fillRef>
+            <a:effectRef idx="0">
+              <a:schemeClr val="accent1"/>
+            </a:effectRef>
+            <a:fontRef idx="minor">
+              <a:schemeClr val="lt1"/>
+            </a:fontRef>
+          </p:style>
+          <p:txBody>
+            <a:bodyPr rtlCol="0" anchor="ctr"/>
+            <a:lstStyle/>
+            <a:p>
+              <a:pPr algn="ctr"/>
+              <a:endParaRPr lang="en-US" dirty="0"/>
+            </a:p>
+          </p:txBody>
+        </p:sp>
+        <p:sp>
+          <p:nvSpPr>
+            <p:cNvPr id="29" name="TextBox 28"/>
+            <p:cNvSpPr txBox="1"/>
+            <p:nvPr/>
+          </p:nvSpPr>
+          <p:spPr>
+            <a:xfrm rot="19705333">
+              <a:off x="5993001" y="5038591"/>
+              <a:ext cx="1828800" cy="369332"/>
+            </a:xfrm>
+            <a:prstGeom prst="rect">
+              <a:avLst/>
+            </a:prstGeom>
+            <a:noFill/>
+          </p:spPr>
+          <p:txBody>
+            <a:bodyPr wrap="square" rtlCol="0">
+              <a:spAutoFit/>
+            </a:bodyPr>
+            <a:lstStyle/>
+            <a:p>
+              <a:pPr algn="ctr"/>
+              <a:r>
+                <a:rPr lang="en-US" b="1" dirty="0"/>
+                <a:t>Membership</a:t>
+              </a:r>
+            </a:p>
+          </p:txBody>
+        </p:sp>
+        <p:sp>
+          <p:nvSpPr>
+            <p:cNvPr id="30" name="TextBox 29"/>
+            <p:cNvSpPr txBox="1"/>
+            <p:nvPr/>
+          </p:nvSpPr>
+          <p:spPr>
+            <a:xfrm rot="2239251">
+              <a:off x="7664732" y="4830476"/>
+              <a:ext cx="1371600" cy="369332"/>
+            </a:xfrm>
+            <a:prstGeom prst="rect">
+              <a:avLst/>
+            </a:prstGeom>
+            <a:noFill/>
+          </p:spPr>
+          <p:txBody>
+            <a:bodyPr wrap="square" rtlCol="0">
+              <a:spAutoFit/>
+            </a:bodyPr>
+            <a:lstStyle/>
+            <a:p>
+              <a:r>
+                <a:rPr lang="en-US" dirty="0"/>
+                <a:t>Exclusive</a:t>
+              </a:r>
+            </a:p>
+          </p:txBody>
+        </p:sp>
+        <p:sp>
+          <p:nvSpPr>
+            <p:cNvPr id="31" name="TextBox 30"/>
+            <p:cNvSpPr txBox="1"/>
+            <p:nvPr/>
+          </p:nvSpPr>
+          <p:spPr>
+            <a:xfrm rot="2300708">
+              <a:off x="5006913" y="6346816"/>
+              <a:ext cx="1371600" cy="369332"/>
+            </a:xfrm>
+            <a:prstGeom prst="rect">
+              <a:avLst/>
+            </a:prstGeom>
+            <a:noFill/>
+          </p:spPr>
+          <p:txBody>
+            <a:bodyPr wrap="square" rtlCol="0">
+              <a:spAutoFit/>
+            </a:bodyPr>
+            <a:lstStyle/>
+            <a:p>
+              <a:r>
+                <a:rPr lang="en-US" dirty="0"/>
+                <a:t>Inclusive</a:t>
+              </a:r>
+            </a:p>
+          </p:txBody>
+        </p:sp>
+        <p:sp>
+          <p:nvSpPr>
+            <p:cNvPr id="32" name="TextBox 31"/>
+            <p:cNvSpPr txBox="1"/>
+            <p:nvPr/>
+          </p:nvSpPr>
+          <p:spPr>
+            <a:xfrm rot="1851826">
+              <a:off x="2615296" y="5499888"/>
+              <a:ext cx="1371600" cy="379828"/>
+            </a:xfrm>
+            <a:prstGeom prst="rect">
+              <a:avLst/>
+            </a:prstGeom>
+            <a:noFill/>
+          </p:spPr>
+          <p:txBody>
+            <a:bodyPr wrap="square" rtlCol="0">
+              <a:spAutoFit/>
+            </a:bodyPr>
+            <a:lstStyle/>
+            <a:p>
+              <a:pPr algn="ctr"/>
+              <a:r>
+                <a:rPr lang="en-US" b="1" dirty="0"/>
+                <a:t>Rules</a:t>
+              </a:r>
+            </a:p>
+          </p:txBody>
+        </p:sp>
+        <p:sp>
+          <p:nvSpPr>
+            <p:cNvPr id="33" name="TextBox 32"/>
+            <p:cNvSpPr txBox="1"/>
+            <p:nvPr/>
+          </p:nvSpPr>
+          <p:spPr>
+            <a:xfrm rot="16200000">
+              <a:off x="7477022" y="2387644"/>
+              <a:ext cx="1828800" cy="379828"/>
+            </a:xfrm>
+            <a:prstGeom prst="rect">
+              <a:avLst/>
+            </a:prstGeom>
+            <a:noFill/>
+          </p:spPr>
+          <p:txBody>
+            <a:bodyPr wrap="square" rtlCol="0">
+              <a:spAutoFit/>
+            </a:bodyPr>
+            <a:lstStyle/>
+            <a:p>
+              <a:pPr algn="ctr"/>
+              <a:r>
+                <a:rPr lang="en-US" b="1" dirty="0"/>
+                <a:t>Accountability</a:t>
+              </a:r>
+            </a:p>
+          </p:txBody>
+        </p:sp>
+        <p:sp>
+          <p:nvSpPr>
+            <p:cNvPr id="34" name="TextBox 33"/>
+            <p:cNvSpPr txBox="1"/>
+            <p:nvPr/>
+          </p:nvSpPr>
+          <p:spPr>
+            <a:xfrm rot="19887021">
+              <a:off x="8515834" y="1094572"/>
+              <a:ext cx="2286000" cy="369332"/>
+            </a:xfrm>
+            <a:prstGeom prst="rect">
+              <a:avLst/>
+            </a:prstGeom>
+            <a:noFill/>
+          </p:spPr>
+          <p:txBody>
+            <a:bodyPr wrap="square" rtlCol="0">
+              <a:spAutoFit/>
+            </a:bodyPr>
+            <a:lstStyle/>
+            <a:p>
+              <a:r>
+                <a:rPr lang="en-US" dirty="0"/>
+                <a:t>Public-regarding</a:t>
+              </a:r>
+            </a:p>
+          </p:txBody>
+        </p:sp>
+        <p:sp>
+          <p:nvSpPr>
+            <p:cNvPr id="35" name="TextBox 34"/>
+            <p:cNvSpPr txBox="1"/>
+            <p:nvPr/>
+          </p:nvSpPr>
+          <p:spPr>
+            <a:xfrm rot="19814100">
+              <a:off x="8518962" y="2566839"/>
+              <a:ext cx="2286000" cy="369332"/>
+            </a:xfrm>
+            <a:prstGeom prst="rect">
+              <a:avLst/>
+            </a:prstGeom>
+            <a:noFill/>
+          </p:spPr>
+          <p:txBody>
+            <a:bodyPr wrap="square" rtlCol="0">
+              <a:spAutoFit/>
+            </a:bodyPr>
+            <a:lstStyle/>
+            <a:p>
+              <a:r>
+                <a:rPr lang="en-US" dirty="0"/>
+                <a:t>Self-interested</a:t>
+              </a:r>
+            </a:p>
+          </p:txBody>
+        </p:sp>
+        <p:sp>
+          <p:nvSpPr>
+            <p:cNvPr id="36" name="TextBox 35"/>
+            <p:cNvSpPr txBox="1"/>
+            <p:nvPr/>
+          </p:nvSpPr>
+          <p:spPr>
+            <a:xfrm rot="19226394">
+              <a:off x="1166951" y="5675981"/>
+              <a:ext cx="1828800" cy="369332"/>
+            </a:xfrm>
+            <a:prstGeom prst="rect">
+              <a:avLst/>
+            </a:prstGeom>
+            <a:noFill/>
+          </p:spPr>
+          <p:txBody>
+            <a:bodyPr wrap="square" rtlCol="0">
+              <a:spAutoFit/>
+            </a:bodyPr>
+            <a:lstStyle/>
+            <a:p>
+              <a:pPr algn="r"/>
+              <a:r>
+                <a:rPr lang="en-US" dirty="0"/>
+                <a:t>Piety</a:t>
+              </a:r>
+            </a:p>
+          </p:txBody>
+        </p:sp>
+        <p:sp>
+          <p:nvSpPr>
+            <p:cNvPr id="37" name="TextBox 36"/>
+            <p:cNvSpPr txBox="1"/>
+            <p:nvPr/>
+          </p:nvSpPr>
+          <p:spPr>
+            <a:xfrm rot="19216229">
+              <a:off x="2706027" y="6400471"/>
+              <a:ext cx="1645920" cy="369332"/>
+            </a:xfrm>
+            <a:prstGeom prst="rect">
+              <a:avLst/>
+            </a:prstGeom>
+            <a:noFill/>
+          </p:spPr>
+          <p:txBody>
+            <a:bodyPr wrap="square" rtlCol="0">
+              <a:spAutoFit/>
+            </a:bodyPr>
+            <a:lstStyle/>
+            <a:p>
+              <a:pPr algn="r"/>
+              <a:r>
+                <a:rPr lang="en-US" dirty="0"/>
+                <a:t>Tolerance</a:t>
+              </a:r>
+            </a:p>
+          </p:txBody>
+        </p:sp>
+        <p:sp>
+          <p:nvSpPr>
+            <p:cNvPr id="24" name="Rectangle 23"/>
+            <p:cNvSpPr/>
+            <p:nvPr/>
+          </p:nvSpPr>
+          <p:spPr>
+            <a:xfrm>
+              <a:off x="2313117" y="2550445"/>
+              <a:ext cx="1371600" cy="1371600"/>
+            </a:xfrm>
+            <a:prstGeom prst="rect">
+              <a:avLst/>
+            </a:prstGeom>
+            <a:solidFill>
+              <a:schemeClr val="accent6"/>
+            </a:solidFill>
+            <a:scene3d>
+              <a:camera prst="isometricLeftDown"/>
+              <a:lightRig rig="threePt" dir="t"/>
+            </a:scene3d>
+            <a:sp3d extrusionH="1270000">
+              <a:extrusionClr>
+                <a:schemeClr val="accent6">
+                  <a:lumMod val="75000"/>
+                </a:schemeClr>
+              </a:extrusionClr>
+            </a:sp3d>
+          </p:spPr>
+          <p:style>
+            <a:lnRef idx="2">
+              <a:schemeClr val="accent1">
+                <a:shade val="50000"/>
+              </a:schemeClr>
+            </a:lnRef>
+            <a:fillRef idx="1">
+              <a:schemeClr val="accent1"/>
+            </a:fillRef>
+            <a:effectRef idx="0">
+              <a:schemeClr val="accent1"/>
+            </a:effectRef>
+            <a:fontRef idx="minor">
+              <a:schemeClr val="lt1"/>
+            </a:fontRef>
+          </p:style>
+          <p:txBody>
+            <a:bodyPr rtlCol="0" anchor="ctr"/>
+            <a:lstStyle/>
+            <a:p>
+              <a:pPr algn="ctr"/>
+              <a:r>
+                <a:rPr lang="en-US" b="1" dirty="0"/>
+                <a:t>Commercial</a:t>
+              </a:r>
+            </a:p>
+          </p:txBody>
+        </p:sp>
+        <p:cxnSp>
+          <p:nvCxnSpPr>
+            <p:cNvPr id="26" name="Straight Arrow Connector 25"/>
+            <p:cNvCxnSpPr/>
+            <p:nvPr/>
+          </p:nvCxnSpPr>
+          <p:spPr>
+            <a:xfrm flipV="1">
+              <a:off x="8201508" y="143296"/>
+              <a:ext cx="0" cy="4114800"/>
+            </a:xfrm>
+            <a:prstGeom prst="straightConnector1">
+              <a:avLst/>
+            </a:prstGeom>
+            <a:ln w="38100">
+              <a:solidFill>
+                <a:schemeClr val="bg2">
+                  <a:lumMod val="50000"/>
+                </a:schemeClr>
+              </a:solidFill>
+              <a:tailEnd type="triangle" w="med" len="lg"/>
+            </a:ln>
+          </p:spPr>
+          <p:style>
+            <a:lnRef idx="1">
+              <a:schemeClr val="accent1"/>
+            </a:lnRef>
+            <a:fillRef idx="0">
+              <a:schemeClr val="accent1"/>
+            </a:fillRef>
+            <a:effectRef idx="0">
+              <a:schemeClr val="accent1"/>
+            </a:effectRef>
+            <a:fontRef idx="minor">
+              <a:schemeClr val="tx1"/>
+            </a:fontRef>
+          </p:style>
+        </p:cxnSp>
+        <p:sp>
+          <p:nvSpPr>
+            <p:cNvPr id="25" name="Rectangle 24"/>
+            <p:cNvSpPr/>
+            <p:nvPr/>
+          </p:nvSpPr>
+          <p:spPr>
+            <a:xfrm>
+              <a:off x="3564098" y="3305507"/>
+              <a:ext cx="1371600" cy="1371600"/>
+            </a:xfrm>
+            <a:prstGeom prst="rect">
+              <a:avLst/>
+            </a:prstGeom>
+            <a:solidFill>
+              <a:schemeClr val="bg1">
+                <a:lumMod val="65000"/>
+              </a:schemeClr>
+            </a:solidFill>
+            <a:scene3d>
+              <a:camera prst="isometricLeftDown"/>
+              <a:lightRig rig="threePt" dir="t"/>
+            </a:scene3d>
+            <a:sp3d extrusionH="1270000">
+              <a:extrusionClr>
+                <a:schemeClr val="bg1">
+                  <a:lumMod val="65000"/>
+                </a:schemeClr>
+              </a:extrusionClr>
+            </a:sp3d>
+          </p:spPr>
+          <p:style>
+            <a:lnRef idx="2">
+              <a:schemeClr val="accent1">
+                <a:shade val="50000"/>
+              </a:schemeClr>
+            </a:lnRef>
+            <a:fillRef idx="1">
+              <a:schemeClr val="accent1"/>
+            </a:fillRef>
+            <a:effectRef idx="0">
+              <a:schemeClr val="accent1"/>
+            </a:effectRef>
+            <a:fontRef idx="minor">
+              <a:schemeClr val="lt1"/>
+            </a:fontRef>
+          </p:style>
+          <p:txBody>
+            <a:bodyPr rtlCol="0" anchor="ctr"/>
+            <a:lstStyle/>
+            <a:p>
+              <a:pPr algn="ctr"/>
+              <a:endParaRPr lang="en-US"/>
+            </a:p>
+          </p:txBody>
+        </p:sp>
+        <p:cxnSp>
+          <p:nvCxnSpPr>
+            <p:cNvPr id="40" name="Straight Arrow Connector 39"/>
+            <p:cNvCxnSpPr/>
+            <p:nvPr/>
+          </p:nvCxnSpPr>
+          <p:spPr>
+            <a:xfrm flipV="1">
+              <a:off x="4730285" y="2124285"/>
+              <a:ext cx="0" cy="4114800"/>
+            </a:xfrm>
+            <a:prstGeom prst="straightConnector1">
+              <a:avLst/>
+            </a:prstGeom>
+            <a:ln w="38100">
+              <a:solidFill>
+                <a:schemeClr val="bg2">
+                  <a:lumMod val="50000"/>
+                </a:schemeClr>
+              </a:solidFill>
+              <a:tailEnd type="triangle" w="med" len="lg"/>
+            </a:ln>
+          </p:spPr>
+          <p:style>
+            <a:lnRef idx="1">
+              <a:schemeClr val="accent1"/>
+            </a:lnRef>
+            <a:fillRef idx="0">
+              <a:schemeClr val="accent1"/>
+            </a:fillRef>
+            <a:effectRef idx="0">
+              <a:schemeClr val="accent1"/>
+            </a:effectRef>
+            <a:fontRef idx="minor">
+              <a:schemeClr val="tx1"/>
+            </a:fontRef>
+          </p:style>
+        </p:cxnSp>
+        <p:sp>
+          <p:nvSpPr>
+            <p:cNvPr id="18" name="Rectangle 17"/>
+            <p:cNvSpPr/>
+            <p:nvPr/>
+          </p:nvSpPr>
+          <p:spPr>
+            <a:xfrm>
+              <a:off x="6110920" y="1804959"/>
+              <a:ext cx="1371600" cy="1371600"/>
+            </a:xfrm>
+            <a:prstGeom prst="rect">
+              <a:avLst/>
+            </a:prstGeom>
+            <a:solidFill>
+              <a:srgbClr val="990099"/>
+            </a:solidFill>
+            <a:scene3d>
+              <a:camera prst="isometricLeftDown"/>
+              <a:lightRig rig="threePt" dir="t"/>
+            </a:scene3d>
+            <a:sp3d extrusionH="1270000">
+              <a:extrusionClr>
+                <a:srgbClr val="7030A0"/>
+              </a:extrusionClr>
+            </a:sp3d>
+          </p:spPr>
+          <p:style>
+            <a:lnRef idx="2">
+              <a:schemeClr val="accent1">
+                <a:shade val="50000"/>
+              </a:schemeClr>
+            </a:lnRef>
+            <a:fillRef idx="1">
+              <a:schemeClr val="accent1"/>
+            </a:fillRef>
+            <a:effectRef idx="0">
+              <a:schemeClr val="accent1"/>
+            </a:effectRef>
+            <a:fontRef idx="minor">
+              <a:schemeClr val="lt1"/>
+            </a:fontRef>
+          </p:style>
+          <p:txBody>
+            <a:bodyPr lIns="0" rIns="0" rtlCol="0" anchor="ctr"/>
+            <a:lstStyle/>
+            <a:p>
+              <a:pPr algn="ctr"/>
+              <a:r>
+                <a:rPr lang="en-US" b="1" dirty="0"/>
+                <a:t>Government</a:t>
+              </a:r>
+            </a:p>
+          </p:txBody>
+        </p:sp>
+        <p:cxnSp>
+          <p:nvCxnSpPr>
+            <p:cNvPr id="3" name="Straight Arrow Connector 2"/>
+            <p:cNvCxnSpPr/>
+            <p:nvPr/>
+          </p:nvCxnSpPr>
+          <p:spPr>
+            <a:xfrm flipH="1" flipV="1">
+              <a:off x="1651196" y="4481381"/>
+              <a:ext cx="3093157" cy="1776265"/>
+            </a:xfrm>
+            <a:prstGeom prst="straightConnector1">
+              <a:avLst/>
+            </a:prstGeom>
+            <a:ln w="38100">
+              <a:solidFill>
+                <a:schemeClr val="tx1"/>
+              </a:solidFill>
+              <a:tailEnd type="triangle" w="med" len="lg"/>
+            </a:ln>
+          </p:spPr>
+          <p:style>
+            <a:lnRef idx="1">
+              <a:schemeClr val="accent1"/>
+            </a:lnRef>
+            <a:fillRef idx="0">
+              <a:schemeClr val="accent1"/>
+            </a:fillRef>
+            <a:effectRef idx="0">
+              <a:schemeClr val="accent1"/>
+            </a:effectRef>
+            <a:fontRef idx="minor">
+              <a:schemeClr val="tx1"/>
+            </a:fontRef>
+          </p:style>
+        </p:cxnSp>
+        <p:cxnSp>
+          <p:nvCxnSpPr>
+            <p:cNvPr id="27" name="Straight Arrow Connector 26"/>
+            <p:cNvCxnSpPr/>
+            <p:nvPr/>
+          </p:nvCxnSpPr>
+          <p:spPr>
+            <a:xfrm flipV="1">
+              <a:off x="4730450" y="3501230"/>
+              <a:ext cx="4793378" cy="2765476"/>
+            </a:xfrm>
+            <a:prstGeom prst="straightConnector1">
+              <a:avLst/>
+            </a:prstGeom>
+            <a:ln w="38100">
+              <a:solidFill>
+                <a:schemeClr val="tx1"/>
+              </a:solidFill>
+              <a:tailEnd type="triangle" w="med" len="lg"/>
+            </a:ln>
+          </p:spPr>
+          <p:style>
+            <a:lnRef idx="1">
+              <a:schemeClr val="accent1"/>
+            </a:lnRef>
+            <a:fillRef idx="0">
+              <a:schemeClr val="accent1"/>
+            </a:fillRef>
+            <a:effectRef idx="0">
+              <a:schemeClr val="accent1"/>
+            </a:effectRef>
+            <a:fontRef idx="minor">
+              <a:schemeClr val="tx1"/>
+            </a:fontRef>
+          </p:style>
+        </p:cxnSp>
+      </p:grpSp>
     </p:spTree>
     <p:extLst>
       <p:ext uri="{BB962C8B-B14F-4D97-AF65-F5344CB8AC3E}">

</xml_diff>